<commit_message>
Final Group3 with video
</commit_message>
<xml_diff>
--- a/Drawing Objects.pptx
+++ b/Drawing Objects.pptx
@@ -7,6 +7,7 @@
   <p:sldIdLst>
     <p:sldId id="256" r:id="rId2"/>
     <p:sldId id="257" r:id="rId3"/>
+    <p:sldId id="258" r:id="rId4"/>
   </p:sldIdLst>
   <p:sldSz cx="12192000" cy="6858000"/>
   <p:notesSz cx="6858000" cy="9144000"/>
@@ -105,10 +106,895 @@
       </a:defRPr>
     </a:lvl9pPr>
   </p:defaultTextStyle>
+  <p:extLst>
+    <p:ext uri="{EFAFB233-063F-42B5-8137-9DF3F51BA10A}">
+      <p15:sldGuideLst xmlns:p15="http://schemas.microsoft.com/office/powerpoint/2012/main"/>
+    </p:ext>
+  </p:extLst>
 </p:presentation>
 </file>
 
 <file path=ppt/diagrams/colors1.xml><?xml version="1.0" encoding="utf-8"?>
+<dgm:colorsDef xmlns:dgm="http://schemas.openxmlformats.org/drawingml/2006/diagram" xmlns:a="http://schemas.openxmlformats.org/drawingml/2006/main" uniqueId="urn:microsoft.com/office/officeart/2005/8/colors/accent1_5">
+  <dgm:title val=""/>
+  <dgm:desc val=""/>
+  <dgm:catLst>
+    <dgm:cat type="accent1" pri="11500"/>
+  </dgm:catLst>
+  <dgm:styleLbl name="node0">
+    <dgm:fillClrLst meth="cycle">
+      <a:schemeClr val="accent1">
+        <a:alpha val="80000"/>
+      </a:schemeClr>
+    </dgm:fillClrLst>
+    <dgm:linClrLst meth="repeat">
+      <a:schemeClr val="lt1"/>
+    </dgm:linClrLst>
+    <dgm:effectClrLst/>
+    <dgm:txLinClrLst/>
+    <dgm:txFillClrLst/>
+    <dgm:txEffectClrLst/>
+  </dgm:styleLbl>
+  <dgm:styleLbl name="node1">
+    <dgm:fillClrLst>
+      <a:schemeClr val="accent1">
+        <a:alpha val="90000"/>
+      </a:schemeClr>
+      <a:schemeClr val="accent1">
+        <a:alpha val="50000"/>
+      </a:schemeClr>
+    </dgm:fillClrLst>
+    <dgm:linClrLst meth="repeat">
+      <a:schemeClr val="lt1"/>
+    </dgm:linClrLst>
+    <dgm:effectClrLst/>
+    <dgm:txLinClrLst/>
+    <dgm:txFillClrLst/>
+    <dgm:txEffectClrLst/>
+  </dgm:styleLbl>
+  <dgm:styleLbl name="alignNode1">
+    <dgm:fillClrLst>
+      <a:schemeClr val="accent1">
+        <a:alpha val="90000"/>
+      </a:schemeClr>
+      <a:schemeClr val="accent1">
+        <a:alpha val="50000"/>
+      </a:schemeClr>
+    </dgm:fillClrLst>
+    <dgm:linClrLst>
+      <a:schemeClr val="accent1">
+        <a:alpha val="90000"/>
+      </a:schemeClr>
+      <a:schemeClr val="accent1">
+        <a:alpha val="50000"/>
+      </a:schemeClr>
+    </dgm:linClrLst>
+    <dgm:effectClrLst/>
+    <dgm:txLinClrLst/>
+    <dgm:txFillClrLst/>
+    <dgm:txEffectClrLst/>
+  </dgm:styleLbl>
+  <dgm:styleLbl name="lnNode1">
+    <dgm:fillClrLst>
+      <a:schemeClr val="accent1">
+        <a:shade val="90000"/>
+      </a:schemeClr>
+      <a:schemeClr val="accent1">
+        <a:alpha val="50000"/>
+        <a:tint val="50000"/>
+      </a:schemeClr>
+    </dgm:fillClrLst>
+    <dgm:linClrLst meth="repeat">
+      <a:schemeClr val="lt1"/>
+    </dgm:linClrLst>
+    <dgm:effectClrLst/>
+    <dgm:txLinClrLst/>
+    <dgm:txFillClrLst/>
+    <dgm:txEffectClrLst/>
+  </dgm:styleLbl>
+  <dgm:styleLbl name="vennNode1">
+    <dgm:fillClrLst>
+      <a:schemeClr val="accent1">
+        <a:shade val="80000"/>
+        <a:alpha val="50000"/>
+      </a:schemeClr>
+      <a:schemeClr val="accent1">
+        <a:alpha val="80000"/>
+      </a:schemeClr>
+    </dgm:fillClrLst>
+    <dgm:linClrLst meth="repeat">
+      <a:schemeClr val="lt1"/>
+    </dgm:linClrLst>
+    <dgm:effectClrLst/>
+    <dgm:txLinClrLst/>
+    <dgm:txFillClrLst/>
+    <dgm:txEffectClrLst/>
+  </dgm:styleLbl>
+  <dgm:styleLbl name="node2">
+    <dgm:fillClrLst>
+      <a:schemeClr val="accent1">
+        <a:alpha val="70000"/>
+      </a:schemeClr>
+    </dgm:fillClrLst>
+    <dgm:linClrLst meth="repeat">
+      <a:schemeClr val="lt1"/>
+    </dgm:linClrLst>
+    <dgm:effectClrLst/>
+    <dgm:txLinClrLst/>
+    <dgm:txFillClrLst/>
+    <dgm:txEffectClrLst/>
+  </dgm:styleLbl>
+  <dgm:styleLbl name="node3">
+    <dgm:fillClrLst>
+      <a:schemeClr val="accent1">
+        <a:alpha val="50000"/>
+      </a:schemeClr>
+    </dgm:fillClrLst>
+    <dgm:linClrLst meth="repeat">
+      <a:schemeClr val="lt1"/>
+    </dgm:linClrLst>
+    <dgm:effectClrLst/>
+    <dgm:txLinClrLst/>
+    <dgm:txFillClrLst/>
+    <dgm:txEffectClrLst/>
+  </dgm:styleLbl>
+  <dgm:styleLbl name="node4">
+    <dgm:fillClrLst>
+      <a:schemeClr val="accent1">
+        <a:alpha val="30000"/>
+      </a:schemeClr>
+    </dgm:fillClrLst>
+    <dgm:linClrLst meth="repeat">
+      <a:schemeClr val="lt1"/>
+    </dgm:linClrLst>
+    <dgm:effectClrLst/>
+    <dgm:txLinClrLst/>
+    <dgm:txFillClrLst/>
+    <dgm:txEffectClrLst/>
+  </dgm:styleLbl>
+  <dgm:styleLbl name="fgImgPlace1">
+    <dgm:fillClrLst>
+      <a:schemeClr val="accent1">
+        <a:tint val="50000"/>
+        <a:alpha val="90000"/>
+      </a:schemeClr>
+      <a:schemeClr val="accent1">
+        <a:tint val="20000"/>
+        <a:alpha val="50000"/>
+      </a:schemeClr>
+    </dgm:fillClrLst>
+    <dgm:linClrLst meth="repeat">
+      <a:schemeClr val="lt1"/>
+    </dgm:linClrLst>
+    <dgm:effectClrLst/>
+    <dgm:txLinClrLst/>
+    <dgm:txFillClrLst meth="repeat">
+      <a:schemeClr val="lt1"/>
+    </dgm:txFillClrLst>
+    <dgm:txEffectClrLst/>
+  </dgm:styleLbl>
+  <dgm:styleLbl name="alignImgPlace1">
+    <dgm:fillClrLst>
+      <a:schemeClr val="accent1">
+        <a:tint val="50000"/>
+      </a:schemeClr>
+      <a:schemeClr val="accent1">
+        <a:tint val="20000"/>
+      </a:schemeClr>
+    </dgm:fillClrLst>
+    <dgm:linClrLst meth="repeat">
+      <a:schemeClr val="lt1"/>
+    </dgm:linClrLst>
+    <dgm:effectClrLst/>
+    <dgm:txLinClrLst/>
+    <dgm:txFillClrLst meth="repeat">
+      <a:schemeClr val="lt1"/>
+    </dgm:txFillClrLst>
+    <dgm:txEffectClrLst/>
+  </dgm:styleLbl>
+  <dgm:styleLbl name="bgImgPlace1">
+    <dgm:fillClrLst>
+      <a:schemeClr val="accent1">
+        <a:tint val="50000"/>
+      </a:schemeClr>
+      <a:schemeClr val="accent1">
+        <a:tint val="20000"/>
+      </a:schemeClr>
+    </dgm:fillClrLst>
+    <dgm:linClrLst meth="repeat">
+      <a:schemeClr val="lt1"/>
+    </dgm:linClrLst>
+    <dgm:effectClrLst/>
+    <dgm:txLinClrLst/>
+    <dgm:txFillClrLst meth="repeat">
+      <a:schemeClr val="lt1"/>
+    </dgm:txFillClrLst>
+    <dgm:txEffectClrLst/>
+  </dgm:styleLbl>
+  <dgm:styleLbl name="sibTrans2D1">
+    <dgm:fillClrLst>
+      <a:schemeClr val="accent1">
+        <a:shade val="90000"/>
+      </a:schemeClr>
+      <a:schemeClr val="accent1">
+        <a:tint val="50000"/>
+      </a:schemeClr>
+    </dgm:fillClrLst>
+    <dgm:linClrLst>
+      <a:schemeClr val="accent1">
+        <a:shade val="90000"/>
+      </a:schemeClr>
+      <a:schemeClr val="accent1">
+        <a:tint val="50000"/>
+      </a:schemeClr>
+    </dgm:linClrLst>
+    <dgm:effectClrLst/>
+    <dgm:txLinClrLst/>
+    <dgm:txFillClrLst/>
+    <dgm:txEffectClrLst/>
+  </dgm:styleLbl>
+  <dgm:styleLbl name="fgSibTrans2D1">
+    <dgm:fillClrLst>
+      <a:schemeClr val="accent1">
+        <a:shade val="90000"/>
+      </a:schemeClr>
+      <a:schemeClr val="accent1">
+        <a:tint val="50000"/>
+      </a:schemeClr>
+    </dgm:fillClrLst>
+    <dgm:linClrLst>
+      <a:schemeClr val="accent1">
+        <a:shade val="90000"/>
+      </a:schemeClr>
+      <a:schemeClr val="accent1">
+        <a:tint val="50000"/>
+      </a:schemeClr>
+    </dgm:linClrLst>
+    <dgm:effectClrLst/>
+    <dgm:txLinClrLst/>
+    <dgm:txFillClrLst/>
+    <dgm:txEffectClrLst/>
+  </dgm:styleLbl>
+  <dgm:styleLbl name="bgSibTrans2D1">
+    <dgm:fillClrLst>
+      <a:schemeClr val="accent1">
+        <a:shade val="90000"/>
+      </a:schemeClr>
+      <a:schemeClr val="accent1">
+        <a:tint val="50000"/>
+      </a:schemeClr>
+    </dgm:fillClrLst>
+    <dgm:linClrLst>
+      <a:schemeClr val="accent1">
+        <a:shade val="90000"/>
+      </a:schemeClr>
+      <a:schemeClr val="accent1">
+        <a:tint val="50000"/>
+      </a:schemeClr>
+    </dgm:linClrLst>
+    <dgm:effectClrLst/>
+    <dgm:txLinClrLst/>
+    <dgm:txFillClrLst/>
+    <dgm:txEffectClrLst/>
+  </dgm:styleLbl>
+  <dgm:styleLbl name="sibTrans1D1">
+    <dgm:fillClrLst>
+      <a:schemeClr val="accent1">
+        <a:shade val="90000"/>
+      </a:schemeClr>
+      <a:schemeClr val="accent1">
+        <a:tint val="50000"/>
+      </a:schemeClr>
+    </dgm:fillClrLst>
+    <dgm:linClrLst>
+      <a:schemeClr val="accent1">
+        <a:shade val="90000"/>
+      </a:schemeClr>
+      <a:schemeClr val="accent1">
+        <a:tint val="50000"/>
+      </a:schemeClr>
+    </dgm:linClrLst>
+    <dgm:effectClrLst/>
+    <dgm:txLinClrLst/>
+    <dgm:txFillClrLst meth="repeat">
+      <a:schemeClr val="tx1"/>
+    </dgm:txFillClrLst>
+    <dgm:txEffectClrLst/>
+  </dgm:styleLbl>
+  <dgm:styleLbl name="callout">
+    <dgm:fillClrLst meth="repeat">
+      <a:schemeClr val="accent1"/>
+    </dgm:fillClrLst>
+    <dgm:linClrLst meth="repeat">
+      <a:schemeClr val="accent1"/>
+    </dgm:linClrLst>
+    <dgm:effectClrLst/>
+    <dgm:txLinClrLst/>
+    <dgm:txFillClrLst meth="repeat">
+      <a:schemeClr val="tx1"/>
+    </dgm:txFillClrLst>
+    <dgm:txEffectClrLst/>
+  </dgm:styleLbl>
+  <dgm:styleLbl name="asst0">
+    <dgm:fillClrLst meth="repeat">
+      <a:schemeClr val="accent1">
+        <a:alpha val="90000"/>
+      </a:schemeClr>
+    </dgm:fillClrLst>
+    <dgm:linClrLst meth="repeat">
+      <a:schemeClr val="lt1"/>
+    </dgm:linClrLst>
+    <dgm:effectClrLst/>
+    <dgm:txLinClrLst/>
+    <dgm:txFillClrLst/>
+    <dgm:txEffectClrLst/>
+  </dgm:styleLbl>
+  <dgm:styleLbl name="asst1">
+    <dgm:fillClrLst meth="repeat">
+      <a:schemeClr val="accent1">
+        <a:alpha val="90000"/>
+      </a:schemeClr>
+    </dgm:fillClrLst>
+    <dgm:linClrLst meth="repeat">
+      <a:schemeClr val="lt1"/>
+    </dgm:linClrLst>
+    <dgm:effectClrLst/>
+    <dgm:txLinClrLst/>
+    <dgm:txFillClrLst/>
+    <dgm:txEffectClrLst/>
+  </dgm:styleLbl>
+  <dgm:styleLbl name="asst2">
+    <dgm:fillClrLst>
+      <a:schemeClr val="accent1">
+        <a:alpha val="90000"/>
+      </a:schemeClr>
+    </dgm:fillClrLst>
+    <dgm:linClrLst meth="repeat">
+      <a:schemeClr val="lt1"/>
+    </dgm:linClrLst>
+    <dgm:effectClrLst/>
+    <dgm:txLinClrLst/>
+    <dgm:txFillClrLst/>
+    <dgm:txEffectClrLst/>
+  </dgm:styleLbl>
+  <dgm:styleLbl name="asst3">
+    <dgm:fillClrLst>
+      <a:schemeClr val="accent1">
+        <a:alpha val="70000"/>
+      </a:schemeClr>
+    </dgm:fillClrLst>
+    <dgm:linClrLst meth="repeat">
+      <a:schemeClr val="lt1"/>
+    </dgm:linClrLst>
+    <dgm:effectClrLst/>
+    <dgm:txLinClrLst/>
+    <dgm:txFillClrLst/>
+    <dgm:txEffectClrLst/>
+  </dgm:styleLbl>
+  <dgm:styleLbl name="asst4">
+    <dgm:fillClrLst>
+      <a:schemeClr val="accent1">
+        <a:alpha val="50000"/>
+      </a:schemeClr>
+    </dgm:fillClrLst>
+    <dgm:linClrLst meth="repeat">
+      <a:schemeClr val="lt1"/>
+    </dgm:linClrLst>
+    <dgm:effectClrLst/>
+    <dgm:txLinClrLst/>
+    <dgm:txFillClrLst/>
+    <dgm:txEffectClrLst/>
+  </dgm:styleLbl>
+  <dgm:styleLbl name="parChTrans2D1">
+    <dgm:fillClrLst meth="repeat">
+      <a:schemeClr val="accent1">
+        <a:shade val="80000"/>
+      </a:schemeClr>
+    </dgm:fillClrLst>
+    <dgm:linClrLst meth="repeat">
+      <a:schemeClr val="accent1">
+        <a:shade val="80000"/>
+      </a:schemeClr>
+    </dgm:linClrLst>
+    <dgm:effectClrLst/>
+    <dgm:txLinClrLst/>
+    <dgm:txFillClrLst/>
+    <dgm:txEffectClrLst/>
+  </dgm:styleLbl>
+  <dgm:styleLbl name="parChTrans2D2">
+    <dgm:fillClrLst meth="repeat">
+      <a:schemeClr val="accent1">
+        <a:tint val="90000"/>
+      </a:schemeClr>
+    </dgm:fillClrLst>
+    <dgm:linClrLst meth="repeat">
+      <a:schemeClr val="accent1">
+        <a:tint val="90000"/>
+      </a:schemeClr>
+    </dgm:linClrLst>
+    <dgm:effectClrLst/>
+    <dgm:txLinClrLst/>
+    <dgm:txFillClrLst/>
+    <dgm:txEffectClrLst/>
+  </dgm:styleLbl>
+  <dgm:styleLbl name="parChTrans2D3">
+    <dgm:fillClrLst meth="repeat">
+      <a:schemeClr val="accent1">
+        <a:tint val="70000"/>
+      </a:schemeClr>
+    </dgm:fillClrLst>
+    <dgm:linClrLst meth="repeat">
+      <a:schemeClr val="accent1">
+        <a:tint val="70000"/>
+      </a:schemeClr>
+    </dgm:linClrLst>
+    <dgm:effectClrLst/>
+    <dgm:txLinClrLst/>
+    <dgm:txFillClrLst/>
+    <dgm:txEffectClrLst/>
+  </dgm:styleLbl>
+  <dgm:styleLbl name="parChTrans2D4">
+    <dgm:fillClrLst meth="repeat">
+      <a:schemeClr val="accent1">
+        <a:tint val="50000"/>
+      </a:schemeClr>
+    </dgm:fillClrLst>
+    <dgm:linClrLst meth="repeat">
+      <a:schemeClr val="accent1">
+        <a:tint val="50000"/>
+      </a:schemeClr>
+    </dgm:linClrLst>
+    <dgm:effectClrLst/>
+    <dgm:txLinClrLst/>
+    <dgm:txFillClrLst meth="repeat">
+      <a:schemeClr val="dk1"/>
+    </dgm:txFillClrLst>
+    <dgm:txEffectClrLst/>
+  </dgm:styleLbl>
+  <dgm:styleLbl name="parChTrans1D1">
+    <dgm:fillClrLst meth="repeat">
+      <a:schemeClr val="accent1">
+        <a:shade val="80000"/>
+      </a:schemeClr>
+    </dgm:fillClrLst>
+    <dgm:linClrLst meth="repeat">
+      <a:schemeClr val="accent1">
+        <a:shade val="80000"/>
+      </a:schemeClr>
+    </dgm:linClrLst>
+    <dgm:effectClrLst/>
+    <dgm:txLinClrLst/>
+    <dgm:txFillClrLst meth="repeat">
+      <a:schemeClr val="tx1"/>
+    </dgm:txFillClrLst>
+    <dgm:txEffectClrLst/>
+  </dgm:styleLbl>
+  <dgm:styleLbl name="parChTrans1D2">
+    <dgm:fillClrLst meth="repeat">
+      <a:schemeClr val="accent1">
+        <a:tint val="90000"/>
+      </a:schemeClr>
+    </dgm:fillClrLst>
+    <dgm:linClrLst meth="repeat">
+      <a:schemeClr val="accent1">
+        <a:tint val="90000"/>
+      </a:schemeClr>
+    </dgm:linClrLst>
+    <dgm:effectClrLst/>
+    <dgm:txLinClrLst/>
+    <dgm:txFillClrLst meth="repeat">
+      <a:schemeClr val="tx1"/>
+    </dgm:txFillClrLst>
+    <dgm:txEffectClrLst/>
+  </dgm:styleLbl>
+  <dgm:styleLbl name="parChTrans1D3">
+    <dgm:fillClrLst meth="repeat">
+      <a:schemeClr val="accent1">
+        <a:tint val="70000"/>
+      </a:schemeClr>
+    </dgm:fillClrLst>
+    <dgm:linClrLst meth="repeat">
+      <a:schemeClr val="accent1">
+        <a:tint val="70000"/>
+      </a:schemeClr>
+    </dgm:linClrLst>
+    <dgm:effectClrLst/>
+    <dgm:txLinClrLst/>
+    <dgm:txFillClrLst meth="repeat">
+      <a:schemeClr val="tx1"/>
+    </dgm:txFillClrLst>
+    <dgm:txEffectClrLst/>
+  </dgm:styleLbl>
+  <dgm:styleLbl name="parChTrans1D4">
+    <dgm:fillClrLst meth="repeat">
+      <a:schemeClr val="accent1">
+        <a:tint val="50000"/>
+      </a:schemeClr>
+    </dgm:fillClrLst>
+    <dgm:linClrLst meth="repeat">
+      <a:schemeClr val="accent1">
+        <a:tint val="50000"/>
+      </a:schemeClr>
+    </dgm:linClrLst>
+    <dgm:effectClrLst/>
+    <dgm:txLinClrLst/>
+    <dgm:txFillClrLst meth="repeat">
+      <a:schemeClr val="tx1"/>
+    </dgm:txFillClrLst>
+    <dgm:txEffectClrLst/>
+  </dgm:styleLbl>
+  <dgm:styleLbl name="fgAcc1">
+    <dgm:fillClrLst meth="repeat">
+      <a:schemeClr val="lt1">
+        <a:alpha val="90000"/>
+      </a:schemeClr>
+    </dgm:fillClrLst>
+    <dgm:linClrLst>
+      <a:schemeClr val="accent1">
+        <a:alpha val="90000"/>
+      </a:schemeClr>
+      <a:schemeClr val="accent1">
+        <a:alpha val="50000"/>
+      </a:schemeClr>
+    </dgm:linClrLst>
+    <dgm:effectClrLst/>
+    <dgm:txLinClrLst/>
+    <dgm:txFillClrLst meth="repeat">
+      <a:schemeClr val="dk1"/>
+    </dgm:txFillClrLst>
+    <dgm:txEffectClrLst/>
+  </dgm:styleLbl>
+  <dgm:styleLbl name="conFgAcc1">
+    <dgm:fillClrLst meth="repeat">
+      <a:schemeClr val="lt1">
+        <a:alpha val="90000"/>
+      </a:schemeClr>
+    </dgm:fillClrLst>
+    <dgm:linClrLst>
+      <a:schemeClr val="accent1">
+        <a:alpha val="90000"/>
+      </a:schemeClr>
+      <a:schemeClr val="accent1">
+        <a:alpha val="50000"/>
+      </a:schemeClr>
+    </dgm:linClrLst>
+    <dgm:effectClrLst/>
+    <dgm:txLinClrLst/>
+    <dgm:txFillClrLst meth="repeat">
+      <a:schemeClr val="dk1"/>
+    </dgm:txFillClrLst>
+    <dgm:txEffectClrLst/>
+  </dgm:styleLbl>
+  <dgm:styleLbl name="alignAcc1">
+    <dgm:fillClrLst meth="repeat">
+      <a:schemeClr val="lt1">
+        <a:alpha val="90000"/>
+      </a:schemeClr>
+    </dgm:fillClrLst>
+    <dgm:linClrLst>
+      <a:schemeClr val="accent1">
+        <a:alpha val="90000"/>
+      </a:schemeClr>
+      <a:schemeClr val="accent1">
+        <a:alpha val="50000"/>
+      </a:schemeClr>
+    </dgm:linClrLst>
+    <dgm:effectClrLst/>
+    <dgm:txLinClrLst/>
+    <dgm:txFillClrLst meth="repeat">
+      <a:schemeClr val="dk1"/>
+    </dgm:txFillClrLst>
+    <dgm:txEffectClrLst/>
+  </dgm:styleLbl>
+  <dgm:styleLbl name="trAlignAcc1">
+    <dgm:fillClrLst meth="repeat">
+      <a:schemeClr val="lt1">
+        <a:alpha val="40000"/>
+      </a:schemeClr>
+    </dgm:fillClrLst>
+    <dgm:linClrLst>
+      <a:schemeClr val="accent1">
+        <a:alpha val="90000"/>
+      </a:schemeClr>
+      <a:schemeClr val="accent1">
+        <a:alpha val="50000"/>
+      </a:schemeClr>
+    </dgm:linClrLst>
+    <dgm:effectClrLst/>
+    <dgm:txLinClrLst/>
+    <dgm:txFillClrLst meth="repeat">
+      <a:schemeClr val="dk1"/>
+    </dgm:txFillClrLst>
+    <dgm:txEffectClrLst/>
+  </dgm:styleLbl>
+  <dgm:styleLbl name="bgAcc1">
+    <dgm:fillClrLst meth="repeat">
+      <a:schemeClr val="lt1">
+        <a:alpha val="90000"/>
+      </a:schemeClr>
+    </dgm:fillClrLst>
+    <dgm:linClrLst>
+      <a:schemeClr val="accent1">
+        <a:alpha val="90000"/>
+      </a:schemeClr>
+      <a:schemeClr val="accent1">
+        <a:alpha val="50000"/>
+      </a:schemeClr>
+    </dgm:linClrLst>
+    <dgm:effectClrLst/>
+    <dgm:txLinClrLst/>
+    <dgm:txFillClrLst meth="repeat">
+      <a:schemeClr val="dk1"/>
+    </dgm:txFillClrLst>
+    <dgm:txEffectClrLst/>
+  </dgm:styleLbl>
+  <dgm:styleLbl name="solidFgAcc1">
+    <dgm:fillClrLst meth="repeat">
+      <a:schemeClr val="lt1"/>
+    </dgm:fillClrLst>
+    <dgm:linClrLst>
+      <a:schemeClr val="accent1">
+        <a:alpha val="90000"/>
+      </a:schemeClr>
+      <a:schemeClr val="accent1">
+        <a:alpha val="50000"/>
+      </a:schemeClr>
+    </dgm:linClrLst>
+    <dgm:effectClrLst/>
+    <dgm:txLinClrLst/>
+    <dgm:txFillClrLst meth="repeat">
+      <a:schemeClr val="dk1"/>
+    </dgm:txFillClrLst>
+    <dgm:txEffectClrLst/>
+  </dgm:styleLbl>
+  <dgm:styleLbl name="solidAlignAcc1">
+    <dgm:fillClrLst meth="repeat">
+      <a:schemeClr val="lt1"/>
+    </dgm:fillClrLst>
+    <dgm:linClrLst meth="repeat">
+      <a:schemeClr val="accent1"/>
+    </dgm:linClrLst>
+    <dgm:effectClrLst/>
+    <dgm:txLinClrLst/>
+    <dgm:txFillClrLst meth="repeat">
+      <a:schemeClr val="dk1"/>
+    </dgm:txFillClrLst>
+    <dgm:txEffectClrLst/>
+  </dgm:styleLbl>
+  <dgm:styleLbl name="solidBgAcc1">
+    <dgm:fillClrLst meth="repeat">
+      <a:schemeClr val="lt1"/>
+    </dgm:fillClrLst>
+    <dgm:linClrLst meth="repeat">
+      <a:schemeClr val="accent1"/>
+    </dgm:linClrLst>
+    <dgm:effectClrLst/>
+    <dgm:txLinClrLst/>
+    <dgm:txFillClrLst meth="repeat">
+      <a:schemeClr val="dk1"/>
+    </dgm:txFillClrLst>
+    <dgm:txEffectClrLst/>
+  </dgm:styleLbl>
+  <dgm:styleLbl name="fgAccFollowNode1">
+    <dgm:fillClrLst>
+      <a:schemeClr val="accent1">
+        <a:alpha val="90000"/>
+        <a:tint val="40000"/>
+      </a:schemeClr>
+      <a:schemeClr val="accent1">
+        <a:alpha val="50000"/>
+        <a:tint val="40000"/>
+      </a:schemeClr>
+    </dgm:fillClrLst>
+    <dgm:linClrLst meth="repeat">
+      <a:schemeClr val="accent1">
+        <a:alpha val="90000"/>
+        <a:tint val="40000"/>
+      </a:schemeClr>
+    </dgm:linClrLst>
+    <dgm:effectClrLst/>
+    <dgm:txLinClrLst/>
+    <dgm:txFillClrLst meth="repeat">
+      <a:schemeClr val="dk1"/>
+    </dgm:txFillClrLst>
+    <dgm:txEffectClrLst/>
+  </dgm:styleLbl>
+  <dgm:styleLbl name="alignAccFollowNode1">
+    <dgm:fillClrLst meth="repeat">
+      <a:schemeClr val="accent1">
+        <a:alpha val="90000"/>
+        <a:tint val="40000"/>
+      </a:schemeClr>
+    </dgm:fillClrLst>
+    <dgm:linClrLst meth="repeat">
+      <a:schemeClr val="accent1">
+        <a:alpha val="90000"/>
+        <a:tint val="40000"/>
+      </a:schemeClr>
+    </dgm:linClrLst>
+    <dgm:effectClrLst/>
+    <dgm:txLinClrLst/>
+    <dgm:txFillClrLst meth="repeat">
+      <a:schemeClr val="dk1"/>
+    </dgm:txFillClrLst>
+    <dgm:txEffectClrLst/>
+  </dgm:styleLbl>
+  <dgm:styleLbl name="bgAccFollowNode1">
+    <dgm:fillClrLst meth="repeat">
+      <a:schemeClr val="accent1">
+        <a:alpha val="90000"/>
+        <a:tint val="40000"/>
+      </a:schemeClr>
+    </dgm:fillClrLst>
+    <dgm:linClrLst meth="repeat">
+      <a:schemeClr val="lt1"/>
+    </dgm:linClrLst>
+    <dgm:effectClrLst/>
+    <dgm:txLinClrLst/>
+    <dgm:txFillClrLst meth="repeat">
+      <a:schemeClr val="dk1"/>
+    </dgm:txFillClrLst>
+    <dgm:txEffectClrLst/>
+  </dgm:styleLbl>
+  <dgm:styleLbl name="fgAcc0">
+    <dgm:fillClrLst meth="repeat">
+      <a:schemeClr val="lt1">
+        <a:alpha val="90000"/>
+      </a:schemeClr>
+    </dgm:fillClrLst>
+    <dgm:linClrLst meth="repeat">
+      <a:schemeClr val="accent1">
+        <a:shade val="80000"/>
+      </a:schemeClr>
+    </dgm:linClrLst>
+    <dgm:effectClrLst/>
+    <dgm:txLinClrLst/>
+    <dgm:txFillClrLst meth="repeat">
+      <a:schemeClr val="dk1"/>
+    </dgm:txFillClrLst>
+    <dgm:txEffectClrLst/>
+  </dgm:styleLbl>
+  <dgm:styleLbl name="fgAcc2">
+    <dgm:fillClrLst meth="repeat">
+      <a:schemeClr val="lt1">
+        <a:alpha val="90000"/>
+      </a:schemeClr>
+    </dgm:fillClrLst>
+    <dgm:linClrLst meth="repeat">
+      <a:schemeClr val="accent1">
+        <a:tint val="90000"/>
+      </a:schemeClr>
+    </dgm:linClrLst>
+    <dgm:effectClrLst/>
+    <dgm:txLinClrLst/>
+    <dgm:txFillClrLst meth="repeat">
+      <a:schemeClr val="dk1"/>
+    </dgm:txFillClrLst>
+    <dgm:txEffectClrLst/>
+  </dgm:styleLbl>
+  <dgm:styleLbl name="fgAcc3">
+    <dgm:fillClrLst meth="repeat">
+      <a:schemeClr val="lt1">
+        <a:alpha val="90000"/>
+      </a:schemeClr>
+    </dgm:fillClrLst>
+    <dgm:linClrLst meth="repeat">
+      <a:schemeClr val="accent1">
+        <a:tint val="70000"/>
+      </a:schemeClr>
+    </dgm:linClrLst>
+    <dgm:effectClrLst/>
+    <dgm:txLinClrLst/>
+    <dgm:txFillClrLst meth="repeat">
+      <a:schemeClr val="dk1"/>
+    </dgm:txFillClrLst>
+    <dgm:txEffectClrLst/>
+  </dgm:styleLbl>
+  <dgm:styleLbl name="fgAcc4">
+    <dgm:fillClrLst meth="repeat">
+      <a:schemeClr val="lt1">
+        <a:alpha val="90000"/>
+      </a:schemeClr>
+    </dgm:fillClrLst>
+    <dgm:linClrLst meth="repeat">
+      <a:schemeClr val="accent1">
+        <a:tint val="50000"/>
+      </a:schemeClr>
+    </dgm:linClrLst>
+    <dgm:effectClrLst/>
+    <dgm:txLinClrLst/>
+    <dgm:txFillClrLst meth="repeat">
+      <a:schemeClr val="dk1"/>
+    </dgm:txFillClrLst>
+    <dgm:txEffectClrLst/>
+  </dgm:styleLbl>
+  <dgm:styleLbl name="bgShp">
+    <dgm:fillClrLst meth="repeat">
+      <a:schemeClr val="accent1">
+        <a:tint val="40000"/>
+      </a:schemeClr>
+    </dgm:fillClrLst>
+    <dgm:linClrLst meth="repeat">
+      <a:schemeClr val="dk1"/>
+    </dgm:linClrLst>
+    <dgm:effectClrLst/>
+    <dgm:txLinClrLst/>
+    <dgm:txFillClrLst meth="repeat">
+      <a:schemeClr val="dk1"/>
+    </dgm:txFillClrLst>
+    <dgm:txEffectClrLst/>
+  </dgm:styleLbl>
+  <dgm:styleLbl name="dkBgShp">
+    <dgm:fillClrLst meth="repeat">
+      <a:schemeClr val="accent1">
+        <a:shade val="90000"/>
+      </a:schemeClr>
+    </dgm:fillClrLst>
+    <dgm:linClrLst meth="repeat">
+      <a:schemeClr val="dk1"/>
+    </dgm:linClrLst>
+    <dgm:effectClrLst/>
+    <dgm:txLinClrLst/>
+    <dgm:txFillClrLst meth="repeat">
+      <a:schemeClr val="lt1"/>
+    </dgm:txFillClrLst>
+    <dgm:txEffectClrLst/>
+  </dgm:styleLbl>
+  <dgm:styleLbl name="trBgShp">
+    <dgm:fillClrLst meth="repeat">
+      <a:schemeClr val="accent1">
+        <a:tint val="50000"/>
+        <a:alpha val="40000"/>
+      </a:schemeClr>
+    </dgm:fillClrLst>
+    <dgm:linClrLst meth="repeat">
+      <a:schemeClr val="accent1"/>
+    </dgm:linClrLst>
+    <dgm:effectClrLst/>
+    <dgm:txLinClrLst/>
+    <dgm:txFillClrLst meth="repeat">
+      <a:schemeClr val="lt1"/>
+    </dgm:txFillClrLst>
+    <dgm:txEffectClrLst/>
+  </dgm:styleLbl>
+  <dgm:styleLbl name="fgShp">
+    <dgm:fillClrLst meth="repeat">
+      <a:schemeClr val="accent1">
+        <a:tint val="40000"/>
+      </a:schemeClr>
+    </dgm:fillClrLst>
+    <dgm:linClrLst meth="repeat">
+      <a:schemeClr val="lt1"/>
+    </dgm:linClrLst>
+    <dgm:effectClrLst/>
+    <dgm:txLinClrLst/>
+    <dgm:txFillClrLst meth="repeat">
+      <a:schemeClr val="dk1"/>
+    </dgm:txFillClrLst>
+    <dgm:txEffectClrLst/>
+  </dgm:styleLbl>
+  <dgm:styleLbl name="revTx">
+    <dgm:fillClrLst meth="repeat">
+      <a:schemeClr val="lt1">
+        <a:alpha val="0"/>
+      </a:schemeClr>
+    </dgm:fillClrLst>
+    <dgm:linClrLst meth="repeat">
+      <a:schemeClr val="dk1">
+        <a:alpha val="0"/>
+      </a:schemeClr>
+    </dgm:linClrLst>
+    <dgm:effectClrLst/>
+    <dgm:txLinClrLst/>
+    <dgm:txFillClrLst meth="repeat">
+      <a:schemeClr val="tx1"/>
+    </dgm:txFillClrLst>
+    <dgm:txEffectClrLst/>
+  </dgm:styleLbl>
+</dgm:colorsDef>
+</file>
+
+<file path=ppt/diagrams/colors2.xml><?xml version="1.0" encoding="utf-8"?>
 <dgm:colorsDef xmlns:dgm="http://schemas.openxmlformats.org/drawingml/2006/diagram" xmlns:a="http://schemas.openxmlformats.org/drawingml/2006/main" uniqueId="urn:microsoft.com/office/officeart/2005/8/colors/colorful5">
   <dgm:title val=""/>
   <dgm:desc val=""/>
@@ -891,6 +1777,413 @@
 </file>
 
 <file path=ppt/diagrams/data1.xml><?xml version="1.0" encoding="utf-8"?>
+<dgm:dataModel xmlns:dgm="http://schemas.openxmlformats.org/drawingml/2006/diagram" xmlns:a="http://schemas.openxmlformats.org/drawingml/2006/main">
+  <dgm:ptLst>
+    <dgm:pt modelId="{DBD182B4-2D75-7A4F-A2FC-0AECAA3538EE}" type="doc">
+      <dgm:prSet loTypeId="urn:microsoft.com/office/officeart/2005/8/layout/chevron1" loCatId="" qsTypeId="urn:microsoft.com/office/officeart/2005/8/quickstyle/simple1" qsCatId="simple" csTypeId="urn:microsoft.com/office/officeart/2005/8/colors/accent1_5" csCatId="accent1" phldr="1"/>
+      <dgm:spPr/>
+    </dgm:pt>
+    <dgm:pt modelId="{D2CFBD69-2FB3-6D45-8C1B-BA064B393CC7}">
+      <dgm:prSet phldrT="[Text]"/>
+      <dgm:spPr/>
+      <dgm:t>
+        <a:bodyPr/>
+        <a:lstStyle/>
+        <a:p>
+          <a:r>
+            <a:rPr lang="en-US" b="0" i="0" u="none" dirty="0"/>
+            <a:t>Understanding Requirements &amp; Domain</a:t>
+          </a:r>
+          <a:endParaRPr lang="en-US" dirty="0"/>
+        </a:p>
+      </dgm:t>
+    </dgm:pt>
+    <dgm:pt modelId="{CB6B4915-E06E-1D47-8D54-3338BDDE1F72}" type="parTrans" cxnId="{965D025E-6FB7-3843-8292-C8A9DD5B292C}">
+      <dgm:prSet/>
+      <dgm:spPr/>
+      <dgm:t>
+        <a:bodyPr/>
+        <a:lstStyle/>
+        <a:p>
+          <a:endParaRPr lang="en-US"/>
+        </a:p>
+      </dgm:t>
+    </dgm:pt>
+    <dgm:pt modelId="{DE3BAE38-9EF9-F244-8DD8-BD928019CF03}" type="sibTrans" cxnId="{965D025E-6FB7-3843-8292-C8A9DD5B292C}">
+      <dgm:prSet/>
+      <dgm:spPr/>
+      <dgm:t>
+        <a:bodyPr/>
+        <a:lstStyle/>
+        <a:p>
+          <a:endParaRPr lang="en-US"/>
+        </a:p>
+      </dgm:t>
+    </dgm:pt>
+    <dgm:pt modelId="{7B95986C-2E8C-3D4C-805E-971490EAEA86}">
+      <dgm:prSet phldrT="[Text]"/>
+      <dgm:spPr/>
+      <dgm:t>
+        <a:bodyPr/>
+        <a:lstStyle/>
+        <a:p>
+          <a:r>
+            <a:rPr lang="en-US" b="0" i="0" u="none" dirty="0"/>
+            <a:t>Data Set-up &amp; Validation</a:t>
+          </a:r>
+          <a:endParaRPr lang="en-US" dirty="0"/>
+        </a:p>
+      </dgm:t>
+    </dgm:pt>
+    <dgm:pt modelId="{AC2F641D-9D76-C14D-88E1-CFB4C0A10DA6}" type="parTrans" cxnId="{EF64DFD6-FEC3-8D49-A1B7-3C2ED5B647F6}">
+      <dgm:prSet/>
+      <dgm:spPr/>
+      <dgm:t>
+        <a:bodyPr/>
+        <a:lstStyle/>
+        <a:p>
+          <a:endParaRPr lang="en-US"/>
+        </a:p>
+      </dgm:t>
+    </dgm:pt>
+    <dgm:pt modelId="{A3C8433B-E34E-5341-AE71-EA76BFF62C36}" type="sibTrans" cxnId="{EF64DFD6-FEC3-8D49-A1B7-3C2ED5B647F6}">
+      <dgm:prSet/>
+      <dgm:spPr/>
+      <dgm:t>
+        <a:bodyPr/>
+        <a:lstStyle/>
+        <a:p>
+          <a:endParaRPr lang="en-US"/>
+        </a:p>
+      </dgm:t>
+    </dgm:pt>
+    <dgm:pt modelId="{8516B546-1B50-4B43-AE02-9D22AD937CC9}">
+      <dgm:prSet phldrT="[Text]"/>
+      <dgm:spPr/>
+      <dgm:t>
+        <a:bodyPr/>
+        <a:lstStyle/>
+        <a:p>
+          <a:r>
+            <a:rPr lang="en-US" b="0" i="0" u="none" dirty="0"/>
+            <a:t>EDA</a:t>
+          </a:r>
+          <a:endParaRPr lang="en-US" dirty="0"/>
+        </a:p>
+      </dgm:t>
+    </dgm:pt>
+    <dgm:pt modelId="{53772A7C-480A-0247-BC7C-94204D912AE6}" type="parTrans" cxnId="{FFACE45E-F600-4548-8DE4-33A878484220}">
+      <dgm:prSet/>
+      <dgm:spPr/>
+      <dgm:t>
+        <a:bodyPr/>
+        <a:lstStyle/>
+        <a:p>
+          <a:endParaRPr lang="en-US"/>
+        </a:p>
+      </dgm:t>
+    </dgm:pt>
+    <dgm:pt modelId="{9691A920-B429-0144-A795-08EF36901925}" type="sibTrans" cxnId="{FFACE45E-F600-4548-8DE4-33A878484220}">
+      <dgm:prSet/>
+      <dgm:spPr/>
+      <dgm:t>
+        <a:bodyPr/>
+        <a:lstStyle/>
+        <a:p>
+          <a:endParaRPr lang="en-US"/>
+        </a:p>
+      </dgm:t>
+    </dgm:pt>
+    <dgm:pt modelId="{5DD2C8AB-388F-A746-A202-3904BF0262F7}">
+      <dgm:prSet/>
+      <dgm:spPr/>
+      <dgm:t>
+        <a:bodyPr/>
+        <a:lstStyle/>
+        <a:p>
+          <a:r>
+            <a:rPr lang="en-US" dirty="0"/>
+            <a:t>Feature Engineering</a:t>
+          </a:r>
+        </a:p>
+      </dgm:t>
+    </dgm:pt>
+    <dgm:pt modelId="{174160FA-8093-EC4F-B150-81626241BFB4}" type="parTrans" cxnId="{D431AE79-8596-0F4B-9AB2-338FB8CCEB9A}">
+      <dgm:prSet/>
+      <dgm:spPr/>
+      <dgm:t>
+        <a:bodyPr/>
+        <a:lstStyle/>
+        <a:p>
+          <a:endParaRPr lang="en-US"/>
+        </a:p>
+      </dgm:t>
+    </dgm:pt>
+    <dgm:pt modelId="{4D9210A1-8380-3646-AA27-57EE1963E295}" type="sibTrans" cxnId="{D431AE79-8596-0F4B-9AB2-338FB8CCEB9A}">
+      <dgm:prSet/>
+      <dgm:spPr/>
+      <dgm:t>
+        <a:bodyPr/>
+        <a:lstStyle/>
+        <a:p>
+          <a:endParaRPr lang="en-US"/>
+        </a:p>
+      </dgm:t>
+    </dgm:pt>
+    <dgm:pt modelId="{BEBE266C-FD14-524F-9216-152B26164655}">
+      <dgm:prSet/>
+      <dgm:spPr/>
+      <dgm:t>
+        <a:bodyPr/>
+        <a:lstStyle/>
+        <a:p>
+          <a:r>
+            <a:rPr lang="en-US" dirty="0"/>
+            <a:t>Model Set-up &amp; Training</a:t>
+          </a:r>
+        </a:p>
+      </dgm:t>
+    </dgm:pt>
+    <dgm:pt modelId="{0E6563E2-25F9-AA47-930F-BED666372518}" type="parTrans" cxnId="{326255C0-78F6-E644-8DFE-60127613BFDF}">
+      <dgm:prSet/>
+      <dgm:spPr/>
+      <dgm:t>
+        <a:bodyPr/>
+        <a:lstStyle/>
+        <a:p>
+          <a:endParaRPr lang="en-US"/>
+        </a:p>
+      </dgm:t>
+    </dgm:pt>
+    <dgm:pt modelId="{C2967FE7-9DCC-3443-A4F0-66AB57365CD9}" type="sibTrans" cxnId="{326255C0-78F6-E644-8DFE-60127613BFDF}">
+      <dgm:prSet/>
+      <dgm:spPr/>
+      <dgm:t>
+        <a:bodyPr/>
+        <a:lstStyle/>
+        <a:p>
+          <a:endParaRPr lang="en-US"/>
+        </a:p>
+      </dgm:t>
+    </dgm:pt>
+    <dgm:pt modelId="{7D45AC0C-1549-0445-9EF5-DF07189F47B5}">
+      <dgm:prSet/>
+      <dgm:spPr/>
+      <dgm:t>
+        <a:bodyPr/>
+        <a:lstStyle/>
+        <a:p>
+          <a:r>
+            <a:rPr lang="en-US" dirty="0"/>
+            <a:t>Model Evaluation</a:t>
+          </a:r>
+        </a:p>
+      </dgm:t>
+    </dgm:pt>
+    <dgm:pt modelId="{4C77031D-D952-BC45-97A3-847F2CCFA9EA}" type="parTrans" cxnId="{0B8C4DEA-B9FB-D540-B251-BCDB9BF6B25E}">
+      <dgm:prSet/>
+      <dgm:spPr/>
+      <dgm:t>
+        <a:bodyPr/>
+        <a:lstStyle/>
+        <a:p>
+          <a:endParaRPr lang="en-US"/>
+        </a:p>
+      </dgm:t>
+    </dgm:pt>
+    <dgm:pt modelId="{74D6E566-6CF9-364B-BFFF-915D9CE53E41}" type="sibTrans" cxnId="{0B8C4DEA-B9FB-D540-B251-BCDB9BF6B25E}">
+      <dgm:prSet/>
+      <dgm:spPr/>
+      <dgm:t>
+        <a:bodyPr/>
+        <a:lstStyle/>
+        <a:p>
+          <a:endParaRPr lang="en-US"/>
+        </a:p>
+      </dgm:t>
+    </dgm:pt>
+    <dgm:pt modelId="{7137169A-9F5C-C14B-BBF6-DBF2565A6EDA}">
+      <dgm:prSet/>
+      <dgm:spPr/>
+      <dgm:t>
+        <a:bodyPr/>
+        <a:lstStyle/>
+        <a:p>
+          <a:r>
+            <a:rPr lang="en-US" dirty="0"/>
+            <a:t>Kaggle Submission</a:t>
+          </a:r>
+        </a:p>
+      </dgm:t>
+    </dgm:pt>
+    <dgm:pt modelId="{B4E14A10-42C1-154F-9F34-F7AD4A68004D}" type="parTrans" cxnId="{E626A29B-4A7D-214F-98D4-339183511ECD}">
+      <dgm:prSet/>
+      <dgm:spPr/>
+      <dgm:t>
+        <a:bodyPr/>
+        <a:lstStyle/>
+        <a:p>
+          <a:endParaRPr lang="en-US"/>
+        </a:p>
+      </dgm:t>
+    </dgm:pt>
+    <dgm:pt modelId="{768AD082-9CC0-B64E-BB0D-BDFC361AD6FA}" type="sibTrans" cxnId="{E626A29B-4A7D-214F-98D4-339183511ECD}">
+      <dgm:prSet/>
+      <dgm:spPr/>
+      <dgm:t>
+        <a:bodyPr/>
+        <a:lstStyle/>
+        <a:p>
+          <a:endParaRPr lang="en-US"/>
+        </a:p>
+      </dgm:t>
+    </dgm:pt>
+    <dgm:pt modelId="{787F3AD5-8B12-7145-9DAE-680EE985F5BE}" type="pres">
+      <dgm:prSet presAssocID="{DBD182B4-2D75-7A4F-A2FC-0AECAA3538EE}" presName="Name0" presStyleCnt="0">
+        <dgm:presLayoutVars>
+          <dgm:dir/>
+          <dgm:animLvl val="lvl"/>
+          <dgm:resizeHandles val="exact"/>
+        </dgm:presLayoutVars>
+      </dgm:prSet>
+      <dgm:spPr/>
+    </dgm:pt>
+    <dgm:pt modelId="{2385AA8C-01E5-C447-8408-591C1E7AB823}" type="pres">
+      <dgm:prSet presAssocID="{D2CFBD69-2FB3-6D45-8C1B-BA064B393CC7}" presName="parTxOnly" presStyleLbl="node1" presStyleIdx="0" presStyleCnt="7">
+        <dgm:presLayoutVars>
+          <dgm:chMax val="0"/>
+          <dgm:chPref val="0"/>
+          <dgm:bulletEnabled val="1"/>
+        </dgm:presLayoutVars>
+      </dgm:prSet>
+      <dgm:spPr/>
+    </dgm:pt>
+    <dgm:pt modelId="{D7E2257E-E3FD-1343-AA43-84C8047D48C1}" type="pres">
+      <dgm:prSet presAssocID="{DE3BAE38-9EF9-F244-8DD8-BD928019CF03}" presName="parTxOnlySpace" presStyleCnt="0"/>
+      <dgm:spPr/>
+    </dgm:pt>
+    <dgm:pt modelId="{C0DA22A5-07E1-3A44-AC0C-7D2B2F9D821F}" type="pres">
+      <dgm:prSet presAssocID="{7B95986C-2E8C-3D4C-805E-971490EAEA86}" presName="parTxOnly" presStyleLbl="node1" presStyleIdx="1" presStyleCnt="7">
+        <dgm:presLayoutVars>
+          <dgm:chMax val="0"/>
+          <dgm:chPref val="0"/>
+          <dgm:bulletEnabled val="1"/>
+        </dgm:presLayoutVars>
+      </dgm:prSet>
+      <dgm:spPr/>
+    </dgm:pt>
+    <dgm:pt modelId="{550B0F35-9299-5944-A29D-CC452234871F}" type="pres">
+      <dgm:prSet presAssocID="{A3C8433B-E34E-5341-AE71-EA76BFF62C36}" presName="parTxOnlySpace" presStyleCnt="0"/>
+      <dgm:spPr/>
+    </dgm:pt>
+    <dgm:pt modelId="{ACE174EE-5253-474D-A7AF-7CE3CFEF1B6C}" type="pres">
+      <dgm:prSet presAssocID="{8516B546-1B50-4B43-AE02-9D22AD937CC9}" presName="parTxOnly" presStyleLbl="node1" presStyleIdx="2" presStyleCnt="7">
+        <dgm:presLayoutVars>
+          <dgm:chMax val="0"/>
+          <dgm:chPref val="0"/>
+          <dgm:bulletEnabled val="1"/>
+        </dgm:presLayoutVars>
+      </dgm:prSet>
+      <dgm:spPr/>
+    </dgm:pt>
+    <dgm:pt modelId="{8F7E54E2-EE27-3248-B541-3EC92F4C3523}" type="pres">
+      <dgm:prSet presAssocID="{9691A920-B429-0144-A795-08EF36901925}" presName="parTxOnlySpace" presStyleCnt="0"/>
+      <dgm:spPr/>
+    </dgm:pt>
+    <dgm:pt modelId="{5196B369-1D89-534A-BD20-0D4E5DF12142}" type="pres">
+      <dgm:prSet presAssocID="{5DD2C8AB-388F-A746-A202-3904BF0262F7}" presName="parTxOnly" presStyleLbl="node1" presStyleIdx="3" presStyleCnt="7">
+        <dgm:presLayoutVars>
+          <dgm:chMax val="0"/>
+          <dgm:chPref val="0"/>
+          <dgm:bulletEnabled val="1"/>
+        </dgm:presLayoutVars>
+      </dgm:prSet>
+      <dgm:spPr/>
+    </dgm:pt>
+    <dgm:pt modelId="{815F031E-C6C0-B445-85AB-B9EFABD15D32}" type="pres">
+      <dgm:prSet presAssocID="{4D9210A1-8380-3646-AA27-57EE1963E295}" presName="parTxOnlySpace" presStyleCnt="0"/>
+      <dgm:spPr/>
+    </dgm:pt>
+    <dgm:pt modelId="{34B7E856-C735-CB40-92F1-F06A0471304D}" type="pres">
+      <dgm:prSet presAssocID="{BEBE266C-FD14-524F-9216-152B26164655}" presName="parTxOnly" presStyleLbl="node1" presStyleIdx="4" presStyleCnt="7">
+        <dgm:presLayoutVars>
+          <dgm:chMax val="0"/>
+          <dgm:chPref val="0"/>
+          <dgm:bulletEnabled val="1"/>
+        </dgm:presLayoutVars>
+      </dgm:prSet>
+      <dgm:spPr/>
+    </dgm:pt>
+    <dgm:pt modelId="{EB7B58A5-06B8-864C-BC3A-51116528A0C3}" type="pres">
+      <dgm:prSet presAssocID="{C2967FE7-9DCC-3443-A4F0-66AB57365CD9}" presName="parTxOnlySpace" presStyleCnt="0"/>
+      <dgm:spPr/>
+    </dgm:pt>
+    <dgm:pt modelId="{2D0BE300-8093-B042-847E-80E6EE923A39}" type="pres">
+      <dgm:prSet presAssocID="{7D45AC0C-1549-0445-9EF5-DF07189F47B5}" presName="parTxOnly" presStyleLbl="node1" presStyleIdx="5" presStyleCnt="7">
+        <dgm:presLayoutVars>
+          <dgm:chMax val="0"/>
+          <dgm:chPref val="0"/>
+          <dgm:bulletEnabled val="1"/>
+        </dgm:presLayoutVars>
+      </dgm:prSet>
+      <dgm:spPr/>
+    </dgm:pt>
+    <dgm:pt modelId="{5B307889-3F8B-7842-81D0-54E5D2BE400B}" type="pres">
+      <dgm:prSet presAssocID="{74D6E566-6CF9-364B-BFFF-915D9CE53E41}" presName="parTxOnlySpace" presStyleCnt="0"/>
+      <dgm:spPr/>
+    </dgm:pt>
+    <dgm:pt modelId="{AE6483A2-3D2B-5E4C-BF9B-8A40A65576A3}" type="pres">
+      <dgm:prSet presAssocID="{7137169A-9F5C-C14B-BBF6-DBF2565A6EDA}" presName="parTxOnly" presStyleLbl="node1" presStyleIdx="6" presStyleCnt="7">
+        <dgm:presLayoutVars>
+          <dgm:chMax val="0"/>
+          <dgm:chPref val="0"/>
+          <dgm:bulletEnabled val="1"/>
+        </dgm:presLayoutVars>
+      </dgm:prSet>
+      <dgm:spPr/>
+    </dgm:pt>
+  </dgm:ptLst>
+  <dgm:cxnLst>
+    <dgm:cxn modelId="{79A0450E-83B5-BF47-84C5-26F003A97FE5}" type="presOf" srcId="{8516B546-1B50-4B43-AE02-9D22AD937CC9}" destId="{ACE174EE-5253-474D-A7AF-7CE3CFEF1B6C}" srcOrd="0" destOrd="0" presId="urn:microsoft.com/office/officeart/2005/8/layout/chevron1"/>
+    <dgm:cxn modelId="{59F84E42-A8DE-F14F-8552-4FD2F049E46F}" type="presOf" srcId="{7D45AC0C-1549-0445-9EF5-DF07189F47B5}" destId="{2D0BE300-8093-B042-847E-80E6EE923A39}" srcOrd="0" destOrd="0" presId="urn:microsoft.com/office/officeart/2005/8/layout/chevron1"/>
+    <dgm:cxn modelId="{965D025E-6FB7-3843-8292-C8A9DD5B292C}" srcId="{DBD182B4-2D75-7A4F-A2FC-0AECAA3538EE}" destId="{D2CFBD69-2FB3-6D45-8C1B-BA064B393CC7}" srcOrd="0" destOrd="0" parTransId="{CB6B4915-E06E-1D47-8D54-3338BDDE1F72}" sibTransId="{DE3BAE38-9EF9-F244-8DD8-BD928019CF03}"/>
+    <dgm:cxn modelId="{FFACE45E-F600-4548-8DE4-33A878484220}" srcId="{DBD182B4-2D75-7A4F-A2FC-0AECAA3538EE}" destId="{8516B546-1B50-4B43-AE02-9D22AD937CC9}" srcOrd="2" destOrd="0" parTransId="{53772A7C-480A-0247-BC7C-94204D912AE6}" sibTransId="{9691A920-B429-0144-A795-08EF36901925}"/>
+    <dgm:cxn modelId="{48437865-4F69-E54B-8B4E-846C79D6B69B}" type="presOf" srcId="{BEBE266C-FD14-524F-9216-152B26164655}" destId="{34B7E856-C735-CB40-92F1-F06A0471304D}" srcOrd="0" destOrd="0" presId="urn:microsoft.com/office/officeart/2005/8/layout/chevron1"/>
+    <dgm:cxn modelId="{D431AE79-8596-0F4B-9AB2-338FB8CCEB9A}" srcId="{DBD182B4-2D75-7A4F-A2FC-0AECAA3538EE}" destId="{5DD2C8AB-388F-A746-A202-3904BF0262F7}" srcOrd="3" destOrd="0" parTransId="{174160FA-8093-EC4F-B150-81626241BFB4}" sibTransId="{4D9210A1-8380-3646-AA27-57EE1963E295}"/>
+    <dgm:cxn modelId="{2A40FB88-11A7-FC4F-97A7-1551C5E342DE}" type="presOf" srcId="{5DD2C8AB-388F-A746-A202-3904BF0262F7}" destId="{5196B369-1D89-534A-BD20-0D4E5DF12142}" srcOrd="0" destOrd="0" presId="urn:microsoft.com/office/officeart/2005/8/layout/chevron1"/>
+    <dgm:cxn modelId="{62C09A8F-42CF-1241-9B70-EB9EE2330FD8}" type="presOf" srcId="{7B95986C-2E8C-3D4C-805E-971490EAEA86}" destId="{C0DA22A5-07E1-3A44-AC0C-7D2B2F9D821F}" srcOrd="0" destOrd="0" presId="urn:microsoft.com/office/officeart/2005/8/layout/chevron1"/>
+    <dgm:cxn modelId="{EE8EDE9A-4782-D244-9709-A8363757982E}" type="presOf" srcId="{D2CFBD69-2FB3-6D45-8C1B-BA064B393CC7}" destId="{2385AA8C-01E5-C447-8408-591C1E7AB823}" srcOrd="0" destOrd="0" presId="urn:microsoft.com/office/officeart/2005/8/layout/chevron1"/>
+    <dgm:cxn modelId="{E626A29B-4A7D-214F-98D4-339183511ECD}" srcId="{DBD182B4-2D75-7A4F-A2FC-0AECAA3538EE}" destId="{7137169A-9F5C-C14B-BBF6-DBF2565A6EDA}" srcOrd="6" destOrd="0" parTransId="{B4E14A10-42C1-154F-9F34-F7AD4A68004D}" sibTransId="{768AD082-9CC0-B64E-BB0D-BDFC361AD6FA}"/>
+    <dgm:cxn modelId="{3D1F61A1-6FD4-A349-8119-C70CAEA01CF2}" type="presOf" srcId="{7137169A-9F5C-C14B-BBF6-DBF2565A6EDA}" destId="{AE6483A2-3D2B-5E4C-BF9B-8A40A65576A3}" srcOrd="0" destOrd="0" presId="urn:microsoft.com/office/officeart/2005/8/layout/chevron1"/>
+    <dgm:cxn modelId="{6C9CF2B5-D47F-7845-9E0B-44F11393529E}" type="presOf" srcId="{DBD182B4-2D75-7A4F-A2FC-0AECAA3538EE}" destId="{787F3AD5-8B12-7145-9DAE-680EE985F5BE}" srcOrd="0" destOrd="0" presId="urn:microsoft.com/office/officeart/2005/8/layout/chevron1"/>
+    <dgm:cxn modelId="{326255C0-78F6-E644-8DFE-60127613BFDF}" srcId="{DBD182B4-2D75-7A4F-A2FC-0AECAA3538EE}" destId="{BEBE266C-FD14-524F-9216-152B26164655}" srcOrd="4" destOrd="0" parTransId="{0E6563E2-25F9-AA47-930F-BED666372518}" sibTransId="{C2967FE7-9DCC-3443-A4F0-66AB57365CD9}"/>
+    <dgm:cxn modelId="{EF64DFD6-FEC3-8D49-A1B7-3C2ED5B647F6}" srcId="{DBD182B4-2D75-7A4F-A2FC-0AECAA3538EE}" destId="{7B95986C-2E8C-3D4C-805E-971490EAEA86}" srcOrd="1" destOrd="0" parTransId="{AC2F641D-9D76-C14D-88E1-CFB4C0A10DA6}" sibTransId="{A3C8433B-E34E-5341-AE71-EA76BFF62C36}"/>
+    <dgm:cxn modelId="{0B8C4DEA-B9FB-D540-B251-BCDB9BF6B25E}" srcId="{DBD182B4-2D75-7A4F-A2FC-0AECAA3538EE}" destId="{7D45AC0C-1549-0445-9EF5-DF07189F47B5}" srcOrd="5" destOrd="0" parTransId="{4C77031D-D952-BC45-97A3-847F2CCFA9EA}" sibTransId="{74D6E566-6CF9-364B-BFFF-915D9CE53E41}"/>
+    <dgm:cxn modelId="{FDC7E14B-04F4-094D-8529-B6F22D0CC082}" type="presParOf" srcId="{787F3AD5-8B12-7145-9DAE-680EE985F5BE}" destId="{2385AA8C-01E5-C447-8408-591C1E7AB823}" srcOrd="0" destOrd="0" presId="urn:microsoft.com/office/officeart/2005/8/layout/chevron1"/>
+    <dgm:cxn modelId="{DA170CBE-C927-5C43-8A2B-868F79646A52}" type="presParOf" srcId="{787F3AD5-8B12-7145-9DAE-680EE985F5BE}" destId="{D7E2257E-E3FD-1343-AA43-84C8047D48C1}" srcOrd="1" destOrd="0" presId="urn:microsoft.com/office/officeart/2005/8/layout/chevron1"/>
+    <dgm:cxn modelId="{F4CBAE18-E85E-AF48-B38D-D42BE2883900}" type="presParOf" srcId="{787F3AD5-8B12-7145-9DAE-680EE985F5BE}" destId="{C0DA22A5-07E1-3A44-AC0C-7D2B2F9D821F}" srcOrd="2" destOrd="0" presId="urn:microsoft.com/office/officeart/2005/8/layout/chevron1"/>
+    <dgm:cxn modelId="{1880ACF9-93A9-434D-B483-16602B37D71E}" type="presParOf" srcId="{787F3AD5-8B12-7145-9DAE-680EE985F5BE}" destId="{550B0F35-9299-5944-A29D-CC452234871F}" srcOrd="3" destOrd="0" presId="urn:microsoft.com/office/officeart/2005/8/layout/chevron1"/>
+    <dgm:cxn modelId="{86C3F5AB-572C-6C45-B6AB-CCBA3AAA0E2A}" type="presParOf" srcId="{787F3AD5-8B12-7145-9DAE-680EE985F5BE}" destId="{ACE174EE-5253-474D-A7AF-7CE3CFEF1B6C}" srcOrd="4" destOrd="0" presId="urn:microsoft.com/office/officeart/2005/8/layout/chevron1"/>
+    <dgm:cxn modelId="{27D9BEB7-9AC4-6847-A39A-03246CABDB5A}" type="presParOf" srcId="{787F3AD5-8B12-7145-9DAE-680EE985F5BE}" destId="{8F7E54E2-EE27-3248-B541-3EC92F4C3523}" srcOrd="5" destOrd="0" presId="urn:microsoft.com/office/officeart/2005/8/layout/chevron1"/>
+    <dgm:cxn modelId="{D21ADC40-EED5-A640-B82F-47F47115FB30}" type="presParOf" srcId="{787F3AD5-8B12-7145-9DAE-680EE985F5BE}" destId="{5196B369-1D89-534A-BD20-0D4E5DF12142}" srcOrd="6" destOrd="0" presId="urn:microsoft.com/office/officeart/2005/8/layout/chevron1"/>
+    <dgm:cxn modelId="{277728A8-4AEB-9D43-87E7-6E807684F3F3}" type="presParOf" srcId="{787F3AD5-8B12-7145-9DAE-680EE985F5BE}" destId="{815F031E-C6C0-B445-85AB-B9EFABD15D32}" srcOrd="7" destOrd="0" presId="urn:microsoft.com/office/officeart/2005/8/layout/chevron1"/>
+    <dgm:cxn modelId="{2AD87153-09E9-5745-BBBC-F2D6ECBACCEB}" type="presParOf" srcId="{787F3AD5-8B12-7145-9DAE-680EE985F5BE}" destId="{34B7E856-C735-CB40-92F1-F06A0471304D}" srcOrd="8" destOrd="0" presId="urn:microsoft.com/office/officeart/2005/8/layout/chevron1"/>
+    <dgm:cxn modelId="{7854AADA-0C86-DB40-8310-649C8E8ED5CC}" type="presParOf" srcId="{787F3AD5-8B12-7145-9DAE-680EE985F5BE}" destId="{EB7B58A5-06B8-864C-BC3A-51116528A0C3}" srcOrd="9" destOrd="0" presId="urn:microsoft.com/office/officeart/2005/8/layout/chevron1"/>
+    <dgm:cxn modelId="{8D5B010F-3D4B-EB4B-BE7D-40B61576F0DB}" type="presParOf" srcId="{787F3AD5-8B12-7145-9DAE-680EE985F5BE}" destId="{2D0BE300-8093-B042-847E-80E6EE923A39}" srcOrd="10" destOrd="0" presId="urn:microsoft.com/office/officeart/2005/8/layout/chevron1"/>
+    <dgm:cxn modelId="{217CB1B9-BDA9-2F4C-B16F-0C2ED323C578}" type="presParOf" srcId="{787F3AD5-8B12-7145-9DAE-680EE985F5BE}" destId="{5B307889-3F8B-7842-81D0-54E5D2BE400B}" srcOrd="11" destOrd="0" presId="urn:microsoft.com/office/officeart/2005/8/layout/chevron1"/>
+    <dgm:cxn modelId="{0FA3DBB6-DE6C-6547-9F65-1786103449FF}" type="presParOf" srcId="{787F3AD5-8B12-7145-9DAE-680EE985F5BE}" destId="{AE6483A2-3D2B-5E4C-BF9B-8A40A65576A3}" srcOrd="12" destOrd="0" presId="urn:microsoft.com/office/officeart/2005/8/layout/chevron1"/>
+  </dgm:cxnLst>
+  <dgm:bg/>
+  <dgm:whole/>
+  <dgm:extLst>
+    <a:ext uri="http://schemas.microsoft.com/office/drawing/2008/diagram">
+      <dsp:dataModelExt xmlns:dsp="http://schemas.microsoft.com/office/drawing/2008/diagram" relId="rId6" minVer="http://schemas.openxmlformats.org/drawingml/2006/diagram"/>
+    </a:ext>
+  </dgm:extLst>
+</dgm:dataModel>
+</file>
+
+<file path=ppt/diagrams/data2.xml><?xml version="1.0" encoding="utf-8"?>
 <dgm:dataModel xmlns:dgm="http://schemas.openxmlformats.org/drawingml/2006/diagram" xmlns:a="http://schemas.openxmlformats.org/drawingml/2006/main">
   <dgm:ptLst>
     <dgm:pt modelId="{DBD182B4-2D75-7A4F-A2FC-0AECAA3538EE}" type="doc">
@@ -1298,6 +2591,574 @@
 </file>
 
 <file path=ppt/diagrams/drawing1.xml><?xml version="1.0" encoding="utf-8"?>
+<dsp:drawing xmlns:dgm="http://schemas.openxmlformats.org/drawingml/2006/diagram" xmlns:dsp="http://schemas.microsoft.com/office/drawing/2008/diagram" xmlns:a="http://schemas.openxmlformats.org/drawingml/2006/main">
+  <dsp:spTree>
+    <dsp:nvGrpSpPr>
+      <dsp:cNvPr id="0" name=""/>
+      <dsp:cNvGrpSpPr/>
+    </dsp:nvGrpSpPr>
+    <dsp:grpSpPr/>
+    <dsp:sp modelId="{2385AA8C-01E5-C447-8408-591C1E7AB823}">
+      <dsp:nvSpPr>
+        <dsp:cNvPr id="0" name=""/>
+        <dsp:cNvSpPr/>
+      </dsp:nvSpPr>
+      <dsp:spPr>
+        <a:xfrm>
+          <a:off x="0" y="2418184"/>
+          <a:ext cx="1819376" cy="727750"/>
+        </a:xfrm>
+        <a:prstGeom prst="chevron">
+          <a:avLst/>
+        </a:prstGeom>
+        <a:solidFill>
+          <a:schemeClr val="accent1">
+            <a:alpha val="90000"/>
+            <a:hueOff val="0"/>
+            <a:satOff val="0"/>
+            <a:lumOff val="0"/>
+            <a:alphaOff val="0"/>
+          </a:schemeClr>
+        </a:solidFill>
+        <a:ln w="12700" cap="flat" cmpd="sng" algn="ctr">
+          <a:solidFill>
+            <a:schemeClr val="lt1">
+              <a:hueOff val="0"/>
+              <a:satOff val="0"/>
+              <a:lumOff val="0"/>
+              <a:alphaOff val="0"/>
+            </a:schemeClr>
+          </a:solidFill>
+          <a:prstDash val="solid"/>
+          <a:miter lim="800000"/>
+        </a:ln>
+        <a:effectLst/>
+      </dsp:spPr>
+      <dsp:style>
+        <a:lnRef idx="2">
+          <a:scrgbClr r="0" g="0" b="0"/>
+        </a:lnRef>
+        <a:fillRef idx="1">
+          <a:scrgbClr r="0" g="0" b="0"/>
+        </a:fillRef>
+        <a:effectRef idx="0">
+          <a:scrgbClr r="0" g="0" b="0"/>
+        </a:effectRef>
+        <a:fontRef idx="minor">
+          <a:schemeClr val="lt1"/>
+        </a:fontRef>
+      </dsp:style>
+      <dsp:txBody>
+        <a:bodyPr spcFirstLastPara="0" vert="horz" wrap="square" lIns="52007" tIns="17336" rIns="17336" bIns="17336" numCol="1" spcCol="1270" anchor="ctr" anchorCtr="0">
+          <a:noAutofit/>
+        </a:bodyPr>
+        <a:lstStyle/>
+        <a:p>
+          <a:pPr marL="0" lvl="0" indent="0" algn="ctr" defTabSz="577850">
+            <a:lnSpc>
+              <a:spcPct val="90000"/>
+            </a:lnSpc>
+            <a:spcBef>
+              <a:spcPct val="0"/>
+            </a:spcBef>
+            <a:spcAft>
+              <a:spcPct val="35000"/>
+            </a:spcAft>
+            <a:buNone/>
+          </a:pPr>
+          <a:r>
+            <a:rPr lang="en-US" sz="1300" b="0" i="0" u="none" kern="1200" dirty="0"/>
+            <a:t>Understanding Requirements &amp; Domain</a:t>
+          </a:r>
+          <a:endParaRPr lang="en-US" sz="1300" kern="1200" dirty="0"/>
+        </a:p>
+      </dsp:txBody>
+      <dsp:txXfrm>
+        <a:off x="363875" y="2418184"/>
+        <a:ext cx="1091626" cy="727750"/>
+      </dsp:txXfrm>
+    </dsp:sp>
+    <dsp:sp modelId="{C0DA22A5-07E1-3A44-AC0C-7D2B2F9D821F}">
+      <dsp:nvSpPr>
+        <dsp:cNvPr id="0" name=""/>
+        <dsp:cNvSpPr/>
+      </dsp:nvSpPr>
+      <dsp:spPr>
+        <a:xfrm>
+          <a:off x="1637438" y="2418184"/>
+          <a:ext cx="1819376" cy="727750"/>
+        </a:xfrm>
+        <a:prstGeom prst="chevron">
+          <a:avLst/>
+        </a:prstGeom>
+        <a:solidFill>
+          <a:schemeClr val="accent1">
+            <a:alpha val="90000"/>
+            <a:hueOff val="0"/>
+            <a:satOff val="0"/>
+            <a:lumOff val="0"/>
+            <a:alphaOff val="-6667"/>
+          </a:schemeClr>
+        </a:solidFill>
+        <a:ln w="12700" cap="flat" cmpd="sng" algn="ctr">
+          <a:solidFill>
+            <a:schemeClr val="lt1">
+              <a:hueOff val="0"/>
+              <a:satOff val="0"/>
+              <a:lumOff val="0"/>
+              <a:alphaOff val="0"/>
+            </a:schemeClr>
+          </a:solidFill>
+          <a:prstDash val="solid"/>
+          <a:miter lim="800000"/>
+        </a:ln>
+        <a:effectLst/>
+      </dsp:spPr>
+      <dsp:style>
+        <a:lnRef idx="2">
+          <a:scrgbClr r="0" g="0" b="0"/>
+        </a:lnRef>
+        <a:fillRef idx="1">
+          <a:scrgbClr r="0" g="0" b="0"/>
+        </a:fillRef>
+        <a:effectRef idx="0">
+          <a:scrgbClr r="0" g="0" b="0"/>
+        </a:effectRef>
+        <a:fontRef idx="minor">
+          <a:schemeClr val="lt1"/>
+        </a:fontRef>
+      </dsp:style>
+      <dsp:txBody>
+        <a:bodyPr spcFirstLastPara="0" vert="horz" wrap="square" lIns="52007" tIns="17336" rIns="17336" bIns="17336" numCol="1" spcCol="1270" anchor="ctr" anchorCtr="0">
+          <a:noAutofit/>
+        </a:bodyPr>
+        <a:lstStyle/>
+        <a:p>
+          <a:pPr marL="0" lvl="0" indent="0" algn="ctr" defTabSz="577850">
+            <a:lnSpc>
+              <a:spcPct val="90000"/>
+            </a:lnSpc>
+            <a:spcBef>
+              <a:spcPct val="0"/>
+            </a:spcBef>
+            <a:spcAft>
+              <a:spcPct val="35000"/>
+            </a:spcAft>
+            <a:buNone/>
+          </a:pPr>
+          <a:r>
+            <a:rPr lang="en-US" sz="1300" b="0" i="0" u="none" kern="1200" dirty="0"/>
+            <a:t>Data Set-up &amp; Validation</a:t>
+          </a:r>
+          <a:endParaRPr lang="en-US" sz="1300" kern="1200" dirty="0"/>
+        </a:p>
+      </dsp:txBody>
+      <dsp:txXfrm>
+        <a:off x="2001313" y="2418184"/>
+        <a:ext cx="1091626" cy="727750"/>
+      </dsp:txXfrm>
+    </dsp:sp>
+    <dsp:sp modelId="{ACE174EE-5253-474D-A7AF-7CE3CFEF1B6C}">
+      <dsp:nvSpPr>
+        <dsp:cNvPr id="0" name=""/>
+        <dsp:cNvSpPr/>
+      </dsp:nvSpPr>
+      <dsp:spPr>
+        <a:xfrm>
+          <a:off x="3274877" y="2418184"/>
+          <a:ext cx="1819376" cy="727750"/>
+        </a:xfrm>
+        <a:prstGeom prst="chevron">
+          <a:avLst/>
+        </a:prstGeom>
+        <a:solidFill>
+          <a:schemeClr val="accent1">
+            <a:alpha val="90000"/>
+            <a:hueOff val="0"/>
+            <a:satOff val="0"/>
+            <a:lumOff val="0"/>
+            <a:alphaOff val="-13333"/>
+          </a:schemeClr>
+        </a:solidFill>
+        <a:ln w="12700" cap="flat" cmpd="sng" algn="ctr">
+          <a:solidFill>
+            <a:schemeClr val="lt1">
+              <a:hueOff val="0"/>
+              <a:satOff val="0"/>
+              <a:lumOff val="0"/>
+              <a:alphaOff val="0"/>
+            </a:schemeClr>
+          </a:solidFill>
+          <a:prstDash val="solid"/>
+          <a:miter lim="800000"/>
+        </a:ln>
+        <a:effectLst/>
+      </dsp:spPr>
+      <dsp:style>
+        <a:lnRef idx="2">
+          <a:scrgbClr r="0" g="0" b="0"/>
+        </a:lnRef>
+        <a:fillRef idx="1">
+          <a:scrgbClr r="0" g="0" b="0"/>
+        </a:fillRef>
+        <a:effectRef idx="0">
+          <a:scrgbClr r="0" g="0" b="0"/>
+        </a:effectRef>
+        <a:fontRef idx="minor">
+          <a:schemeClr val="lt1"/>
+        </a:fontRef>
+      </dsp:style>
+      <dsp:txBody>
+        <a:bodyPr spcFirstLastPara="0" vert="horz" wrap="square" lIns="52007" tIns="17336" rIns="17336" bIns="17336" numCol="1" spcCol="1270" anchor="ctr" anchorCtr="0">
+          <a:noAutofit/>
+        </a:bodyPr>
+        <a:lstStyle/>
+        <a:p>
+          <a:pPr marL="0" lvl="0" indent="0" algn="ctr" defTabSz="577850">
+            <a:lnSpc>
+              <a:spcPct val="90000"/>
+            </a:lnSpc>
+            <a:spcBef>
+              <a:spcPct val="0"/>
+            </a:spcBef>
+            <a:spcAft>
+              <a:spcPct val="35000"/>
+            </a:spcAft>
+            <a:buNone/>
+          </a:pPr>
+          <a:r>
+            <a:rPr lang="en-US" sz="1300" b="0" i="0" u="none" kern="1200" dirty="0"/>
+            <a:t>EDA</a:t>
+          </a:r>
+          <a:endParaRPr lang="en-US" sz="1300" kern="1200" dirty="0"/>
+        </a:p>
+      </dsp:txBody>
+      <dsp:txXfrm>
+        <a:off x="3638752" y="2418184"/>
+        <a:ext cx="1091626" cy="727750"/>
+      </dsp:txXfrm>
+    </dsp:sp>
+    <dsp:sp modelId="{5196B369-1D89-534A-BD20-0D4E5DF12142}">
+      <dsp:nvSpPr>
+        <dsp:cNvPr id="0" name=""/>
+        <dsp:cNvSpPr/>
+      </dsp:nvSpPr>
+      <dsp:spPr>
+        <a:xfrm>
+          <a:off x="4912315" y="2418184"/>
+          <a:ext cx="1819376" cy="727750"/>
+        </a:xfrm>
+        <a:prstGeom prst="chevron">
+          <a:avLst/>
+        </a:prstGeom>
+        <a:solidFill>
+          <a:schemeClr val="accent1">
+            <a:alpha val="90000"/>
+            <a:hueOff val="0"/>
+            <a:satOff val="0"/>
+            <a:lumOff val="0"/>
+            <a:alphaOff val="-20000"/>
+          </a:schemeClr>
+        </a:solidFill>
+        <a:ln w="12700" cap="flat" cmpd="sng" algn="ctr">
+          <a:solidFill>
+            <a:schemeClr val="lt1">
+              <a:hueOff val="0"/>
+              <a:satOff val="0"/>
+              <a:lumOff val="0"/>
+              <a:alphaOff val="0"/>
+            </a:schemeClr>
+          </a:solidFill>
+          <a:prstDash val="solid"/>
+          <a:miter lim="800000"/>
+        </a:ln>
+        <a:effectLst/>
+      </dsp:spPr>
+      <dsp:style>
+        <a:lnRef idx="2">
+          <a:scrgbClr r="0" g="0" b="0"/>
+        </a:lnRef>
+        <a:fillRef idx="1">
+          <a:scrgbClr r="0" g="0" b="0"/>
+        </a:fillRef>
+        <a:effectRef idx="0">
+          <a:scrgbClr r="0" g="0" b="0"/>
+        </a:effectRef>
+        <a:fontRef idx="minor">
+          <a:schemeClr val="lt1"/>
+        </a:fontRef>
+      </dsp:style>
+      <dsp:txBody>
+        <a:bodyPr spcFirstLastPara="0" vert="horz" wrap="square" lIns="52007" tIns="17336" rIns="17336" bIns="17336" numCol="1" spcCol="1270" anchor="ctr" anchorCtr="0">
+          <a:noAutofit/>
+        </a:bodyPr>
+        <a:lstStyle/>
+        <a:p>
+          <a:pPr marL="0" lvl="0" indent="0" algn="ctr" defTabSz="577850">
+            <a:lnSpc>
+              <a:spcPct val="90000"/>
+            </a:lnSpc>
+            <a:spcBef>
+              <a:spcPct val="0"/>
+            </a:spcBef>
+            <a:spcAft>
+              <a:spcPct val="35000"/>
+            </a:spcAft>
+            <a:buNone/>
+          </a:pPr>
+          <a:r>
+            <a:rPr lang="en-US" sz="1300" kern="1200" dirty="0"/>
+            <a:t>Feature Engineering</a:t>
+          </a:r>
+        </a:p>
+      </dsp:txBody>
+      <dsp:txXfrm>
+        <a:off x="5276190" y="2418184"/>
+        <a:ext cx="1091626" cy="727750"/>
+      </dsp:txXfrm>
+    </dsp:sp>
+    <dsp:sp modelId="{34B7E856-C735-CB40-92F1-F06A0471304D}">
+      <dsp:nvSpPr>
+        <dsp:cNvPr id="0" name=""/>
+        <dsp:cNvSpPr/>
+      </dsp:nvSpPr>
+      <dsp:spPr>
+        <a:xfrm>
+          <a:off x="6549754" y="2418184"/>
+          <a:ext cx="1819376" cy="727750"/>
+        </a:xfrm>
+        <a:prstGeom prst="chevron">
+          <a:avLst/>
+        </a:prstGeom>
+        <a:solidFill>
+          <a:schemeClr val="accent1">
+            <a:alpha val="90000"/>
+            <a:hueOff val="0"/>
+            <a:satOff val="0"/>
+            <a:lumOff val="0"/>
+            <a:alphaOff val="-26667"/>
+          </a:schemeClr>
+        </a:solidFill>
+        <a:ln w="12700" cap="flat" cmpd="sng" algn="ctr">
+          <a:solidFill>
+            <a:schemeClr val="lt1">
+              <a:hueOff val="0"/>
+              <a:satOff val="0"/>
+              <a:lumOff val="0"/>
+              <a:alphaOff val="0"/>
+            </a:schemeClr>
+          </a:solidFill>
+          <a:prstDash val="solid"/>
+          <a:miter lim="800000"/>
+        </a:ln>
+        <a:effectLst/>
+      </dsp:spPr>
+      <dsp:style>
+        <a:lnRef idx="2">
+          <a:scrgbClr r="0" g="0" b="0"/>
+        </a:lnRef>
+        <a:fillRef idx="1">
+          <a:scrgbClr r="0" g="0" b="0"/>
+        </a:fillRef>
+        <a:effectRef idx="0">
+          <a:scrgbClr r="0" g="0" b="0"/>
+        </a:effectRef>
+        <a:fontRef idx="minor">
+          <a:schemeClr val="lt1"/>
+        </a:fontRef>
+      </dsp:style>
+      <dsp:txBody>
+        <a:bodyPr spcFirstLastPara="0" vert="horz" wrap="square" lIns="52007" tIns="17336" rIns="17336" bIns="17336" numCol="1" spcCol="1270" anchor="ctr" anchorCtr="0">
+          <a:noAutofit/>
+        </a:bodyPr>
+        <a:lstStyle/>
+        <a:p>
+          <a:pPr marL="0" lvl="0" indent="0" algn="ctr" defTabSz="577850">
+            <a:lnSpc>
+              <a:spcPct val="90000"/>
+            </a:lnSpc>
+            <a:spcBef>
+              <a:spcPct val="0"/>
+            </a:spcBef>
+            <a:spcAft>
+              <a:spcPct val="35000"/>
+            </a:spcAft>
+            <a:buNone/>
+          </a:pPr>
+          <a:r>
+            <a:rPr lang="en-US" sz="1300" kern="1200" dirty="0"/>
+            <a:t>Model Set-up &amp; Training</a:t>
+          </a:r>
+        </a:p>
+      </dsp:txBody>
+      <dsp:txXfrm>
+        <a:off x="6913629" y="2418184"/>
+        <a:ext cx="1091626" cy="727750"/>
+      </dsp:txXfrm>
+    </dsp:sp>
+    <dsp:sp modelId="{2D0BE300-8093-B042-847E-80E6EE923A39}">
+      <dsp:nvSpPr>
+        <dsp:cNvPr id="0" name=""/>
+        <dsp:cNvSpPr/>
+      </dsp:nvSpPr>
+      <dsp:spPr>
+        <a:xfrm>
+          <a:off x="8187193" y="2418184"/>
+          <a:ext cx="1819376" cy="727750"/>
+        </a:xfrm>
+        <a:prstGeom prst="chevron">
+          <a:avLst/>
+        </a:prstGeom>
+        <a:solidFill>
+          <a:schemeClr val="accent1">
+            <a:alpha val="90000"/>
+            <a:hueOff val="0"/>
+            <a:satOff val="0"/>
+            <a:lumOff val="0"/>
+            <a:alphaOff val="-33333"/>
+          </a:schemeClr>
+        </a:solidFill>
+        <a:ln w="12700" cap="flat" cmpd="sng" algn="ctr">
+          <a:solidFill>
+            <a:schemeClr val="lt1">
+              <a:hueOff val="0"/>
+              <a:satOff val="0"/>
+              <a:lumOff val="0"/>
+              <a:alphaOff val="0"/>
+            </a:schemeClr>
+          </a:solidFill>
+          <a:prstDash val="solid"/>
+          <a:miter lim="800000"/>
+        </a:ln>
+        <a:effectLst/>
+      </dsp:spPr>
+      <dsp:style>
+        <a:lnRef idx="2">
+          <a:scrgbClr r="0" g="0" b="0"/>
+        </a:lnRef>
+        <a:fillRef idx="1">
+          <a:scrgbClr r="0" g="0" b="0"/>
+        </a:fillRef>
+        <a:effectRef idx="0">
+          <a:scrgbClr r="0" g="0" b="0"/>
+        </a:effectRef>
+        <a:fontRef idx="minor">
+          <a:schemeClr val="lt1"/>
+        </a:fontRef>
+      </dsp:style>
+      <dsp:txBody>
+        <a:bodyPr spcFirstLastPara="0" vert="horz" wrap="square" lIns="52007" tIns="17336" rIns="17336" bIns="17336" numCol="1" spcCol="1270" anchor="ctr" anchorCtr="0">
+          <a:noAutofit/>
+        </a:bodyPr>
+        <a:lstStyle/>
+        <a:p>
+          <a:pPr marL="0" lvl="0" indent="0" algn="ctr" defTabSz="577850">
+            <a:lnSpc>
+              <a:spcPct val="90000"/>
+            </a:lnSpc>
+            <a:spcBef>
+              <a:spcPct val="0"/>
+            </a:spcBef>
+            <a:spcAft>
+              <a:spcPct val="35000"/>
+            </a:spcAft>
+            <a:buNone/>
+          </a:pPr>
+          <a:r>
+            <a:rPr lang="en-US" sz="1300" kern="1200" dirty="0"/>
+            <a:t>Model Evaluation</a:t>
+          </a:r>
+        </a:p>
+      </dsp:txBody>
+      <dsp:txXfrm>
+        <a:off x="8551068" y="2418184"/>
+        <a:ext cx="1091626" cy="727750"/>
+      </dsp:txXfrm>
+    </dsp:sp>
+    <dsp:sp modelId="{AE6483A2-3D2B-5E4C-BF9B-8A40A65576A3}">
+      <dsp:nvSpPr>
+        <dsp:cNvPr id="0" name=""/>
+        <dsp:cNvSpPr/>
+      </dsp:nvSpPr>
+      <dsp:spPr>
+        <a:xfrm>
+          <a:off x="9824631" y="2418184"/>
+          <a:ext cx="1819376" cy="727750"/>
+        </a:xfrm>
+        <a:prstGeom prst="chevron">
+          <a:avLst/>
+        </a:prstGeom>
+        <a:solidFill>
+          <a:schemeClr val="accent1">
+            <a:alpha val="90000"/>
+            <a:hueOff val="0"/>
+            <a:satOff val="0"/>
+            <a:lumOff val="0"/>
+            <a:alphaOff val="-40000"/>
+          </a:schemeClr>
+        </a:solidFill>
+        <a:ln w="12700" cap="flat" cmpd="sng" algn="ctr">
+          <a:solidFill>
+            <a:schemeClr val="lt1">
+              <a:hueOff val="0"/>
+              <a:satOff val="0"/>
+              <a:lumOff val="0"/>
+              <a:alphaOff val="0"/>
+            </a:schemeClr>
+          </a:solidFill>
+          <a:prstDash val="solid"/>
+          <a:miter lim="800000"/>
+        </a:ln>
+        <a:effectLst/>
+      </dsp:spPr>
+      <dsp:style>
+        <a:lnRef idx="2">
+          <a:scrgbClr r="0" g="0" b="0"/>
+        </a:lnRef>
+        <a:fillRef idx="1">
+          <a:scrgbClr r="0" g="0" b="0"/>
+        </a:fillRef>
+        <a:effectRef idx="0">
+          <a:scrgbClr r="0" g="0" b="0"/>
+        </a:effectRef>
+        <a:fontRef idx="minor">
+          <a:schemeClr val="lt1"/>
+        </a:fontRef>
+      </dsp:style>
+      <dsp:txBody>
+        <a:bodyPr spcFirstLastPara="0" vert="horz" wrap="square" lIns="52007" tIns="17336" rIns="17336" bIns="17336" numCol="1" spcCol="1270" anchor="ctr" anchorCtr="0">
+          <a:noAutofit/>
+        </a:bodyPr>
+        <a:lstStyle/>
+        <a:p>
+          <a:pPr marL="0" lvl="0" indent="0" algn="ctr" defTabSz="577850">
+            <a:lnSpc>
+              <a:spcPct val="90000"/>
+            </a:lnSpc>
+            <a:spcBef>
+              <a:spcPct val="0"/>
+            </a:spcBef>
+            <a:spcAft>
+              <a:spcPct val="35000"/>
+            </a:spcAft>
+            <a:buNone/>
+          </a:pPr>
+          <a:r>
+            <a:rPr lang="en-US" sz="1300" kern="1200" dirty="0"/>
+            <a:t>Kaggle Submission</a:t>
+          </a:r>
+        </a:p>
+      </dsp:txBody>
+      <dsp:txXfrm>
+        <a:off x="10188506" y="2418184"/>
+        <a:ext cx="1091626" cy="727750"/>
+      </dsp:txXfrm>
+    </dsp:sp>
+  </dsp:spTree>
+</dsp:drawing>
+</file>
+
+<file path=ppt/diagrams/drawing2.xml><?xml version="1.0" encoding="utf-8"?>
 <dsp:drawing xmlns:dgm="http://schemas.openxmlformats.org/drawingml/2006/diagram" xmlns:dsp="http://schemas.microsoft.com/office/drawing/2008/diagram" xmlns:a="http://schemas.openxmlformats.org/drawingml/2006/main">
   <dsp:spTree>
     <dsp:nvGrpSpPr>
@@ -2141,7 +4002,1324 @@
 </dgm:layoutDef>
 </file>
 
+<file path=ppt/diagrams/layout2.xml><?xml version="1.0" encoding="utf-8"?>
+<dgm:layoutDef xmlns:dgm="http://schemas.openxmlformats.org/drawingml/2006/diagram" xmlns:a="http://schemas.openxmlformats.org/drawingml/2006/main" uniqueId="urn:microsoft.com/office/officeart/2005/8/layout/chevron1">
+  <dgm:title val=""/>
+  <dgm:desc val=""/>
+  <dgm:catLst>
+    <dgm:cat type="process" pri="9000"/>
+  </dgm:catLst>
+  <dgm:sampData useDef="1">
+    <dgm:dataModel>
+      <dgm:ptLst/>
+      <dgm:bg/>
+      <dgm:whole/>
+    </dgm:dataModel>
+  </dgm:sampData>
+  <dgm:styleData>
+    <dgm:dataModel>
+      <dgm:ptLst>
+        <dgm:pt modelId="0" type="doc"/>
+        <dgm:pt modelId="1"/>
+        <dgm:pt modelId="2"/>
+      </dgm:ptLst>
+      <dgm:cxnLst>
+        <dgm:cxn modelId="3" srcId="0" destId="1" srcOrd="0" destOrd="0"/>
+        <dgm:cxn modelId="4" srcId="0" destId="2" srcOrd="1" destOrd="0"/>
+      </dgm:cxnLst>
+      <dgm:bg/>
+      <dgm:whole/>
+    </dgm:dataModel>
+  </dgm:styleData>
+  <dgm:clrData>
+    <dgm:dataModel>
+      <dgm:ptLst>
+        <dgm:pt modelId="0" type="doc"/>
+        <dgm:pt modelId="1"/>
+        <dgm:pt modelId="2"/>
+        <dgm:pt modelId="3"/>
+        <dgm:pt modelId="4"/>
+      </dgm:ptLst>
+      <dgm:cxnLst>
+        <dgm:cxn modelId="5" srcId="0" destId="1" srcOrd="0" destOrd="0"/>
+        <dgm:cxn modelId="6" srcId="0" destId="2" srcOrd="1" destOrd="0"/>
+        <dgm:cxn modelId="7" srcId="0" destId="3" srcOrd="2" destOrd="0"/>
+        <dgm:cxn modelId="8" srcId="0" destId="4" srcOrd="3" destOrd="0"/>
+      </dgm:cxnLst>
+      <dgm:bg/>
+      <dgm:whole/>
+    </dgm:dataModel>
+  </dgm:clrData>
+  <dgm:layoutNode name="Name0">
+    <dgm:varLst>
+      <dgm:dir/>
+      <dgm:animLvl val="lvl"/>
+      <dgm:resizeHandles val="exact"/>
+    </dgm:varLst>
+    <dgm:choose name="Name1">
+      <dgm:if name="Name2" func="var" arg="dir" op="equ" val="norm">
+        <dgm:alg type="lin"/>
+      </dgm:if>
+      <dgm:else name="Name3">
+        <dgm:alg type="lin">
+          <dgm:param type="linDir" val="fromR"/>
+        </dgm:alg>
+      </dgm:else>
+    </dgm:choose>
+    <dgm:shape xmlns:r="http://schemas.openxmlformats.org/officeDocument/2006/relationships" r:blip="">
+      <dgm:adjLst/>
+    </dgm:shape>
+    <dgm:presOf/>
+    <dgm:choose name="Name4">
+      <dgm:if name="Name5" axis="des" func="maxDepth" op="gte" val="2">
+        <dgm:constrLst>
+          <dgm:constr type="h" for="ch" forName="composite" refType="h"/>
+          <dgm:constr type="w" for="ch" forName="composite" refType="w"/>
+          <dgm:constr type="w" for="des" forName="parTx"/>
+          <dgm:constr type="h" for="des" forName="parTx" op="equ"/>
+          <dgm:constr type="w" for="des" forName="desTx"/>
+          <dgm:constr type="h" for="des" forName="desTx" op="equ"/>
+          <dgm:constr type="primFontSz" for="des" forName="parTx" val="65"/>
+          <dgm:constr type="secFontSz" for="des" forName="desTx" refType="primFontSz" refFor="des" refForName="parTx" op="equ"/>
+          <dgm:constr type="h" for="des" forName="parTx" refType="primFontSz" refFor="des" refForName="parTx" fact="1.5"/>
+          <dgm:constr type="h" for="des" forName="desTx" refType="primFontSz" refFor="des" refForName="parTx" fact="0.5"/>
+          <dgm:constr type="w" for="ch" forName="space" op="equ" val="-6"/>
+        </dgm:constrLst>
+        <dgm:ruleLst>
+          <dgm:rule type="w" for="ch" forName="composite" val="0" fact="NaN" max="NaN"/>
+          <dgm:rule type="primFontSz" for="des" forName="parTx" val="5" fact="NaN" max="NaN"/>
+        </dgm:ruleLst>
+        <dgm:forEach name="Name6" axis="ch" ptType="node">
+          <dgm:layoutNode name="composite">
+            <dgm:alg type="composite"/>
+            <dgm:shape xmlns:r="http://schemas.openxmlformats.org/officeDocument/2006/relationships" r:blip="">
+              <dgm:adjLst/>
+            </dgm:shape>
+            <dgm:presOf/>
+            <dgm:choose name="Name7">
+              <dgm:if name="Name8" func="var" arg="dir" op="equ" val="norm">
+                <dgm:constrLst>
+                  <dgm:constr type="l" for="ch" forName="parTx"/>
+                  <dgm:constr type="w" for="ch" forName="parTx" refType="w"/>
+                  <dgm:constr type="t" for="ch" forName="parTx"/>
+                  <dgm:constr type="l" for="ch" forName="desTx"/>
+                  <dgm:constr type="w" for="ch" forName="desTx" refType="w" refFor="ch" refForName="parTx" fact="0.8"/>
+                  <dgm:constr type="t" for="ch" forName="desTx" refType="h" refFor="ch" refForName="parTx" fact="1.125"/>
+                </dgm:constrLst>
+              </dgm:if>
+              <dgm:else name="Name9">
+                <dgm:constrLst>
+                  <dgm:constr type="l" for="ch" forName="parTx"/>
+                  <dgm:constr type="w" for="ch" forName="parTx" refType="w"/>
+                  <dgm:constr type="t" for="ch" forName="parTx"/>
+                  <dgm:constr type="l" for="ch" forName="desTx" refType="w" fact="0.2"/>
+                  <dgm:constr type="w" for="ch" forName="desTx" refType="w" refFor="ch" refForName="parTx" fact="0.8"/>
+                  <dgm:constr type="t" for="ch" forName="desTx" refType="h" refFor="ch" refForName="parTx" fact="1.125"/>
+                </dgm:constrLst>
+              </dgm:else>
+            </dgm:choose>
+            <dgm:ruleLst>
+              <dgm:rule type="h" val="INF" fact="NaN" max="NaN"/>
+            </dgm:ruleLst>
+            <dgm:layoutNode name="parTx">
+              <dgm:varLst>
+                <dgm:chMax val="0"/>
+                <dgm:chPref val="0"/>
+                <dgm:bulletEnabled val="1"/>
+              </dgm:varLst>
+              <dgm:alg type="tx"/>
+              <dgm:choose name="Name10">
+                <dgm:if name="Name11" func="var" arg="dir" op="equ" val="norm">
+                  <dgm:shape xmlns:r="http://schemas.openxmlformats.org/officeDocument/2006/relationships" type="chevron" r:blip="">
+                    <dgm:adjLst/>
+                  </dgm:shape>
+                </dgm:if>
+                <dgm:else name="Name12">
+                  <dgm:shape xmlns:r="http://schemas.openxmlformats.org/officeDocument/2006/relationships" rot="180" type="chevron" r:blip="">
+                    <dgm:adjLst/>
+                  </dgm:shape>
+                </dgm:else>
+              </dgm:choose>
+              <dgm:presOf axis="self" ptType="node"/>
+              <dgm:choose name="Name13">
+                <dgm:if name="Name14" func="var" arg="dir" op="equ" val="norm">
+                  <dgm:constrLst>
+                    <dgm:constr type="h" refType="w" op="lte" fact="0.4"/>
+                    <dgm:constr type="h"/>
+                    <dgm:constr type="tMarg" refType="primFontSz" fact="0.105"/>
+                    <dgm:constr type="bMarg" refType="primFontSz" fact="0.105"/>
+                    <dgm:constr type="lMarg" refType="primFontSz" fact="0.315"/>
+                    <dgm:constr type="rMarg" refType="primFontSz" fact="0.105"/>
+                  </dgm:constrLst>
+                </dgm:if>
+                <dgm:else name="Name15">
+                  <dgm:constrLst>
+                    <dgm:constr type="h" refType="w" op="lte" fact="0.4"/>
+                    <dgm:constr type="h"/>
+                    <dgm:constr type="tMarg" refType="primFontSz" fact="0.105"/>
+                    <dgm:constr type="bMarg" refType="primFontSz" fact="0.105"/>
+                    <dgm:constr type="lMarg" refType="primFontSz" fact="0.105"/>
+                    <dgm:constr type="rMarg" refType="primFontSz" fact="0.315"/>
+                  </dgm:constrLst>
+                </dgm:else>
+              </dgm:choose>
+              <dgm:ruleLst>
+                <dgm:rule type="h" val="INF" fact="NaN" max="NaN"/>
+              </dgm:ruleLst>
+            </dgm:layoutNode>
+            <dgm:layoutNode name="desTx" styleLbl="revTx">
+              <dgm:varLst>
+                <dgm:bulletEnabled val="1"/>
+              </dgm:varLst>
+              <dgm:alg type="tx">
+                <dgm:param type="stBulletLvl" val="1"/>
+              </dgm:alg>
+              <dgm:choose name="Name16">
+                <dgm:if name="Name17" axis="ch" ptType="node" func="cnt" op="gte" val="1">
+                  <dgm:shape xmlns:r="http://schemas.openxmlformats.org/officeDocument/2006/relationships" type="rect" r:blip="">
+                    <dgm:adjLst/>
+                  </dgm:shape>
+                </dgm:if>
+                <dgm:else name="Name18">
+                  <dgm:shape xmlns:r="http://schemas.openxmlformats.org/officeDocument/2006/relationships" type="rect" r:blip="" hideGeom="1">
+                    <dgm:adjLst/>
+                  </dgm:shape>
+                </dgm:else>
+              </dgm:choose>
+              <dgm:presOf axis="des" ptType="node"/>
+              <dgm:constrLst>
+                <dgm:constr type="secFontSz" val="65"/>
+                <dgm:constr type="primFontSz" refType="secFontSz"/>
+                <dgm:constr type="h"/>
+                <dgm:constr type="tMarg"/>
+                <dgm:constr type="bMarg"/>
+                <dgm:constr type="rMarg"/>
+                <dgm:constr type="lMarg"/>
+              </dgm:constrLst>
+              <dgm:ruleLst>
+                <dgm:rule type="h" val="INF" fact="NaN" max="NaN"/>
+              </dgm:ruleLst>
+            </dgm:layoutNode>
+          </dgm:layoutNode>
+          <dgm:forEach name="Name19" axis="followSib" ptType="sibTrans" cnt="1">
+            <dgm:layoutNode name="space">
+              <dgm:alg type="sp"/>
+              <dgm:shape xmlns:r="http://schemas.openxmlformats.org/officeDocument/2006/relationships" r:blip="">
+                <dgm:adjLst/>
+              </dgm:shape>
+              <dgm:presOf/>
+              <dgm:constrLst/>
+              <dgm:ruleLst/>
+            </dgm:layoutNode>
+          </dgm:forEach>
+        </dgm:forEach>
+      </dgm:if>
+      <dgm:else name="Name20">
+        <dgm:constrLst>
+          <dgm:constr type="w" for="ch" forName="parTxOnly" refType="w"/>
+          <dgm:constr type="h" for="des" forName="parTxOnly" op="equ"/>
+          <dgm:constr type="primFontSz" for="des" forName="parTxOnly" op="equ" val="65"/>
+          <dgm:constr type="w" for="ch" forName="parTxOnlySpace" refType="w" refFor="ch" refForName="parTxOnly" fact="-0.1"/>
+        </dgm:constrLst>
+        <dgm:ruleLst/>
+        <dgm:forEach name="Name21" axis="ch" ptType="node">
+          <dgm:layoutNode name="parTxOnly">
+            <dgm:varLst>
+              <dgm:chMax val="0"/>
+              <dgm:chPref val="0"/>
+              <dgm:bulletEnabled val="1"/>
+            </dgm:varLst>
+            <dgm:alg type="tx"/>
+            <dgm:choose name="Name22">
+              <dgm:if name="Name23" func="var" arg="dir" op="equ" val="norm">
+                <dgm:shape xmlns:r="http://schemas.openxmlformats.org/officeDocument/2006/relationships" type="chevron" r:blip="">
+                  <dgm:adjLst/>
+                </dgm:shape>
+              </dgm:if>
+              <dgm:else name="Name24">
+                <dgm:shape xmlns:r="http://schemas.openxmlformats.org/officeDocument/2006/relationships" rot="180" type="chevron" r:blip="">
+                  <dgm:adjLst/>
+                </dgm:shape>
+              </dgm:else>
+            </dgm:choose>
+            <dgm:presOf axis="self" ptType="node"/>
+            <dgm:choose name="Name25">
+              <dgm:if name="Name26" func="var" arg="dir" op="equ" val="norm">
+                <dgm:constrLst>
+                  <dgm:constr type="h" refType="w" op="equ" fact="0.4"/>
+                  <dgm:constr type="tMarg" refType="primFontSz" fact="0.105"/>
+                  <dgm:constr type="bMarg" refType="primFontSz" fact="0.105"/>
+                  <dgm:constr type="lMarg" refType="primFontSz" fact="0.315"/>
+                  <dgm:constr type="rMarg" refType="primFontSz" fact="0.105"/>
+                </dgm:constrLst>
+              </dgm:if>
+              <dgm:else name="Name27">
+                <dgm:constrLst>
+                  <dgm:constr type="h" refType="w" op="equ" fact="0.4"/>
+                  <dgm:constr type="tMarg" refType="primFontSz" fact="0.105"/>
+                  <dgm:constr type="bMarg" refType="primFontSz" fact="0.105"/>
+                  <dgm:constr type="lMarg" refType="primFontSz" fact="0.105"/>
+                  <dgm:constr type="rMarg" refType="primFontSz" fact="0.315"/>
+                </dgm:constrLst>
+              </dgm:else>
+            </dgm:choose>
+            <dgm:ruleLst>
+              <dgm:rule type="primFontSz" val="5" fact="NaN" max="NaN"/>
+            </dgm:ruleLst>
+          </dgm:layoutNode>
+          <dgm:forEach name="Name28" axis="followSib" ptType="sibTrans" cnt="1">
+            <dgm:layoutNode name="parTxOnlySpace">
+              <dgm:alg type="sp"/>
+              <dgm:shape xmlns:r="http://schemas.openxmlformats.org/officeDocument/2006/relationships" r:blip="">
+                <dgm:adjLst/>
+              </dgm:shape>
+              <dgm:presOf/>
+              <dgm:constrLst/>
+              <dgm:ruleLst/>
+            </dgm:layoutNode>
+          </dgm:forEach>
+        </dgm:forEach>
+      </dgm:else>
+    </dgm:choose>
+  </dgm:layoutNode>
+</dgm:layoutDef>
+</file>
+
 <file path=ppt/diagrams/quickStyle1.xml><?xml version="1.0" encoding="utf-8"?>
+<dgm:styleDef xmlns:dgm="http://schemas.openxmlformats.org/drawingml/2006/diagram" xmlns:a="http://schemas.openxmlformats.org/drawingml/2006/main" uniqueId="urn:microsoft.com/office/officeart/2005/8/quickstyle/simple1">
+  <dgm:title val=""/>
+  <dgm:desc val=""/>
+  <dgm:catLst>
+    <dgm:cat type="simple" pri="10100"/>
+  </dgm:catLst>
+  <dgm:scene3d>
+    <a:camera prst="orthographicFront"/>
+    <a:lightRig rig="threePt" dir="t"/>
+  </dgm:scene3d>
+  <dgm:styleLbl name="node0">
+    <dgm:scene3d>
+      <a:camera prst="orthographicFront"/>
+      <a:lightRig rig="threePt" dir="t"/>
+    </dgm:scene3d>
+    <dgm:sp3d/>
+    <dgm:txPr/>
+    <dgm:style>
+      <a:lnRef idx="2">
+        <a:scrgbClr r="0" g="0" b="0"/>
+      </a:lnRef>
+      <a:fillRef idx="1">
+        <a:scrgbClr r="0" g="0" b="0"/>
+      </a:fillRef>
+      <a:effectRef idx="0">
+        <a:scrgbClr r="0" g="0" b="0"/>
+      </a:effectRef>
+      <a:fontRef idx="minor">
+        <a:schemeClr val="lt1"/>
+      </a:fontRef>
+    </dgm:style>
+  </dgm:styleLbl>
+  <dgm:styleLbl name="lnNode1">
+    <dgm:scene3d>
+      <a:camera prst="orthographicFront"/>
+      <a:lightRig rig="threePt" dir="t"/>
+    </dgm:scene3d>
+    <dgm:sp3d/>
+    <dgm:txPr/>
+    <dgm:style>
+      <a:lnRef idx="2">
+        <a:scrgbClr r="0" g="0" b="0"/>
+      </a:lnRef>
+      <a:fillRef idx="1">
+        <a:scrgbClr r="0" g="0" b="0"/>
+      </a:fillRef>
+      <a:effectRef idx="0">
+        <a:scrgbClr r="0" g="0" b="0"/>
+      </a:effectRef>
+      <a:fontRef idx="minor">
+        <a:schemeClr val="lt1"/>
+      </a:fontRef>
+    </dgm:style>
+  </dgm:styleLbl>
+  <dgm:styleLbl name="vennNode1">
+    <dgm:scene3d>
+      <a:camera prst="orthographicFront"/>
+      <a:lightRig rig="threePt" dir="t"/>
+    </dgm:scene3d>
+    <dgm:sp3d/>
+    <dgm:txPr/>
+    <dgm:style>
+      <a:lnRef idx="2">
+        <a:scrgbClr r="0" g="0" b="0"/>
+      </a:lnRef>
+      <a:fillRef idx="1">
+        <a:scrgbClr r="0" g="0" b="0"/>
+      </a:fillRef>
+      <a:effectRef idx="0">
+        <a:scrgbClr r="0" g="0" b="0"/>
+      </a:effectRef>
+      <a:fontRef idx="minor">
+        <a:schemeClr val="tx1"/>
+      </a:fontRef>
+    </dgm:style>
+  </dgm:styleLbl>
+  <dgm:styleLbl name="alignNode1">
+    <dgm:scene3d>
+      <a:camera prst="orthographicFront"/>
+      <a:lightRig rig="threePt" dir="t"/>
+    </dgm:scene3d>
+    <dgm:sp3d/>
+    <dgm:txPr/>
+    <dgm:style>
+      <a:lnRef idx="2">
+        <a:scrgbClr r="0" g="0" b="0"/>
+      </a:lnRef>
+      <a:fillRef idx="1">
+        <a:scrgbClr r="0" g="0" b="0"/>
+      </a:fillRef>
+      <a:effectRef idx="0">
+        <a:scrgbClr r="0" g="0" b="0"/>
+      </a:effectRef>
+      <a:fontRef idx="minor">
+        <a:schemeClr val="lt1"/>
+      </a:fontRef>
+    </dgm:style>
+  </dgm:styleLbl>
+  <dgm:styleLbl name="node1">
+    <dgm:scene3d>
+      <a:camera prst="orthographicFront"/>
+      <a:lightRig rig="threePt" dir="t"/>
+    </dgm:scene3d>
+    <dgm:sp3d/>
+    <dgm:txPr/>
+    <dgm:style>
+      <a:lnRef idx="2">
+        <a:scrgbClr r="0" g="0" b="0"/>
+      </a:lnRef>
+      <a:fillRef idx="1">
+        <a:scrgbClr r="0" g="0" b="0"/>
+      </a:fillRef>
+      <a:effectRef idx="0">
+        <a:scrgbClr r="0" g="0" b="0"/>
+      </a:effectRef>
+      <a:fontRef idx="minor">
+        <a:schemeClr val="lt1"/>
+      </a:fontRef>
+    </dgm:style>
+  </dgm:styleLbl>
+  <dgm:styleLbl name="node2">
+    <dgm:scene3d>
+      <a:camera prst="orthographicFront"/>
+      <a:lightRig rig="threePt" dir="t"/>
+    </dgm:scene3d>
+    <dgm:sp3d/>
+    <dgm:txPr/>
+    <dgm:style>
+      <a:lnRef idx="2">
+        <a:scrgbClr r="0" g="0" b="0"/>
+      </a:lnRef>
+      <a:fillRef idx="1">
+        <a:scrgbClr r="0" g="0" b="0"/>
+      </a:fillRef>
+      <a:effectRef idx="0">
+        <a:scrgbClr r="0" g="0" b="0"/>
+      </a:effectRef>
+      <a:fontRef idx="minor">
+        <a:schemeClr val="lt1"/>
+      </a:fontRef>
+    </dgm:style>
+  </dgm:styleLbl>
+  <dgm:styleLbl name="node3">
+    <dgm:scene3d>
+      <a:camera prst="orthographicFront"/>
+      <a:lightRig rig="threePt" dir="t"/>
+    </dgm:scene3d>
+    <dgm:sp3d/>
+    <dgm:txPr/>
+    <dgm:style>
+      <a:lnRef idx="2">
+        <a:scrgbClr r="0" g="0" b="0"/>
+      </a:lnRef>
+      <a:fillRef idx="1">
+        <a:scrgbClr r="0" g="0" b="0"/>
+      </a:fillRef>
+      <a:effectRef idx="0">
+        <a:scrgbClr r="0" g="0" b="0"/>
+      </a:effectRef>
+      <a:fontRef idx="minor">
+        <a:schemeClr val="lt1"/>
+      </a:fontRef>
+    </dgm:style>
+  </dgm:styleLbl>
+  <dgm:styleLbl name="node4">
+    <dgm:scene3d>
+      <a:camera prst="orthographicFront"/>
+      <a:lightRig rig="threePt" dir="t"/>
+    </dgm:scene3d>
+    <dgm:sp3d/>
+    <dgm:txPr/>
+    <dgm:style>
+      <a:lnRef idx="2">
+        <a:scrgbClr r="0" g="0" b="0"/>
+      </a:lnRef>
+      <a:fillRef idx="1">
+        <a:scrgbClr r="0" g="0" b="0"/>
+      </a:fillRef>
+      <a:effectRef idx="0">
+        <a:scrgbClr r="0" g="0" b="0"/>
+      </a:effectRef>
+      <a:fontRef idx="minor">
+        <a:schemeClr val="lt1"/>
+      </a:fontRef>
+    </dgm:style>
+  </dgm:styleLbl>
+  <dgm:styleLbl name="fgImgPlace1">
+    <dgm:scene3d>
+      <a:camera prst="orthographicFront"/>
+      <a:lightRig rig="threePt" dir="t"/>
+    </dgm:scene3d>
+    <dgm:sp3d/>
+    <dgm:txPr/>
+    <dgm:style>
+      <a:lnRef idx="2">
+        <a:scrgbClr r="0" g="0" b="0"/>
+      </a:lnRef>
+      <a:fillRef idx="1">
+        <a:scrgbClr r="0" g="0" b="0"/>
+      </a:fillRef>
+      <a:effectRef idx="0">
+        <a:scrgbClr r="0" g="0" b="0"/>
+      </a:effectRef>
+      <a:fontRef idx="minor"/>
+    </dgm:style>
+  </dgm:styleLbl>
+  <dgm:styleLbl name="alignImgPlace1">
+    <dgm:scene3d>
+      <a:camera prst="orthographicFront"/>
+      <a:lightRig rig="threePt" dir="t"/>
+    </dgm:scene3d>
+    <dgm:sp3d/>
+    <dgm:txPr/>
+    <dgm:style>
+      <a:lnRef idx="2">
+        <a:scrgbClr r="0" g="0" b="0"/>
+      </a:lnRef>
+      <a:fillRef idx="1">
+        <a:scrgbClr r="0" g="0" b="0"/>
+      </a:fillRef>
+      <a:effectRef idx="0">
+        <a:scrgbClr r="0" g="0" b="0"/>
+      </a:effectRef>
+      <a:fontRef idx="minor"/>
+    </dgm:style>
+  </dgm:styleLbl>
+  <dgm:styleLbl name="bgImgPlace1">
+    <dgm:scene3d>
+      <a:camera prst="orthographicFront"/>
+      <a:lightRig rig="threePt" dir="t"/>
+    </dgm:scene3d>
+    <dgm:sp3d/>
+    <dgm:txPr/>
+    <dgm:style>
+      <a:lnRef idx="2">
+        <a:scrgbClr r="0" g="0" b="0"/>
+      </a:lnRef>
+      <a:fillRef idx="1">
+        <a:scrgbClr r="0" g="0" b="0"/>
+      </a:fillRef>
+      <a:effectRef idx="0">
+        <a:scrgbClr r="0" g="0" b="0"/>
+      </a:effectRef>
+      <a:fontRef idx="minor"/>
+    </dgm:style>
+  </dgm:styleLbl>
+  <dgm:styleLbl name="sibTrans2D1">
+    <dgm:scene3d>
+      <a:camera prst="orthographicFront"/>
+      <a:lightRig rig="threePt" dir="t"/>
+    </dgm:scene3d>
+    <dgm:sp3d/>
+    <dgm:txPr/>
+    <dgm:style>
+      <a:lnRef idx="0">
+        <a:scrgbClr r="0" g="0" b="0"/>
+      </a:lnRef>
+      <a:fillRef idx="1">
+        <a:scrgbClr r="0" g="0" b="0"/>
+      </a:fillRef>
+      <a:effectRef idx="0">
+        <a:scrgbClr r="0" g="0" b="0"/>
+      </a:effectRef>
+      <a:fontRef idx="minor">
+        <a:schemeClr val="lt1"/>
+      </a:fontRef>
+    </dgm:style>
+  </dgm:styleLbl>
+  <dgm:styleLbl name="fgSibTrans2D1">
+    <dgm:scene3d>
+      <a:camera prst="orthographicFront"/>
+      <a:lightRig rig="threePt" dir="t"/>
+    </dgm:scene3d>
+    <dgm:sp3d/>
+    <dgm:txPr/>
+    <dgm:style>
+      <a:lnRef idx="0">
+        <a:scrgbClr r="0" g="0" b="0"/>
+      </a:lnRef>
+      <a:fillRef idx="1">
+        <a:scrgbClr r="0" g="0" b="0"/>
+      </a:fillRef>
+      <a:effectRef idx="0">
+        <a:scrgbClr r="0" g="0" b="0"/>
+      </a:effectRef>
+      <a:fontRef idx="minor">
+        <a:schemeClr val="lt1"/>
+      </a:fontRef>
+    </dgm:style>
+  </dgm:styleLbl>
+  <dgm:styleLbl name="bgSibTrans2D1">
+    <dgm:scene3d>
+      <a:camera prst="orthographicFront"/>
+      <a:lightRig rig="threePt" dir="t"/>
+    </dgm:scene3d>
+    <dgm:sp3d/>
+    <dgm:txPr/>
+    <dgm:style>
+      <a:lnRef idx="0">
+        <a:scrgbClr r="0" g="0" b="0"/>
+      </a:lnRef>
+      <a:fillRef idx="1">
+        <a:scrgbClr r="0" g="0" b="0"/>
+      </a:fillRef>
+      <a:effectRef idx="0">
+        <a:scrgbClr r="0" g="0" b="0"/>
+      </a:effectRef>
+      <a:fontRef idx="minor">
+        <a:schemeClr val="lt1"/>
+      </a:fontRef>
+    </dgm:style>
+  </dgm:styleLbl>
+  <dgm:styleLbl name="sibTrans1D1">
+    <dgm:scene3d>
+      <a:camera prst="orthographicFront"/>
+      <a:lightRig rig="threePt" dir="t"/>
+    </dgm:scene3d>
+    <dgm:sp3d/>
+    <dgm:txPr/>
+    <dgm:style>
+      <a:lnRef idx="1">
+        <a:scrgbClr r="0" g="0" b="0"/>
+      </a:lnRef>
+      <a:fillRef idx="0">
+        <a:scrgbClr r="0" g="0" b="0"/>
+      </a:fillRef>
+      <a:effectRef idx="0">
+        <a:scrgbClr r="0" g="0" b="0"/>
+      </a:effectRef>
+      <a:fontRef idx="minor"/>
+    </dgm:style>
+  </dgm:styleLbl>
+  <dgm:styleLbl name="callout">
+    <dgm:scene3d>
+      <a:camera prst="orthographicFront"/>
+      <a:lightRig rig="threePt" dir="t"/>
+    </dgm:scene3d>
+    <dgm:sp3d/>
+    <dgm:txPr/>
+    <dgm:style>
+      <a:lnRef idx="2">
+        <a:scrgbClr r="0" g="0" b="0"/>
+      </a:lnRef>
+      <a:fillRef idx="1">
+        <a:scrgbClr r="0" g="0" b="0"/>
+      </a:fillRef>
+      <a:effectRef idx="0">
+        <a:scrgbClr r="0" g="0" b="0"/>
+      </a:effectRef>
+      <a:fontRef idx="minor"/>
+    </dgm:style>
+  </dgm:styleLbl>
+  <dgm:styleLbl name="asst0">
+    <dgm:scene3d>
+      <a:camera prst="orthographicFront"/>
+      <a:lightRig rig="threePt" dir="t"/>
+    </dgm:scene3d>
+    <dgm:sp3d/>
+    <dgm:txPr/>
+    <dgm:style>
+      <a:lnRef idx="2">
+        <a:scrgbClr r="0" g="0" b="0"/>
+      </a:lnRef>
+      <a:fillRef idx="1">
+        <a:scrgbClr r="0" g="0" b="0"/>
+      </a:fillRef>
+      <a:effectRef idx="0">
+        <a:scrgbClr r="0" g="0" b="0"/>
+      </a:effectRef>
+      <a:fontRef idx="minor">
+        <a:schemeClr val="lt1"/>
+      </a:fontRef>
+    </dgm:style>
+  </dgm:styleLbl>
+  <dgm:styleLbl name="asst1">
+    <dgm:scene3d>
+      <a:camera prst="orthographicFront"/>
+      <a:lightRig rig="threePt" dir="t"/>
+    </dgm:scene3d>
+    <dgm:sp3d/>
+    <dgm:txPr/>
+    <dgm:style>
+      <a:lnRef idx="2">
+        <a:scrgbClr r="0" g="0" b="0"/>
+      </a:lnRef>
+      <a:fillRef idx="1">
+        <a:scrgbClr r="0" g="0" b="0"/>
+      </a:fillRef>
+      <a:effectRef idx="0">
+        <a:scrgbClr r="0" g="0" b="0"/>
+      </a:effectRef>
+      <a:fontRef idx="minor">
+        <a:schemeClr val="lt1"/>
+      </a:fontRef>
+    </dgm:style>
+  </dgm:styleLbl>
+  <dgm:styleLbl name="asst2">
+    <dgm:scene3d>
+      <a:camera prst="orthographicFront"/>
+      <a:lightRig rig="threePt" dir="t"/>
+    </dgm:scene3d>
+    <dgm:sp3d/>
+    <dgm:txPr/>
+    <dgm:style>
+      <a:lnRef idx="2">
+        <a:scrgbClr r="0" g="0" b="0"/>
+      </a:lnRef>
+      <a:fillRef idx="1">
+        <a:scrgbClr r="0" g="0" b="0"/>
+      </a:fillRef>
+      <a:effectRef idx="0">
+        <a:scrgbClr r="0" g="0" b="0"/>
+      </a:effectRef>
+      <a:fontRef idx="minor">
+        <a:schemeClr val="lt1"/>
+      </a:fontRef>
+    </dgm:style>
+  </dgm:styleLbl>
+  <dgm:styleLbl name="asst3">
+    <dgm:scene3d>
+      <a:camera prst="orthographicFront"/>
+      <a:lightRig rig="threePt" dir="t"/>
+    </dgm:scene3d>
+    <dgm:sp3d/>
+    <dgm:txPr/>
+    <dgm:style>
+      <a:lnRef idx="2">
+        <a:scrgbClr r="0" g="0" b="0"/>
+      </a:lnRef>
+      <a:fillRef idx="1">
+        <a:scrgbClr r="0" g="0" b="0"/>
+      </a:fillRef>
+      <a:effectRef idx="0">
+        <a:scrgbClr r="0" g="0" b="0"/>
+      </a:effectRef>
+      <a:fontRef idx="minor">
+        <a:schemeClr val="lt1"/>
+      </a:fontRef>
+    </dgm:style>
+  </dgm:styleLbl>
+  <dgm:styleLbl name="asst4">
+    <dgm:scene3d>
+      <a:camera prst="orthographicFront"/>
+      <a:lightRig rig="threePt" dir="t"/>
+    </dgm:scene3d>
+    <dgm:sp3d/>
+    <dgm:txPr/>
+    <dgm:style>
+      <a:lnRef idx="2">
+        <a:scrgbClr r="0" g="0" b="0"/>
+      </a:lnRef>
+      <a:fillRef idx="1">
+        <a:scrgbClr r="0" g="0" b="0"/>
+      </a:fillRef>
+      <a:effectRef idx="0">
+        <a:scrgbClr r="0" g="0" b="0"/>
+      </a:effectRef>
+      <a:fontRef idx="minor">
+        <a:schemeClr val="lt1"/>
+      </a:fontRef>
+    </dgm:style>
+  </dgm:styleLbl>
+  <dgm:styleLbl name="parChTrans2D1">
+    <dgm:scene3d>
+      <a:camera prst="orthographicFront"/>
+      <a:lightRig rig="threePt" dir="t"/>
+    </dgm:scene3d>
+    <dgm:sp3d/>
+    <dgm:txPr/>
+    <dgm:style>
+      <a:lnRef idx="2">
+        <a:scrgbClr r="0" g="0" b="0"/>
+      </a:lnRef>
+      <a:fillRef idx="1">
+        <a:scrgbClr r="0" g="0" b="0"/>
+      </a:fillRef>
+      <a:effectRef idx="0">
+        <a:scrgbClr r="0" g="0" b="0"/>
+      </a:effectRef>
+      <a:fontRef idx="minor">
+        <a:schemeClr val="lt1"/>
+      </a:fontRef>
+    </dgm:style>
+  </dgm:styleLbl>
+  <dgm:styleLbl name="parChTrans2D2">
+    <dgm:scene3d>
+      <a:camera prst="orthographicFront"/>
+      <a:lightRig rig="threePt" dir="t"/>
+    </dgm:scene3d>
+    <dgm:sp3d/>
+    <dgm:txPr/>
+    <dgm:style>
+      <a:lnRef idx="2">
+        <a:scrgbClr r="0" g="0" b="0"/>
+      </a:lnRef>
+      <a:fillRef idx="1">
+        <a:scrgbClr r="0" g="0" b="0"/>
+      </a:fillRef>
+      <a:effectRef idx="0">
+        <a:scrgbClr r="0" g="0" b="0"/>
+      </a:effectRef>
+      <a:fontRef idx="minor">
+        <a:schemeClr val="lt1"/>
+      </a:fontRef>
+    </dgm:style>
+  </dgm:styleLbl>
+  <dgm:styleLbl name="parChTrans2D3">
+    <dgm:scene3d>
+      <a:camera prst="orthographicFront"/>
+      <a:lightRig rig="threePt" dir="t"/>
+    </dgm:scene3d>
+    <dgm:sp3d/>
+    <dgm:txPr/>
+    <dgm:style>
+      <a:lnRef idx="2">
+        <a:scrgbClr r="0" g="0" b="0"/>
+      </a:lnRef>
+      <a:fillRef idx="1">
+        <a:scrgbClr r="0" g="0" b="0"/>
+      </a:fillRef>
+      <a:effectRef idx="0">
+        <a:scrgbClr r="0" g="0" b="0"/>
+      </a:effectRef>
+      <a:fontRef idx="minor">
+        <a:schemeClr val="lt1"/>
+      </a:fontRef>
+    </dgm:style>
+  </dgm:styleLbl>
+  <dgm:styleLbl name="parChTrans2D4">
+    <dgm:scene3d>
+      <a:camera prst="orthographicFront"/>
+      <a:lightRig rig="threePt" dir="t"/>
+    </dgm:scene3d>
+    <dgm:sp3d/>
+    <dgm:txPr/>
+    <dgm:style>
+      <a:lnRef idx="2">
+        <a:scrgbClr r="0" g="0" b="0"/>
+      </a:lnRef>
+      <a:fillRef idx="1">
+        <a:scrgbClr r="0" g="0" b="0"/>
+      </a:fillRef>
+      <a:effectRef idx="0">
+        <a:scrgbClr r="0" g="0" b="0"/>
+      </a:effectRef>
+      <a:fontRef idx="minor">
+        <a:schemeClr val="lt1"/>
+      </a:fontRef>
+    </dgm:style>
+  </dgm:styleLbl>
+  <dgm:styleLbl name="parChTrans1D1">
+    <dgm:scene3d>
+      <a:camera prst="orthographicFront"/>
+      <a:lightRig rig="threePt" dir="t"/>
+    </dgm:scene3d>
+    <dgm:sp3d/>
+    <dgm:txPr/>
+    <dgm:style>
+      <a:lnRef idx="2">
+        <a:scrgbClr r="0" g="0" b="0"/>
+      </a:lnRef>
+      <a:fillRef idx="0">
+        <a:scrgbClr r="0" g="0" b="0"/>
+      </a:fillRef>
+      <a:effectRef idx="0">
+        <a:scrgbClr r="0" g="0" b="0"/>
+      </a:effectRef>
+      <a:fontRef idx="minor"/>
+    </dgm:style>
+  </dgm:styleLbl>
+  <dgm:styleLbl name="parChTrans1D2">
+    <dgm:scene3d>
+      <a:camera prst="orthographicFront"/>
+      <a:lightRig rig="threePt" dir="t"/>
+    </dgm:scene3d>
+    <dgm:sp3d/>
+    <dgm:txPr/>
+    <dgm:style>
+      <a:lnRef idx="2">
+        <a:scrgbClr r="0" g="0" b="0"/>
+      </a:lnRef>
+      <a:fillRef idx="0">
+        <a:scrgbClr r="0" g="0" b="0"/>
+      </a:fillRef>
+      <a:effectRef idx="0">
+        <a:scrgbClr r="0" g="0" b="0"/>
+      </a:effectRef>
+      <a:fontRef idx="minor"/>
+    </dgm:style>
+  </dgm:styleLbl>
+  <dgm:styleLbl name="parChTrans1D3">
+    <dgm:scene3d>
+      <a:camera prst="orthographicFront"/>
+      <a:lightRig rig="threePt" dir="t"/>
+    </dgm:scene3d>
+    <dgm:sp3d/>
+    <dgm:txPr/>
+    <dgm:style>
+      <a:lnRef idx="2">
+        <a:scrgbClr r="0" g="0" b="0"/>
+      </a:lnRef>
+      <a:fillRef idx="0">
+        <a:scrgbClr r="0" g="0" b="0"/>
+      </a:fillRef>
+      <a:effectRef idx="0">
+        <a:scrgbClr r="0" g="0" b="0"/>
+      </a:effectRef>
+      <a:fontRef idx="minor"/>
+    </dgm:style>
+  </dgm:styleLbl>
+  <dgm:styleLbl name="parChTrans1D4">
+    <dgm:scene3d>
+      <a:camera prst="orthographicFront"/>
+      <a:lightRig rig="threePt" dir="t"/>
+    </dgm:scene3d>
+    <dgm:sp3d/>
+    <dgm:txPr/>
+    <dgm:style>
+      <a:lnRef idx="2">
+        <a:scrgbClr r="0" g="0" b="0"/>
+      </a:lnRef>
+      <a:fillRef idx="0">
+        <a:scrgbClr r="0" g="0" b="0"/>
+      </a:fillRef>
+      <a:effectRef idx="0">
+        <a:scrgbClr r="0" g="0" b="0"/>
+      </a:effectRef>
+      <a:fontRef idx="minor"/>
+    </dgm:style>
+  </dgm:styleLbl>
+  <dgm:styleLbl name="fgAcc1">
+    <dgm:scene3d>
+      <a:camera prst="orthographicFront"/>
+      <a:lightRig rig="threePt" dir="t"/>
+    </dgm:scene3d>
+    <dgm:sp3d/>
+    <dgm:txPr/>
+    <dgm:style>
+      <a:lnRef idx="2">
+        <a:scrgbClr r="0" g="0" b="0"/>
+      </a:lnRef>
+      <a:fillRef idx="1">
+        <a:scrgbClr r="0" g="0" b="0"/>
+      </a:fillRef>
+      <a:effectRef idx="0">
+        <a:scrgbClr r="0" g="0" b="0"/>
+      </a:effectRef>
+      <a:fontRef idx="minor"/>
+    </dgm:style>
+  </dgm:styleLbl>
+  <dgm:styleLbl name="conFgAcc1">
+    <dgm:scene3d>
+      <a:camera prst="orthographicFront"/>
+      <a:lightRig rig="threePt" dir="t"/>
+    </dgm:scene3d>
+    <dgm:sp3d/>
+    <dgm:txPr/>
+    <dgm:style>
+      <a:lnRef idx="2">
+        <a:scrgbClr r="0" g="0" b="0"/>
+      </a:lnRef>
+      <a:fillRef idx="1">
+        <a:scrgbClr r="0" g="0" b="0"/>
+      </a:fillRef>
+      <a:effectRef idx="0">
+        <a:scrgbClr r="0" g="0" b="0"/>
+      </a:effectRef>
+      <a:fontRef idx="minor"/>
+    </dgm:style>
+  </dgm:styleLbl>
+  <dgm:styleLbl name="alignAcc1">
+    <dgm:scene3d>
+      <a:camera prst="orthographicFront"/>
+      <a:lightRig rig="threePt" dir="t"/>
+    </dgm:scene3d>
+    <dgm:sp3d/>
+    <dgm:txPr/>
+    <dgm:style>
+      <a:lnRef idx="2">
+        <a:scrgbClr r="0" g="0" b="0"/>
+      </a:lnRef>
+      <a:fillRef idx="1">
+        <a:scrgbClr r="0" g="0" b="0"/>
+      </a:fillRef>
+      <a:effectRef idx="0">
+        <a:scrgbClr r="0" g="0" b="0"/>
+      </a:effectRef>
+      <a:fontRef idx="minor"/>
+    </dgm:style>
+  </dgm:styleLbl>
+  <dgm:styleLbl name="trAlignAcc1">
+    <dgm:scene3d>
+      <a:camera prst="orthographicFront"/>
+      <a:lightRig rig="threePt" dir="t"/>
+    </dgm:scene3d>
+    <dgm:sp3d/>
+    <dgm:txPr/>
+    <dgm:style>
+      <a:lnRef idx="1">
+        <a:scrgbClr r="0" g="0" b="0"/>
+      </a:lnRef>
+      <a:fillRef idx="1">
+        <a:scrgbClr r="0" g="0" b="0"/>
+      </a:fillRef>
+      <a:effectRef idx="0">
+        <a:scrgbClr r="0" g="0" b="0"/>
+      </a:effectRef>
+      <a:fontRef idx="minor"/>
+    </dgm:style>
+  </dgm:styleLbl>
+  <dgm:styleLbl name="bgAcc1">
+    <dgm:scene3d>
+      <a:camera prst="orthographicFront"/>
+      <a:lightRig rig="threePt" dir="t"/>
+    </dgm:scene3d>
+    <dgm:sp3d/>
+    <dgm:txPr/>
+    <dgm:style>
+      <a:lnRef idx="2">
+        <a:scrgbClr r="0" g="0" b="0"/>
+      </a:lnRef>
+      <a:fillRef idx="1">
+        <a:scrgbClr r="0" g="0" b="0"/>
+      </a:fillRef>
+      <a:effectRef idx="0">
+        <a:scrgbClr r="0" g="0" b="0"/>
+      </a:effectRef>
+      <a:fontRef idx="minor"/>
+    </dgm:style>
+  </dgm:styleLbl>
+  <dgm:styleLbl name="solidFgAcc1">
+    <dgm:scene3d>
+      <a:camera prst="orthographicFront"/>
+      <a:lightRig rig="threePt" dir="t"/>
+    </dgm:scene3d>
+    <dgm:sp3d/>
+    <dgm:txPr/>
+    <dgm:style>
+      <a:lnRef idx="2">
+        <a:scrgbClr r="0" g="0" b="0"/>
+      </a:lnRef>
+      <a:fillRef idx="1">
+        <a:scrgbClr r="0" g="0" b="0"/>
+      </a:fillRef>
+      <a:effectRef idx="0">
+        <a:scrgbClr r="0" g="0" b="0"/>
+      </a:effectRef>
+      <a:fontRef idx="minor"/>
+    </dgm:style>
+  </dgm:styleLbl>
+  <dgm:styleLbl name="solidAlignAcc1">
+    <dgm:scene3d>
+      <a:camera prst="orthographicFront"/>
+      <a:lightRig rig="threePt" dir="t"/>
+    </dgm:scene3d>
+    <dgm:sp3d/>
+    <dgm:txPr/>
+    <dgm:style>
+      <a:lnRef idx="2">
+        <a:scrgbClr r="0" g="0" b="0"/>
+      </a:lnRef>
+      <a:fillRef idx="1">
+        <a:scrgbClr r="0" g="0" b="0"/>
+      </a:fillRef>
+      <a:effectRef idx="0">
+        <a:scrgbClr r="0" g="0" b="0"/>
+      </a:effectRef>
+      <a:fontRef idx="minor"/>
+    </dgm:style>
+  </dgm:styleLbl>
+  <dgm:styleLbl name="solidBgAcc1">
+    <dgm:scene3d>
+      <a:camera prst="orthographicFront"/>
+      <a:lightRig rig="threePt" dir="t"/>
+    </dgm:scene3d>
+    <dgm:sp3d/>
+    <dgm:txPr/>
+    <dgm:style>
+      <a:lnRef idx="2">
+        <a:scrgbClr r="0" g="0" b="0"/>
+      </a:lnRef>
+      <a:fillRef idx="1">
+        <a:scrgbClr r="0" g="0" b="0"/>
+      </a:fillRef>
+      <a:effectRef idx="0">
+        <a:scrgbClr r="0" g="0" b="0"/>
+      </a:effectRef>
+      <a:fontRef idx="minor"/>
+    </dgm:style>
+  </dgm:styleLbl>
+  <dgm:styleLbl name="fgAccFollowNode1">
+    <dgm:scene3d>
+      <a:camera prst="orthographicFront"/>
+      <a:lightRig rig="threePt" dir="t"/>
+    </dgm:scene3d>
+    <dgm:sp3d/>
+    <dgm:txPr/>
+    <dgm:style>
+      <a:lnRef idx="2">
+        <a:scrgbClr r="0" g="0" b="0"/>
+      </a:lnRef>
+      <a:fillRef idx="1">
+        <a:scrgbClr r="0" g="0" b="0"/>
+      </a:fillRef>
+      <a:effectRef idx="0">
+        <a:scrgbClr r="0" g="0" b="0"/>
+      </a:effectRef>
+      <a:fontRef idx="minor"/>
+    </dgm:style>
+  </dgm:styleLbl>
+  <dgm:styleLbl name="alignAccFollowNode1">
+    <dgm:scene3d>
+      <a:camera prst="orthographicFront"/>
+      <a:lightRig rig="threePt" dir="t"/>
+    </dgm:scene3d>
+    <dgm:sp3d/>
+    <dgm:txPr/>
+    <dgm:style>
+      <a:lnRef idx="2">
+        <a:scrgbClr r="0" g="0" b="0"/>
+      </a:lnRef>
+      <a:fillRef idx="1">
+        <a:scrgbClr r="0" g="0" b="0"/>
+      </a:fillRef>
+      <a:effectRef idx="0">
+        <a:scrgbClr r="0" g="0" b="0"/>
+      </a:effectRef>
+      <a:fontRef idx="minor"/>
+    </dgm:style>
+  </dgm:styleLbl>
+  <dgm:styleLbl name="bgAccFollowNode1">
+    <dgm:scene3d>
+      <a:camera prst="orthographicFront"/>
+      <a:lightRig rig="threePt" dir="t"/>
+    </dgm:scene3d>
+    <dgm:sp3d/>
+    <dgm:txPr/>
+    <dgm:style>
+      <a:lnRef idx="2">
+        <a:scrgbClr r="0" g="0" b="0"/>
+      </a:lnRef>
+      <a:fillRef idx="1">
+        <a:scrgbClr r="0" g="0" b="0"/>
+      </a:fillRef>
+      <a:effectRef idx="0">
+        <a:scrgbClr r="0" g="0" b="0"/>
+      </a:effectRef>
+      <a:fontRef idx="minor"/>
+    </dgm:style>
+  </dgm:styleLbl>
+  <dgm:styleLbl name="fgAcc0">
+    <dgm:scene3d>
+      <a:camera prst="orthographicFront"/>
+      <a:lightRig rig="threePt" dir="t"/>
+    </dgm:scene3d>
+    <dgm:sp3d/>
+    <dgm:txPr/>
+    <dgm:style>
+      <a:lnRef idx="2">
+        <a:scrgbClr r="0" g="0" b="0"/>
+      </a:lnRef>
+      <a:fillRef idx="1">
+        <a:scrgbClr r="0" g="0" b="0"/>
+      </a:fillRef>
+      <a:effectRef idx="0">
+        <a:scrgbClr r="0" g="0" b="0"/>
+      </a:effectRef>
+      <a:fontRef idx="minor"/>
+    </dgm:style>
+  </dgm:styleLbl>
+  <dgm:styleLbl name="fgAcc2">
+    <dgm:scene3d>
+      <a:camera prst="orthographicFront"/>
+      <a:lightRig rig="threePt" dir="t"/>
+    </dgm:scene3d>
+    <dgm:sp3d/>
+    <dgm:txPr/>
+    <dgm:style>
+      <a:lnRef idx="2">
+        <a:scrgbClr r="0" g="0" b="0"/>
+      </a:lnRef>
+      <a:fillRef idx="1">
+        <a:scrgbClr r="0" g="0" b="0"/>
+      </a:fillRef>
+      <a:effectRef idx="0">
+        <a:scrgbClr r="0" g="0" b="0"/>
+      </a:effectRef>
+      <a:fontRef idx="minor"/>
+    </dgm:style>
+  </dgm:styleLbl>
+  <dgm:styleLbl name="fgAcc3">
+    <dgm:scene3d>
+      <a:camera prst="orthographicFront"/>
+      <a:lightRig rig="threePt" dir="t"/>
+    </dgm:scene3d>
+    <dgm:sp3d/>
+    <dgm:txPr/>
+    <dgm:style>
+      <a:lnRef idx="2">
+        <a:scrgbClr r="0" g="0" b="0"/>
+      </a:lnRef>
+      <a:fillRef idx="1">
+        <a:scrgbClr r="0" g="0" b="0"/>
+      </a:fillRef>
+      <a:effectRef idx="0">
+        <a:scrgbClr r="0" g="0" b="0"/>
+      </a:effectRef>
+      <a:fontRef idx="minor"/>
+    </dgm:style>
+  </dgm:styleLbl>
+  <dgm:styleLbl name="fgAcc4">
+    <dgm:scene3d>
+      <a:camera prst="orthographicFront"/>
+      <a:lightRig rig="threePt" dir="t"/>
+    </dgm:scene3d>
+    <dgm:sp3d/>
+    <dgm:txPr/>
+    <dgm:style>
+      <a:lnRef idx="2">
+        <a:scrgbClr r="0" g="0" b="0"/>
+      </a:lnRef>
+      <a:fillRef idx="1">
+        <a:scrgbClr r="0" g="0" b="0"/>
+      </a:fillRef>
+      <a:effectRef idx="0">
+        <a:scrgbClr r="0" g="0" b="0"/>
+      </a:effectRef>
+      <a:fontRef idx="minor"/>
+    </dgm:style>
+  </dgm:styleLbl>
+  <dgm:styleLbl name="bgShp">
+    <dgm:scene3d>
+      <a:camera prst="orthographicFront"/>
+      <a:lightRig rig="threePt" dir="t"/>
+    </dgm:scene3d>
+    <dgm:sp3d/>
+    <dgm:txPr/>
+    <dgm:style>
+      <a:lnRef idx="0">
+        <a:scrgbClr r="0" g="0" b="0"/>
+      </a:lnRef>
+      <a:fillRef idx="1">
+        <a:scrgbClr r="0" g="0" b="0"/>
+      </a:fillRef>
+      <a:effectRef idx="0">
+        <a:scrgbClr r="0" g="0" b="0"/>
+      </a:effectRef>
+      <a:fontRef idx="minor"/>
+    </dgm:style>
+  </dgm:styleLbl>
+  <dgm:styleLbl name="dkBgShp">
+    <dgm:scene3d>
+      <a:camera prst="orthographicFront"/>
+      <a:lightRig rig="threePt" dir="t"/>
+    </dgm:scene3d>
+    <dgm:sp3d/>
+    <dgm:txPr/>
+    <dgm:style>
+      <a:lnRef idx="0">
+        <a:scrgbClr r="0" g="0" b="0"/>
+      </a:lnRef>
+      <a:fillRef idx="1">
+        <a:scrgbClr r="0" g="0" b="0"/>
+      </a:fillRef>
+      <a:effectRef idx="0">
+        <a:scrgbClr r="0" g="0" b="0"/>
+      </a:effectRef>
+      <a:fontRef idx="minor"/>
+    </dgm:style>
+  </dgm:styleLbl>
+  <dgm:styleLbl name="trBgShp">
+    <dgm:scene3d>
+      <a:camera prst="orthographicFront"/>
+      <a:lightRig rig="threePt" dir="t"/>
+    </dgm:scene3d>
+    <dgm:sp3d/>
+    <dgm:txPr/>
+    <dgm:style>
+      <a:lnRef idx="0">
+        <a:scrgbClr r="0" g="0" b="0"/>
+      </a:lnRef>
+      <a:fillRef idx="1">
+        <a:scrgbClr r="0" g="0" b="0"/>
+      </a:fillRef>
+      <a:effectRef idx="0">
+        <a:scrgbClr r="0" g="0" b="0"/>
+      </a:effectRef>
+      <a:fontRef idx="minor"/>
+    </dgm:style>
+  </dgm:styleLbl>
+  <dgm:styleLbl name="fgShp">
+    <dgm:scene3d>
+      <a:camera prst="orthographicFront"/>
+      <a:lightRig rig="threePt" dir="t"/>
+    </dgm:scene3d>
+    <dgm:sp3d/>
+    <dgm:txPr/>
+    <dgm:style>
+      <a:lnRef idx="2">
+        <a:scrgbClr r="0" g="0" b="0"/>
+      </a:lnRef>
+      <a:fillRef idx="1">
+        <a:scrgbClr r="0" g="0" b="0"/>
+      </a:fillRef>
+      <a:effectRef idx="0">
+        <a:scrgbClr r="0" g="0" b="0"/>
+      </a:effectRef>
+      <a:fontRef idx="minor"/>
+    </dgm:style>
+  </dgm:styleLbl>
+  <dgm:styleLbl name="revTx">
+    <dgm:scene3d>
+      <a:camera prst="orthographicFront"/>
+      <a:lightRig rig="threePt" dir="t"/>
+    </dgm:scene3d>
+    <dgm:sp3d/>
+    <dgm:txPr/>
+    <dgm:style>
+      <a:lnRef idx="0">
+        <a:scrgbClr r="0" g="0" b="0"/>
+      </a:lnRef>
+      <a:fillRef idx="0">
+        <a:scrgbClr r="0" g="0" b="0"/>
+      </a:fillRef>
+      <a:effectRef idx="0">
+        <a:scrgbClr r="0" g="0" b="0"/>
+      </a:effectRef>
+      <a:fontRef idx="minor"/>
+    </dgm:style>
+  </dgm:styleLbl>
+</dgm:styleDef>
+</file>
+
+<file path=ppt/diagrams/quickStyle2.xml><?xml version="1.0" encoding="utf-8"?>
 <dgm:styleDef xmlns:dgm="http://schemas.openxmlformats.org/drawingml/2006/diagram" xmlns:a="http://schemas.openxmlformats.org/drawingml/2006/main" uniqueId="urn:microsoft.com/office/officeart/2005/8/quickstyle/simple1">
   <dgm:title val=""/>
   <dgm:desc val=""/>
@@ -6485,7 +9663,7 @@
             <p:ph idx="1"/>
             <p:extLst>
               <p:ext uri="{D42A27DB-BD31-4B8C-83A1-F6EECF244321}">
-                <p14:modId xmlns:p14="http://schemas.microsoft.com/office/powerpoint/2010/main" val="2472863794"/>
+                <p14:modId xmlns:p14="http://schemas.microsoft.com/office/powerpoint/2010/main" val="775967874"/>
               </p:ext>
             </p:extLst>
           </p:nvPr>
@@ -6504,6 +9682,62 @@
     <p:extLst>
       <p:ext uri="{BB962C8B-B14F-4D97-AF65-F5344CB8AC3E}">
         <p14:creationId xmlns:p14="http://schemas.microsoft.com/office/powerpoint/2010/main" val="2707157325"/>
+      </p:ext>
+    </p:extLst>
+  </p:cSld>
+  <p:clrMapOvr>
+    <a:masterClrMapping/>
+  </p:clrMapOvr>
+</p:sld>
+</file>
+
+<file path=ppt/slides/slide3.xml><?xml version="1.0" encoding="utf-8"?>
+<p:sld xmlns:a="http://schemas.openxmlformats.org/drawingml/2006/main" xmlns:r="http://schemas.openxmlformats.org/officeDocument/2006/relationships" xmlns:p="http://schemas.openxmlformats.org/presentationml/2006/main">
+  <p:cSld>
+    <p:spTree>
+      <p:nvGrpSpPr>
+        <p:cNvPr id="1" name=""/>
+        <p:cNvGrpSpPr/>
+        <p:nvPr/>
+      </p:nvGrpSpPr>
+      <p:grpSpPr>
+        <a:xfrm>
+          <a:off x="0" y="0"/>
+          <a:ext cx="0" cy="0"/>
+          <a:chOff x="0" y="0"/>
+          <a:chExt cx="0" cy="0"/>
+        </a:xfrm>
+      </p:grpSpPr>
+      <p:graphicFrame>
+        <p:nvGraphicFramePr>
+          <p:cNvPr id="4" name="Content Placeholder 3">
+            <a:extLst>
+              <a:ext uri="{FF2B5EF4-FFF2-40B4-BE49-F238E27FC236}">
+                <a16:creationId xmlns:a16="http://schemas.microsoft.com/office/drawing/2014/main" id="{5D557A8A-B704-7C4F-90DF-45C0024B2B6E}"/>
+              </a:ext>
+            </a:extLst>
+          </p:cNvPr>
+          <p:cNvGraphicFramePr>
+            <a:graphicFrameLocks noGrp="1"/>
+          </p:cNvGraphicFramePr>
+          <p:nvPr>
+            <p:ph idx="1"/>
+          </p:nvPr>
+        </p:nvGraphicFramePr>
+        <p:xfrm>
+          <a:off x="175098" y="612844"/>
+          <a:ext cx="11644008" cy="5564120"/>
+        </p:xfrm>
+        <a:graphic>
+          <a:graphicData uri="http://schemas.openxmlformats.org/drawingml/2006/diagram">
+            <dgm:relIds xmlns:dgm="http://schemas.openxmlformats.org/drawingml/2006/diagram" xmlns:r="http://schemas.openxmlformats.org/officeDocument/2006/relationships" r:dm="rId2" r:lo="rId3" r:qs="rId4" r:cs="rId5"/>
+          </a:graphicData>
+        </a:graphic>
+      </p:graphicFrame>
+    </p:spTree>
+    <p:extLst>
+      <p:ext uri="{BB962C8B-B14F-4D97-AF65-F5344CB8AC3E}">
+        <p14:creationId xmlns:p14="http://schemas.microsoft.com/office/powerpoint/2010/main" val="257272659"/>
       </p:ext>
     </p:extLst>
   </p:cSld>

</xml_diff>

<commit_message>
Gautam final Phase 2 write-up updates
</commit_message>
<xml_diff>
--- a/Drawing Objects.pptx
+++ b/Drawing Objects.pptx
@@ -8,6 +8,7 @@
     <p:sldId id="256" r:id="rId2"/>
     <p:sldId id="257" r:id="rId3"/>
     <p:sldId id="258" r:id="rId4"/>
+    <p:sldId id="259" r:id="rId5"/>
   </p:sldIdLst>
   <p:sldSz cx="12192000" cy="6858000"/>
   <p:notesSz cx="6858000" cy="9144000"/>
@@ -1776,6 +1777,788 @@
 </dgm:colorsDef>
 </file>
 
+<file path=ppt/diagrams/colors3.xml><?xml version="1.0" encoding="utf-8"?>
+<dgm:colorsDef xmlns:dgm="http://schemas.openxmlformats.org/drawingml/2006/diagram" xmlns:a="http://schemas.openxmlformats.org/drawingml/2006/main" uniqueId="urn:microsoft.com/office/officeart/2005/8/colors/colorful5">
+  <dgm:title val=""/>
+  <dgm:desc val=""/>
+  <dgm:catLst>
+    <dgm:cat type="colorful" pri="10500"/>
+  </dgm:catLst>
+  <dgm:styleLbl name="node0">
+    <dgm:fillClrLst meth="repeat">
+      <a:schemeClr val="accent4"/>
+    </dgm:fillClrLst>
+    <dgm:linClrLst meth="repeat">
+      <a:schemeClr val="lt1"/>
+    </dgm:linClrLst>
+    <dgm:effectClrLst/>
+    <dgm:txLinClrLst/>
+    <dgm:txFillClrLst/>
+    <dgm:txEffectClrLst/>
+  </dgm:styleLbl>
+  <dgm:styleLbl name="node1">
+    <dgm:fillClrLst>
+      <a:schemeClr val="accent5"/>
+      <a:schemeClr val="accent6"/>
+    </dgm:fillClrLst>
+    <dgm:linClrLst meth="repeat">
+      <a:schemeClr val="lt1"/>
+    </dgm:linClrLst>
+    <dgm:effectClrLst/>
+    <dgm:txLinClrLst/>
+    <dgm:txFillClrLst/>
+    <dgm:txEffectClrLst/>
+  </dgm:styleLbl>
+  <dgm:styleLbl name="alignNode1">
+    <dgm:fillClrLst>
+      <a:schemeClr val="accent5"/>
+      <a:schemeClr val="accent6"/>
+    </dgm:fillClrLst>
+    <dgm:linClrLst>
+      <a:schemeClr val="accent5"/>
+      <a:schemeClr val="accent6"/>
+    </dgm:linClrLst>
+    <dgm:effectClrLst/>
+    <dgm:txLinClrLst/>
+    <dgm:txFillClrLst/>
+    <dgm:txEffectClrLst/>
+  </dgm:styleLbl>
+  <dgm:styleLbl name="lnNode1">
+    <dgm:fillClrLst>
+      <a:schemeClr val="accent5"/>
+      <a:schemeClr val="accent6"/>
+    </dgm:fillClrLst>
+    <dgm:linClrLst meth="repeat">
+      <a:schemeClr val="lt1"/>
+    </dgm:linClrLst>
+    <dgm:effectClrLst/>
+    <dgm:txLinClrLst/>
+    <dgm:txFillClrLst/>
+    <dgm:txEffectClrLst/>
+  </dgm:styleLbl>
+  <dgm:styleLbl name="vennNode1">
+    <dgm:fillClrLst>
+      <a:schemeClr val="accent5">
+        <a:alpha val="50000"/>
+      </a:schemeClr>
+      <a:schemeClr val="accent6">
+        <a:alpha val="50000"/>
+      </a:schemeClr>
+    </dgm:fillClrLst>
+    <dgm:linClrLst meth="repeat">
+      <a:schemeClr val="lt1"/>
+    </dgm:linClrLst>
+    <dgm:effectClrLst/>
+    <dgm:txLinClrLst/>
+    <dgm:txFillClrLst/>
+    <dgm:txEffectClrLst/>
+  </dgm:styleLbl>
+  <dgm:styleLbl name="node2">
+    <dgm:fillClrLst>
+      <a:schemeClr val="accent6"/>
+    </dgm:fillClrLst>
+    <dgm:linClrLst meth="repeat">
+      <a:schemeClr val="lt1"/>
+    </dgm:linClrLst>
+    <dgm:effectClrLst/>
+    <dgm:txLinClrLst/>
+    <dgm:txFillClrLst/>
+    <dgm:txEffectClrLst/>
+  </dgm:styleLbl>
+  <dgm:styleLbl name="node3">
+    <dgm:fillClrLst>
+      <a:schemeClr val="accent1"/>
+    </dgm:fillClrLst>
+    <dgm:linClrLst meth="repeat">
+      <a:schemeClr val="lt1"/>
+    </dgm:linClrLst>
+    <dgm:effectClrLst/>
+    <dgm:txLinClrLst/>
+    <dgm:txFillClrLst/>
+    <dgm:txEffectClrLst/>
+  </dgm:styleLbl>
+  <dgm:styleLbl name="node4">
+    <dgm:fillClrLst>
+      <a:schemeClr val="accent2"/>
+    </dgm:fillClrLst>
+    <dgm:linClrLst meth="repeat">
+      <a:schemeClr val="lt1"/>
+    </dgm:linClrLst>
+    <dgm:effectClrLst/>
+    <dgm:txLinClrLst/>
+    <dgm:txFillClrLst/>
+    <dgm:txEffectClrLst/>
+  </dgm:styleLbl>
+  <dgm:styleLbl name="fgImgPlace1">
+    <dgm:fillClrLst>
+      <a:schemeClr val="accent5">
+        <a:tint val="50000"/>
+      </a:schemeClr>
+      <a:schemeClr val="accent6">
+        <a:tint val="50000"/>
+      </a:schemeClr>
+    </dgm:fillClrLst>
+    <dgm:linClrLst meth="repeat">
+      <a:schemeClr val="lt1"/>
+    </dgm:linClrLst>
+    <dgm:effectClrLst/>
+    <dgm:txLinClrLst/>
+    <dgm:txFillClrLst meth="repeat">
+      <a:schemeClr val="lt1"/>
+    </dgm:txFillClrLst>
+    <dgm:txEffectClrLst/>
+  </dgm:styleLbl>
+  <dgm:styleLbl name="alignImgPlace1">
+    <dgm:fillClrLst>
+      <a:schemeClr val="accent5">
+        <a:tint val="50000"/>
+      </a:schemeClr>
+      <a:schemeClr val="accent6">
+        <a:tint val="20000"/>
+      </a:schemeClr>
+    </dgm:fillClrLst>
+    <dgm:linClrLst meth="repeat">
+      <a:schemeClr val="lt1"/>
+    </dgm:linClrLst>
+    <dgm:effectClrLst/>
+    <dgm:txLinClrLst/>
+    <dgm:txFillClrLst meth="repeat">
+      <a:schemeClr val="lt1"/>
+    </dgm:txFillClrLst>
+    <dgm:txEffectClrLst/>
+  </dgm:styleLbl>
+  <dgm:styleLbl name="bgImgPlace1">
+    <dgm:fillClrLst>
+      <a:schemeClr val="accent5">
+        <a:tint val="50000"/>
+      </a:schemeClr>
+      <a:schemeClr val="accent6">
+        <a:tint val="20000"/>
+      </a:schemeClr>
+    </dgm:fillClrLst>
+    <dgm:linClrLst meth="repeat">
+      <a:schemeClr val="lt1"/>
+    </dgm:linClrLst>
+    <dgm:effectClrLst/>
+    <dgm:txLinClrLst/>
+    <dgm:txFillClrLst meth="repeat">
+      <a:schemeClr val="lt1"/>
+    </dgm:txFillClrLst>
+    <dgm:txEffectClrLst/>
+  </dgm:styleLbl>
+  <dgm:styleLbl name="sibTrans2D1">
+    <dgm:fillClrLst>
+      <a:schemeClr val="accent5"/>
+      <a:schemeClr val="accent6"/>
+    </dgm:fillClrLst>
+    <dgm:linClrLst meth="repeat">
+      <a:schemeClr val="lt1"/>
+    </dgm:linClrLst>
+    <dgm:effectClrLst/>
+    <dgm:txLinClrLst/>
+    <dgm:txFillClrLst/>
+    <dgm:txEffectClrLst/>
+  </dgm:styleLbl>
+  <dgm:styleLbl name="fgSibTrans2D1">
+    <dgm:fillClrLst>
+      <a:schemeClr val="accent5"/>
+      <a:schemeClr val="accent6"/>
+    </dgm:fillClrLst>
+    <dgm:linClrLst meth="repeat">
+      <a:schemeClr val="lt1"/>
+    </dgm:linClrLst>
+    <dgm:effectClrLst/>
+    <dgm:txLinClrLst/>
+    <dgm:txFillClrLst meth="repeat">
+      <a:schemeClr val="lt1"/>
+    </dgm:txFillClrLst>
+    <dgm:txEffectClrLst/>
+  </dgm:styleLbl>
+  <dgm:styleLbl name="bgSibTrans2D1">
+    <dgm:fillClrLst>
+      <a:schemeClr val="accent5"/>
+      <a:schemeClr val="accent6"/>
+    </dgm:fillClrLst>
+    <dgm:linClrLst meth="repeat">
+      <a:schemeClr val="lt1"/>
+    </dgm:linClrLst>
+    <dgm:effectClrLst/>
+    <dgm:txLinClrLst/>
+    <dgm:txFillClrLst meth="repeat">
+      <a:schemeClr val="lt1"/>
+    </dgm:txFillClrLst>
+    <dgm:txEffectClrLst/>
+  </dgm:styleLbl>
+  <dgm:styleLbl name="sibTrans1D1">
+    <dgm:fillClrLst/>
+    <dgm:linClrLst>
+      <a:schemeClr val="accent5"/>
+      <a:schemeClr val="accent6"/>
+    </dgm:linClrLst>
+    <dgm:effectClrLst/>
+    <dgm:txLinClrLst/>
+    <dgm:txFillClrLst meth="repeat">
+      <a:schemeClr val="tx1"/>
+    </dgm:txFillClrLst>
+    <dgm:txEffectClrLst/>
+  </dgm:styleLbl>
+  <dgm:styleLbl name="callout">
+    <dgm:fillClrLst meth="repeat">
+      <a:schemeClr val="accent5"/>
+    </dgm:fillClrLst>
+    <dgm:linClrLst meth="repeat">
+      <a:schemeClr val="accent5">
+        <a:tint val="50000"/>
+      </a:schemeClr>
+    </dgm:linClrLst>
+    <dgm:effectClrLst/>
+    <dgm:txLinClrLst/>
+    <dgm:txFillClrLst meth="repeat">
+      <a:schemeClr val="tx1"/>
+    </dgm:txFillClrLst>
+    <dgm:txEffectClrLst/>
+  </dgm:styleLbl>
+  <dgm:styleLbl name="asst0">
+    <dgm:fillClrLst meth="repeat">
+      <a:schemeClr val="accent5"/>
+    </dgm:fillClrLst>
+    <dgm:linClrLst meth="repeat">
+      <a:schemeClr val="lt1">
+        <a:shade val="80000"/>
+      </a:schemeClr>
+    </dgm:linClrLst>
+    <dgm:effectClrLst/>
+    <dgm:txLinClrLst/>
+    <dgm:txFillClrLst/>
+    <dgm:txEffectClrLst/>
+  </dgm:styleLbl>
+  <dgm:styleLbl name="asst1">
+    <dgm:fillClrLst meth="repeat">
+      <a:schemeClr val="accent6"/>
+    </dgm:fillClrLst>
+    <dgm:linClrLst meth="repeat">
+      <a:schemeClr val="lt1">
+        <a:shade val="80000"/>
+      </a:schemeClr>
+    </dgm:linClrLst>
+    <dgm:effectClrLst/>
+    <dgm:txLinClrLst/>
+    <dgm:txFillClrLst/>
+    <dgm:txEffectClrLst/>
+  </dgm:styleLbl>
+  <dgm:styleLbl name="asst2">
+    <dgm:fillClrLst>
+      <a:schemeClr val="accent1"/>
+    </dgm:fillClrLst>
+    <dgm:linClrLst meth="repeat">
+      <a:schemeClr val="lt1"/>
+    </dgm:linClrLst>
+    <dgm:effectClrLst/>
+    <dgm:txLinClrLst/>
+    <dgm:txFillClrLst/>
+    <dgm:txEffectClrLst/>
+  </dgm:styleLbl>
+  <dgm:styleLbl name="asst3">
+    <dgm:fillClrLst>
+      <a:schemeClr val="accent2"/>
+    </dgm:fillClrLst>
+    <dgm:linClrLst meth="repeat">
+      <a:schemeClr val="lt1"/>
+    </dgm:linClrLst>
+    <dgm:effectClrLst/>
+    <dgm:txLinClrLst/>
+    <dgm:txFillClrLst/>
+    <dgm:txEffectClrLst/>
+  </dgm:styleLbl>
+  <dgm:styleLbl name="asst4">
+    <dgm:fillClrLst>
+      <a:schemeClr val="accent3"/>
+    </dgm:fillClrLst>
+    <dgm:linClrLst meth="repeat">
+      <a:schemeClr val="lt1"/>
+    </dgm:linClrLst>
+    <dgm:effectClrLst/>
+    <dgm:txLinClrLst/>
+    <dgm:txFillClrLst/>
+    <dgm:txEffectClrLst/>
+  </dgm:styleLbl>
+  <dgm:styleLbl name="parChTrans2D1">
+    <dgm:fillClrLst meth="repeat">
+      <a:schemeClr val="accent5"/>
+    </dgm:fillClrLst>
+    <dgm:linClrLst meth="repeat">
+      <a:schemeClr val="lt1"/>
+    </dgm:linClrLst>
+    <dgm:effectClrLst/>
+    <dgm:txLinClrLst/>
+    <dgm:txFillClrLst meth="repeat">
+      <a:schemeClr val="lt1"/>
+    </dgm:txFillClrLst>
+    <dgm:txEffectClrLst/>
+  </dgm:styleLbl>
+  <dgm:styleLbl name="parChTrans2D2">
+    <dgm:fillClrLst meth="repeat">
+      <a:schemeClr val="accent6"/>
+    </dgm:fillClrLst>
+    <dgm:linClrLst meth="repeat">
+      <a:schemeClr val="lt1"/>
+    </dgm:linClrLst>
+    <dgm:effectClrLst/>
+    <dgm:txLinClrLst/>
+    <dgm:txFillClrLst/>
+    <dgm:txEffectClrLst/>
+  </dgm:styleLbl>
+  <dgm:styleLbl name="parChTrans2D3">
+    <dgm:fillClrLst meth="repeat">
+      <a:schemeClr val="accent6"/>
+    </dgm:fillClrLst>
+    <dgm:linClrLst meth="repeat">
+      <a:schemeClr val="lt1"/>
+    </dgm:linClrLst>
+    <dgm:effectClrLst/>
+    <dgm:txLinClrLst/>
+    <dgm:txFillClrLst/>
+    <dgm:txEffectClrLst/>
+  </dgm:styleLbl>
+  <dgm:styleLbl name="parChTrans2D4">
+    <dgm:fillClrLst meth="repeat">
+      <a:schemeClr val="accent1"/>
+    </dgm:fillClrLst>
+    <dgm:linClrLst meth="repeat">
+      <a:schemeClr val="lt1"/>
+    </dgm:linClrLst>
+    <dgm:effectClrLst/>
+    <dgm:txLinClrLst/>
+    <dgm:txFillClrLst meth="repeat">
+      <a:schemeClr val="lt1"/>
+    </dgm:txFillClrLst>
+    <dgm:txEffectClrLst/>
+  </dgm:styleLbl>
+  <dgm:styleLbl name="parChTrans1D1">
+    <dgm:fillClrLst meth="repeat">
+      <a:schemeClr val="accent5"/>
+    </dgm:fillClrLst>
+    <dgm:linClrLst meth="repeat">
+      <a:schemeClr val="accent5"/>
+    </dgm:linClrLst>
+    <dgm:effectClrLst/>
+    <dgm:txLinClrLst/>
+    <dgm:txFillClrLst meth="repeat">
+      <a:schemeClr val="tx1"/>
+    </dgm:txFillClrLst>
+    <dgm:txEffectClrLst/>
+  </dgm:styleLbl>
+  <dgm:styleLbl name="parChTrans1D2">
+    <dgm:fillClrLst meth="repeat">
+      <a:schemeClr val="accent6">
+        <a:tint val="90000"/>
+      </a:schemeClr>
+    </dgm:fillClrLst>
+    <dgm:linClrLst meth="repeat">
+      <a:schemeClr val="accent6"/>
+    </dgm:linClrLst>
+    <dgm:effectClrLst/>
+    <dgm:txLinClrLst/>
+    <dgm:txFillClrLst meth="repeat">
+      <a:schemeClr val="tx1"/>
+    </dgm:txFillClrLst>
+    <dgm:txEffectClrLst/>
+  </dgm:styleLbl>
+  <dgm:styleLbl name="parChTrans1D3">
+    <dgm:fillClrLst meth="repeat">
+      <a:schemeClr val="accent6">
+        <a:tint val="70000"/>
+      </a:schemeClr>
+    </dgm:fillClrLst>
+    <dgm:linClrLst meth="repeat">
+      <a:schemeClr val="accent1"/>
+    </dgm:linClrLst>
+    <dgm:effectClrLst/>
+    <dgm:txLinClrLst/>
+    <dgm:txFillClrLst meth="repeat">
+      <a:schemeClr val="tx1"/>
+    </dgm:txFillClrLst>
+    <dgm:txEffectClrLst/>
+  </dgm:styleLbl>
+  <dgm:styleLbl name="parChTrans1D4">
+    <dgm:fillClrLst meth="repeat">
+      <a:schemeClr val="accent6">
+        <a:tint val="50000"/>
+      </a:schemeClr>
+    </dgm:fillClrLst>
+    <dgm:linClrLst meth="repeat">
+      <a:schemeClr val="accent2"/>
+    </dgm:linClrLst>
+    <dgm:effectClrLst/>
+    <dgm:txLinClrLst/>
+    <dgm:txFillClrLst meth="repeat">
+      <a:schemeClr val="tx1"/>
+    </dgm:txFillClrLst>
+    <dgm:txEffectClrLst/>
+  </dgm:styleLbl>
+  <dgm:styleLbl name="fgAcc1">
+    <dgm:fillClrLst meth="repeat">
+      <a:schemeClr val="lt1">
+        <a:alpha val="90000"/>
+      </a:schemeClr>
+    </dgm:fillClrLst>
+    <dgm:linClrLst>
+      <a:schemeClr val="accent5"/>
+      <a:schemeClr val="accent6"/>
+    </dgm:linClrLst>
+    <dgm:effectClrLst/>
+    <dgm:txLinClrLst/>
+    <dgm:txFillClrLst meth="repeat">
+      <a:schemeClr val="dk1"/>
+    </dgm:txFillClrLst>
+    <dgm:txEffectClrLst/>
+  </dgm:styleLbl>
+  <dgm:styleLbl name="conFgAcc1">
+    <dgm:fillClrLst meth="repeat">
+      <a:schemeClr val="lt1">
+        <a:alpha val="90000"/>
+      </a:schemeClr>
+    </dgm:fillClrLst>
+    <dgm:linClrLst>
+      <a:schemeClr val="accent5"/>
+      <a:schemeClr val="accent6"/>
+    </dgm:linClrLst>
+    <dgm:effectClrLst/>
+    <dgm:txLinClrLst/>
+    <dgm:txFillClrLst meth="repeat">
+      <a:schemeClr val="dk1"/>
+    </dgm:txFillClrLst>
+    <dgm:txEffectClrLst/>
+  </dgm:styleLbl>
+  <dgm:styleLbl name="alignAcc1">
+    <dgm:fillClrLst meth="repeat">
+      <a:schemeClr val="lt1">
+        <a:alpha val="90000"/>
+      </a:schemeClr>
+    </dgm:fillClrLst>
+    <dgm:linClrLst>
+      <a:schemeClr val="accent5"/>
+      <a:schemeClr val="accent6"/>
+    </dgm:linClrLst>
+    <dgm:effectClrLst/>
+    <dgm:txLinClrLst/>
+    <dgm:txFillClrLst meth="repeat">
+      <a:schemeClr val="dk1"/>
+    </dgm:txFillClrLst>
+    <dgm:txEffectClrLst/>
+  </dgm:styleLbl>
+  <dgm:styleLbl name="trAlignAcc1">
+    <dgm:fillClrLst meth="repeat">
+      <a:schemeClr val="lt1">
+        <a:alpha val="40000"/>
+      </a:schemeClr>
+    </dgm:fillClrLst>
+    <dgm:linClrLst meth="repeat">
+      <a:schemeClr val="accent5"/>
+    </dgm:linClrLst>
+    <dgm:effectClrLst/>
+    <dgm:txLinClrLst/>
+    <dgm:txFillClrLst meth="repeat">
+      <a:schemeClr val="dk1"/>
+    </dgm:txFillClrLst>
+    <dgm:txEffectClrLst/>
+  </dgm:styleLbl>
+  <dgm:styleLbl name="bgAcc1">
+    <dgm:fillClrLst meth="repeat">
+      <a:schemeClr val="lt1">
+        <a:alpha val="90000"/>
+      </a:schemeClr>
+    </dgm:fillClrLst>
+    <dgm:linClrLst>
+      <a:schemeClr val="accent5"/>
+      <a:schemeClr val="accent6"/>
+    </dgm:linClrLst>
+    <dgm:effectClrLst/>
+    <dgm:txLinClrLst/>
+    <dgm:txFillClrLst meth="repeat">
+      <a:schemeClr val="dk1"/>
+    </dgm:txFillClrLst>
+    <dgm:txEffectClrLst/>
+  </dgm:styleLbl>
+  <dgm:styleLbl name="solidFgAcc1">
+    <dgm:fillClrLst meth="repeat">
+      <a:schemeClr val="lt1"/>
+    </dgm:fillClrLst>
+    <dgm:linClrLst>
+      <a:schemeClr val="accent5"/>
+      <a:schemeClr val="accent6"/>
+    </dgm:linClrLst>
+    <dgm:effectClrLst/>
+    <dgm:txLinClrLst/>
+    <dgm:txFillClrLst meth="repeat">
+      <a:schemeClr val="dk1"/>
+    </dgm:txFillClrLst>
+    <dgm:txEffectClrLst/>
+  </dgm:styleLbl>
+  <dgm:styleLbl name="solidAlignAcc1">
+    <dgm:fillClrLst meth="repeat">
+      <a:schemeClr val="lt1"/>
+    </dgm:fillClrLst>
+    <dgm:linClrLst>
+      <a:schemeClr val="accent5"/>
+      <a:schemeClr val="accent6"/>
+    </dgm:linClrLst>
+    <dgm:effectClrLst/>
+    <dgm:txLinClrLst/>
+    <dgm:txFillClrLst meth="repeat">
+      <a:schemeClr val="dk1"/>
+    </dgm:txFillClrLst>
+    <dgm:txEffectClrLst/>
+  </dgm:styleLbl>
+  <dgm:styleLbl name="solidBgAcc1">
+    <dgm:fillClrLst meth="repeat">
+      <a:schemeClr val="lt1"/>
+    </dgm:fillClrLst>
+    <dgm:linClrLst>
+      <a:schemeClr val="accent5"/>
+      <a:schemeClr val="accent6"/>
+    </dgm:linClrLst>
+    <dgm:effectClrLst/>
+    <dgm:txLinClrLst/>
+    <dgm:txFillClrLst meth="repeat">
+      <a:schemeClr val="dk1"/>
+    </dgm:txFillClrLst>
+    <dgm:txEffectClrLst/>
+  </dgm:styleLbl>
+  <dgm:styleLbl name="fgAccFollowNode1">
+    <dgm:fillClrLst>
+      <a:schemeClr val="accent5">
+        <a:tint val="40000"/>
+        <a:alpha val="90000"/>
+      </a:schemeClr>
+      <a:schemeClr val="accent6">
+        <a:tint val="40000"/>
+        <a:alpha val="90000"/>
+      </a:schemeClr>
+    </dgm:fillClrLst>
+    <dgm:linClrLst>
+      <a:schemeClr val="accent5">
+        <a:tint val="40000"/>
+        <a:alpha val="90000"/>
+      </a:schemeClr>
+      <a:schemeClr val="accent5">
+        <a:tint val="40000"/>
+        <a:alpha val="90000"/>
+      </a:schemeClr>
+    </dgm:linClrLst>
+    <dgm:effectClrLst/>
+    <dgm:txLinClrLst/>
+    <dgm:txFillClrLst meth="repeat">
+      <a:schemeClr val="dk1"/>
+    </dgm:txFillClrLst>
+    <dgm:txEffectClrLst/>
+  </dgm:styleLbl>
+  <dgm:styleLbl name="alignAccFollowNode1">
+    <dgm:fillClrLst>
+      <a:schemeClr val="accent5">
+        <a:tint val="40000"/>
+        <a:alpha val="90000"/>
+      </a:schemeClr>
+      <a:schemeClr val="accent6">
+        <a:tint val="40000"/>
+        <a:alpha val="90000"/>
+      </a:schemeClr>
+    </dgm:fillClrLst>
+    <dgm:linClrLst>
+      <a:schemeClr val="accent5">
+        <a:tint val="40000"/>
+        <a:alpha val="90000"/>
+      </a:schemeClr>
+      <a:schemeClr val="accent6">
+        <a:tint val="40000"/>
+        <a:alpha val="90000"/>
+      </a:schemeClr>
+    </dgm:linClrLst>
+    <dgm:effectClrLst/>
+    <dgm:txLinClrLst/>
+    <dgm:txFillClrLst meth="repeat">
+      <a:schemeClr val="dk1"/>
+    </dgm:txFillClrLst>
+    <dgm:txEffectClrLst/>
+  </dgm:styleLbl>
+  <dgm:styleLbl name="bgAccFollowNode1">
+    <dgm:fillClrLst>
+      <a:schemeClr val="accent5">
+        <a:tint val="40000"/>
+        <a:alpha val="90000"/>
+      </a:schemeClr>
+      <a:schemeClr val="accent6">
+        <a:tint val="40000"/>
+        <a:alpha val="90000"/>
+      </a:schemeClr>
+    </dgm:fillClrLst>
+    <dgm:linClrLst>
+      <a:schemeClr val="accent5">
+        <a:tint val="40000"/>
+        <a:alpha val="90000"/>
+      </a:schemeClr>
+      <a:schemeClr val="accent6">
+        <a:tint val="40000"/>
+        <a:alpha val="90000"/>
+      </a:schemeClr>
+    </dgm:linClrLst>
+    <dgm:effectClrLst/>
+    <dgm:txLinClrLst/>
+    <dgm:txFillClrLst meth="repeat">
+      <a:schemeClr val="dk1"/>
+    </dgm:txFillClrLst>
+    <dgm:txEffectClrLst/>
+  </dgm:styleLbl>
+  <dgm:styleLbl name="fgAcc0">
+    <dgm:fillClrLst meth="repeat">
+      <a:schemeClr val="lt1">
+        <a:alpha val="90000"/>
+      </a:schemeClr>
+    </dgm:fillClrLst>
+    <dgm:linClrLst>
+      <a:schemeClr val="accent4"/>
+    </dgm:linClrLst>
+    <dgm:effectClrLst/>
+    <dgm:txLinClrLst/>
+    <dgm:txFillClrLst meth="repeat">
+      <a:schemeClr val="dk1"/>
+    </dgm:txFillClrLst>
+    <dgm:txEffectClrLst/>
+  </dgm:styleLbl>
+  <dgm:styleLbl name="fgAcc2">
+    <dgm:fillClrLst meth="repeat">
+      <a:schemeClr val="lt1">
+        <a:alpha val="90000"/>
+      </a:schemeClr>
+    </dgm:fillClrLst>
+    <dgm:linClrLst>
+      <a:schemeClr val="accent6"/>
+    </dgm:linClrLst>
+    <dgm:effectClrLst/>
+    <dgm:txLinClrLst/>
+    <dgm:txFillClrLst meth="repeat">
+      <a:schemeClr val="dk1"/>
+    </dgm:txFillClrLst>
+    <dgm:txEffectClrLst/>
+  </dgm:styleLbl>
+  <dgm:styleLbl name="fgAcc3">
+    <dgm:fillClrLst meth="repeat">
+      <a:schemeClr val="lt1">
+        <a:alpha val="90000"/>
+      </a:schemeClr>
+    </dgm:fillClrLst>
+    <dgm:linClrLst>
+      <a:schemeClr val="accent1"/>
+    </dgm:linClrLst>
+    <dgm:effectClrLst/>
+    <dgm:txLinClrLst/>
+    <dgm:txFillClrLst meth="repeat">
+      <a:schemeClr val="dk1"/>
+    </dgm:txFillClrLst>
+    <dgm:txEffectClrLst/>
+  </dgm:styleLbl>
+  <dgm:styleLbl name="fgAcc4">
+    <dgm:fillClrLst meth="repeat">
+      <a:schemeClr val="lt1">
+        <a:alpha val="90000"/>
+      </a:schemeClr>
+    </dgm:fillClrLst>
+    <dgm:linClrLst>
+      <a:schemeClr val="accent2"/>
+    </dgm:linClrLst>
+    <dgm:effectClrLst/>
+    <dgm:txLinClrLst/>
+    <dgm:txFillClrLst meth="repeat">
+      <a:schemeClr val="dk1"/>
+    </dgm:txFillClrLst>
+    <dgm:txEffectClrLst/>
+  </dgm:styleLbl>
+  <dgm:styleLbl name="bgShp">
+    <dgm:fillClrLst meth="repeat">
+      <a:schemeClr val="accent5">
+        <a:tint val="40000"/>
+      </a:schemeClr>
+    </dgm:fillClrLst>
+    <dgm:linClrLst meth="repeat">
+      <a:schemeClr val="dk1"/>
+    </dgm:linClrLst>
+    <dgm:effectClrLst/>
+    <dgm:txLinClrLst/>
+    <dgm:txFillClrLst meth="repeat">
+      <a:schemeClr val="dk1"/>
+    </dgm:txFillClrLst>
+    <dgm:txEffectClrLst/>
+  </dgm:styleLbl>
+  <dgm:styleLbl name="dkBgShp">
+    <dgm:fillClrLst meth="repeat">
+      <a:schemeClr val="accent5">
+        <a:shade val="90000"/>
+      </a:schemeClr>
+    </dgm:fillClrLst>
+    <dgm:linClrLst meth="repeat">
+      <a:schemeClr val="dk1"/>
+    </dgm:linClrLst>
+    <dgm:effectClrLst/>
+    <dgm:txLinClrLst/>
+    <dgm:txFillClrLst meth="repeat">
+      <a:schemeClr val="lt1"/>
+    </dgm:txFillClrLst>
+    <dgm:txEffectClrLst/>
+  </dgm:styleLbl>
+  <dgm:styleLbl name="trBgShp">
+    <dgm:fillClrLst meth="repeat">
+      <a:schemeClr val="accent5">
+        <a:tint val="50000"/>
+        <a:alpha val="40000"/>
+      </a:schemeClr>
+    </dgm:fillClrLst>
+    <dgm:linClrLst meth="repeat">
+      <a:schemeClr val="accent5"/>
+    </dgm:linClrLst>
+    <dgm:effectClrLst/>
+    <dgm:txLinClrLst/>
+    <dgm:txFillClrLst meth="repeat">
+      <a:schemeClr val="lt1"/>
+    </dgm:txFillClrLst>
+    <dgm:txEffectClrLst/>
+  </dgm:styleLbl>
+  <dgm:styleLbl name="fgShp">
+    <dgm:fillClrLst meth="repeat">
+      <a:schemeClr val="accent5">
+        <a:tint val="40000"/>
+      </a:schemeClr>
+    </dgm:fillClrLst>
+    <dgm:linClrLst meth="repeat">
+      <a:schemeClr val="lt1"/>
+    </dgm:linClrLst>
+    <dgm:effectClrLst/>
+    <dgm:txLinClrLst/>
+    <dgm:txFillClrLst meth="repeat">
+      <a:schemeClr val="dk1"/>
+    </dgm:txFillClrLst>
+    <dgm:txEffectClrLst/>
+  </dgm:styleLbl>
+  <dgm:styleLbl name="revTx">
+    <dgm:fillClrLst meth="repeat">
+      <a:schemeClr val="lt1">
+        <a:alpha val="0"/>
+      </a:schemeClr>
+    </dgm:fillClrLst>
+    <dgm:linClrLst meth="repeat">
+      <a:schemeClr val="dk1">
+        <a:alpha val="0"/>
+      </a:schemeClr>
+    </dgm:linClrLst>
+    <dgm:effectClrLst/>
+    <dgm:txLinClrLst/>
+    <dgm:txFillClrLst meth="repeat">
+      <a:schemeClr val="tx1"/>
+    </dgm:txFillClrLst>
+    <dgm:txEffectClrLst/>
+  </dgm:styleLbl>
+</dgm:colorsDef>
+</file>
+
 <file path=ppt/diagrams/data1.xml><?xml version="1.0" encoding="utf-8"?>
 <dgm:dataModel xmlns:dgm="http://schemas.openxmlformats.org/drawingml/2006/diagram" xmlns:a="http://schemas.openxmlformats.org/drawingml/2006/main">
   <dgm:ptLst>
@@ -2579,6 +3362,777 @@
     <dgm:cxn modelId="{8D5B010F-3D4B-EB4B-BE7D-40B61576F0DB}" type="presParOf" srcId="{787F3AD5-8B12-7145-9DAE-680EE985F5BE}" destId="{2D0BE300-8093-B042-847E-80E6EE923A39}" srcOrd="10" destOrd="0" presId="urn:microsoft.com/office/officeart/2005/8/layout/chevron1"/>
     <dgm:cxn modelId="{217CB1B9-BDA9-2F4C-B16F-0C2ED323C578}" type="presParOf" srcId="{787F3AD5-8B12-7145-9DAE-680EE985F5BE}" destId="{5B307889-3F8B-7842-81D0-54E5D2BE400B}" srcOrd="11" destOrd="0" presId="urn:microsoft.com/office/officeart/2005/8/layout/chevron1"/>
     <dgm:cxn modelId="{0FA3DBB6-DE6C-6547-9F65-1786103449FF}" type="presParOf" srcId="{787F3AD5-8B12-7145-9DAE-680EE985F5BE}" destId="{AE6483A2-3D2B-5E4C-BF9B-8A40A65576A3}" srcOrd="12" destOrd="0" presId="urn:microsoft.com/office/officeart/2005/8/layout/chevron1"/>
+  </dgm:cxnLst>
+  <dgm:bg/>
+  <dgm:whole/>
+  <dgm:extLst>
+    <a:ext uri="http://schemas.microsoft.com/office/drawing/2008/diagram">
+      <dsp:dataModelExt xmlns:dsp="http://schemas.microsoft.com/office/drawing/2008/diagram" relId="rId6" minVer="http://schemas.openxmlformats.org/drawingml/2006/diagram"/>
+    </a:ext>
+  </dgm:extLst>
+</dgm:dataModel>
+</file>
+
+<file path=ppt/diagrams/data3.xml><?xml version="1.0" encoding="utf-8"?>
+<dgm:dataModel xmlns:dgm="http://schemas.openxmlformats.org/drawingml/2006/diagram" xmlns:a="http://schemas.openxmlformats.org/drawingml/2006/main">
+  <dgm:ptLst>
+    <dgm:pt modelId="{DBD182B4-2D75-7A4F-A2FC-0AECAA3538EE}" type="doc">
+      <dgm:prSet loTypeId="urn:microsoft.com/office/officeart/2005/8/layout/chevron1" loCatId="" qsTypeId="urn:microsoft.com/office/officeart/2005/8/quickstyle/simple1" qsCatId="simple" csTypeId="urn:microsoft.com/office/officeart/2005/8/colors/colorful5" csCatId="colorful" phldr="1"/>
+      <dgm:spPr/>
+    </dgm:pt>
+    <dgm:pt modelId="{D2CFBD69-2FB3-6D45-8C1B-BA064B393CC7}">
+      <dgm:prSet phldrT="[Text]"/>
+      <dgm:spPr/>
+      <dgm:t>
+        <a:bodyPr/>
+        <a:lstStyle/>
+        <a:p>
+          <a:r>
+            <a:rPr lang="en-US" b="0" i="0" u="none" dirty="0"/>
+            <a:t>Data Preprocessing &amp; EDA</a:t>
+          </a:r>
+          <a:endParaRPr lang="en-US" dirty="0"/>
+        </a:p>
+      </dgm:t>
+    </dgm:pt>
+    <dgm:pt modelId="{CB6B4915-E06E-1D47-8D54-3338BDDE1F72}" type="parTrans" cxnId="{965D025E-6FB7-3843-8292-C8A9DD5B292C}">
+      <dgm:prSet/>
+      <dgm:spPr/>
+      <dgm:t>
+        <a:bodyPr/>
+        <a:lstStyle/>
+        <a:p>
+          <a:endParaRPr lang="en-US"/>
+        </a:p>
+      </dgm:t>
+    </dgm:pt>
+    <dgm:pt modelId="{DE3BAE38-9EF9-F244-8DD8-BD928019CF03}" type="sibTrans" cxnId="{965D025E-6FB7-3843-8292-C8A9DD5B292C}">
+      <dgm:prSet/>
+      <dgm:spPr/>
+      <dgm:t>
+        <a:bodyPr/>
+        <a:lstStyle/>
+        <a:p>
+          <a:endParaRPr lang="en-US"/>
+        </a:p>
+      </dgm:t>
+    </dgm:pt>
+    <dgm:pt modelId="{7B95986C-2E8C-3D4C-805E-971490EAEA86}">
+      <dgm:prSet phldrT="[Text]"/>
+      <dgm:spPr/>
+      <dgm:t>
+        <a:bodyPr/>
+        <a:lstStyle/>
+        <a:p>
+          <a:r>
+            <a:rPr lang="en-US" b="0" i="0" u="none" dirty="0"/>
+            <a:t>Feature Engineering</a:t>
+          </a:r>
+          <a:endParaRPr lang="en-US" dirty="0"/>
+        </a:p>
+      </dgm:t>
+    </dgm:pt>
+    <dgm:pt modelId="{AC2F641D-9D76-C14D-88E1-CFB4C0A10DA6}" type="parTrans" cxnId="{EF64DFD6-FEC3-8D49-A1B7-3C2ED5B647F6}">
+      <dgm:prSet/>
+      <dgm:spPr/>
+      <dgm:t>
+        <a:bodyPr/>
+        <a:lstStyle/>
+        <a:p>
+          <a:endParaRPr lang="en-US"/>
+        </a:p>
+      </dgm:t>
+    </dgm:pt>
+    <dgm:pt modelId="{A3C8433B-E34E-5341-AE71-EA76BFF62C36}" type="sibTrans" cxnId="{EF64DFD6-FEC3-8D49-A1B7-3C2ED5B647F6}">
+      <dgm:prSet/>
+      <dgm:spPr/>
+      <dgm:t>
+        <a:bodyPr/>
+        <a:lstStyle/>
+        <a:p>
+          <a:endParaRPr lang="en-US"/>
+        </a:p>
+      </dgm:t>
+    </dgm:pt>
+    <dgm:pt modelId="{8516B546-1B50-4B43-AE02-9D22AD937CC9}">
+      <dgm:prSet phldrT="[Text]"/>
+      <dgm:spPr/>
+      <dgm:t>
+        <a:bodyPr/>
+        <a:lstStyle/>
+        <a:p>
+          <a:r>
+            <a:rPr lang="en-US" b="0" i="0" u="none" dirty="0"/>
+            <a:t>Baseline LR Model Training</a:t>
+          </a:r>
+          <a:endParaRPr lang="en-US" dirty="0"/>
+        </a:p>
+      </dgm:t>
+    </dgm:pt>
+    <dgm:pt modelId="{53772A7C-480A-0247-BC7C-94204D912AE6}" type="parTrans" cxnId="{FFACE45E-F600-4548-8DE4-33A878484220}">
+      <dgm:prSet/>
+      <dgm:spPr/>
+      <dgm:t>
+        <a:bodyPr/>
+        <a:lstStyle/>
+        <a:p>
+          <a:endParaRPr lang="en-US"/>
+        </a:p>
+      </dgm:t>
+    </dgm:pt>
+    <dgm:pt modelId="{9691A920-B429-0144-A795-08EF36901925}" type="sibTrans" cxnId="{FFACE45E-F600-4548-8DE4-33A878484220}">
+      <dgm:prSet/>
+      <dgm:spPr/>
+      <dgm:t>
+        <a:bodyPr/>
+        <a:lstStyle/>
+        <a:p>
+          <a:endParaRPr lang="en-US"/>
+        </a:p>
+      </dgm:t>
+    </dgm:pt>
+    <dgm:pt modelId="{5DD2C8AB-388F-A746-A202-3904BF0262F7}">
+      <dgm:prSet/>
+      <dgm:spPr/>
+      <dgm:t>
+        <a:bodyPr/>
+        <a:lstStyle/>
+        <a:p>
+          <a:r>
+            <a:rPr lang="en-US" dirty="0"/>
+            <a:t>Baseline Model Evaluation</a:t>
+          </a:r>
+        </a:p>
+      </dgm:t>
+    </dgm:pt>
+    <dgm:pt modelId="{174160FA-8093-EC4F-B150-81626241BFB4}" type="parTrans" cxnId="{D431AE79-8596-0F4B-9AB2-338FB8CCEB9A}">
+      <dgm:prSet/>
+      <dgm:spPr/>
+      <dgm:t>
+        <a:bodyPr/>
+        <a:lstStyle/>
+        <a:p>
+          <a:endParaRPr lang="en-US"/>
+        </a:p>
+      </dgm:t>
+    </dgm:pt>
+    <dgm:pt modelId="{4D9210A1-8380-3646-AA27-57EE1963E295}" type="sibTrans" cxnId="{D431AE79-8596-0F4B-9AB2-338FB8CCEB9A}">
+      <dgm:prSet/>
+      <dgm:spPr/>
+      <dgm:t>
+        <a:bodyPr/>
+        <a:lstStyle/>
+        <a:p>
+          <a:endParaRPr lang="en-US"/>
+        </a:p>
+      </dgm:t>
+    </dgm:pt>
+    <dgm:pt modelId="{BEBE266C-FD14-524F-9216-152B26164655}">
+      <dgm:prSet/>
+      <dgm:spPr/>
+      <dgm:t>
+        <a:bodyPr/>
+        <a:lstStyle/>
+        <a:p>
+          <a:r>
+            <a:rPr lang="en-US" dirty="0"/>
+            <a:t>Model Training with Parameter Tuning</a:t>
+          </a:r>
+        </a:p>
+      </dgm:t>
+    </dgm:pt>
+    <dgm:pt modelId="{0E6563E2-25F9-AA47-930F-BED666372518}" type="parTrans" cxnId="{326255C0-78F6-E644-8DFE-60127613BFDF}">
+      <dgm:prSet/>
+      <dgm:spPr/>
+      <dgm:t>
+        <a:bodyPr/>
+        <a:lstStyle/>
+        <a:p>
+          <a:endParaRPr lang="en-US"/>
+        </a:p>
+      </dgm:t>
+    </dgm:pt>
+    <dgm:pt modelId="{C2967FE7-9DCC-3443-A4F0-66AB57365CD9}" type="sibTrans" cxnId="{326255C0-78F6-E644-8DFE-60127613BFDF}">
+      <dgm:prSet/>
+      <dgm:spPr/>
+      <dgm:t>
+        <a:bodyPr/>
+        <a:lstStyle/>
+        <a:p>
+          <a:endParaRPr lang="en-US"/>
+        </a:p>
+      </dgm:t>
+    </dgm:pt>
+    <dgm:pt modelId="{7D45AC0C-1549-0445-9EF5-DF07189F47B5}">
+      <dgm:prSet/>
+      <dgm:spPr/>
+      <dgm:t>
+        <a:bodyPr/>
+        <a:lstStyle/>
+        <a:p>
+          <a:r>
+            <a:rPr lang="en-US" dirty="0"/>
+            <a:t>Best Model Evaluation</a:t>
+          </a:r>
+        </a:p>
+      </dgm:t>
+    </dgm:pt>
+    <dgm:pt modelId="{4C77031D-D952-BC45-97A3-847F2CCFA9EA}" type="parTrans" cxnId="{0B8C4DEA-B9FB-D540-B251-BCDB9BF6B25E}">
+      <dgm:prSet/>
+      <dgm:spPr/>
+      <dgm:t>
+        <a:bodyPr/>
+        <a:lstStyle/>
+        <a:p>
+          <a:endParaRPr lang="en-US"/>
+        </a:p>
+      </dgm:t>
+    </dgm:pt>
+    <dgm:pt modelId="{74D6E566-6CF9-364B-BFFF-915D9CE53E41}" type="sibTrans" cxnId="{0B8C4DEA-B9FB-D540-B251-BCDB9BF6B25E}">
+      <dgm:prSet/>
+      <dgm:spPr/>
+      <dgm:t>
+        <a:bodyPr/>
+        <a:lstStyle/>
+        <a:p>
+          <a:endParaRPr lang="en-US"/>
+        </a:p>
+      </dgm:t>
+    </dgm:pt>
+    <dgm:pt modelId="{7137169A-9F5C-C14B-BBF6-DBF2565A6EDA}">
+      <dgm:prSet/>
+      <dgm:spPr/>
+      <dgm:t>
+        <a:bodyPr/>
+        <a:lstStyle/>
+        <a:p>
+          <a:r>
+            <a:rPr lang="en-US" dirty="0"/>
+            <a:t>Best Model Prediction</a:t>
+          </a:r>
+        </a:p>
+      </dgm:t>
+    </dgm:pt>
+    <dgm:pt modelId="{B4E14A10-42C1-154F-9F34-F7AD4A68004D}" type="parTrans" cxnId="{E626A29B-4A7D-214F-98D4-339183511ECD}">
+      <dgm:prSet/>
+      <dgm:spPr/>
+      <dgm:t>
+        <a:bodyPr/>
+        <a:lstStyle/>
+        <a:p>
+          <a:endParaRPr lang="en-US"/>
+        </a:p>
+      </dgm:t>
+    </dgm:pt>
+    <dgm:pt modelId="{768AD082-9CC0-B64E-BB0D-BDFC361AD6FA}" type="sibTrans" cxnId="{E626A29B-4A7D-214F-98D4-339183511ECD}">
+      <dgm:prSet/>
+      <dgm:spPr/>
+      <dgm:t>
+        <a:bodyPr/>
+        <a:lstStyle/>
+        <a:p>
+          <a:endParaRPr lang="en-US"/>
+        </a:p>
+      </dgm:t>
+    </dgm:pt>
+    <dgm:pt modelId="{BB5D2B04-E8E3-DD4D-839F-05C436E52E03}">
+      <dgm:prSet/>
+      <dgm:spPr/>
+      <dgm:t>
+        <a:bodyPr/>
+        <a:lstStyle/>
+        <a:p>
+          <a:r>
+            <a:rPr lang="en-US" dirty="0"/>
+            <a:t>Logistic Regression</a:t>
+          </a:r>
+        </a:p>
+      </dgm:t>
+    </dgm:pt>
+    <dgm:pt modelId="{CE646CB5-B24E-714C-B78E-AB879A56106B}" type="parTrans" cxnId="{E1480FEE-3A92-D447-844C-99B94CF86CCE}">
+      <dgm:prSet/>
+      <dgm:spPr/>
+      <dgm:t>
+        <a:bodyPr/>
+        <a:lstStyle/>
+        <a:p>
+          <a:endParaRPr lang="en-US"/>
+        </a:p>
+      </dgm:t>
+    </dgm:pt>
+    <dgm:pt modelId="{D54AF4A8-1328-CC47-B9E6-80DDD5DFB276}" type="sibTrans" cxnId="{E1480FEE-3A92-D447-844C-99B94CF86CCE}">
+      <dgm:prSet/>
+      <dgm:spPr/>
+      <dgm:t>
+        <a:bodyPr/>
+        <a:lstStyle/>
+        <a:p>
+          <a:endParaRPr lang="en-US"/>
+        </a:p>
+      </dgm:t>
+    </dgm:pt>
+    <dgm:pt modelId="{4CA113F6-501B-DE4F-AE2E-DF63F16F3948}">
+      <dgm:prSet/>
+      <dgm:spPr/>
+      <dgm:t>
+        <a:bodyPr/>
+        <a:lstStyle/>
+        <a:p>
+          <a:r>
+            <a:rPr lang="en-US" dirty="0"/>
+            <a:t>Naive Bayes</a:t>
+          </a:r>
+        </a:p>
+      </dgm:t>
+    </dgm:pt>
+    <dgm:pt modelId="{0D9C9905-462F-CB48-B21F-4B416EB80B36}" type="parTrans" cxnId="{EA5CA114-668E-6744-B4BE-CCBFD2D387F2}">
+      <dgm:prSet/>
+      <dgm:spPr/>
+      <dgm:t>
+        <a:bodyPr/>
+        <a:lstStyle/>
+        <a:p>
+          <a:endParaRPr lang="en-US"/>
+        </a:p>
+      </dgm:t>
+    </dgm:pt>
+    <dgm:pt modelId="{292CC1AC-EDD9-5748-B246-F82DB34A2FFD}" type="sibTrans" cxnId="{EA5CA114-668E-6744-B4BE-CCBFD2D387F2}">
+      <dgm:prSet/>
+      <dgm:spPr/>
+      <dgm:t>
+        <a:bodyPr/>
+        <a:lstStyle/>
+        <a:p>
+          <a:endParaRPr lang="en-US"/>
+        </a:p>
+      </dgm:t>
+    </dgm:pt>
+    <dgm:pt modelId="{075D9454-E699-754A-A46E-AE66DD7BA193}">
+      <dgm:prSet/>
+      <dgm:spPr/>
+      <dgm:t>
+        <a:bodyPr/>
+        <a:lstStyle/>
+        <a:p>
+          <a:r>
+            <a:rPr lang="en-US" dirty="0"/>
+            <a:t>SVM</a:t>
+          </a:r>
+        </a:p>
+      </dgm:t>
+    </dgm:pt>
+    <dgm:pt modelId="{B03F75A1-412A-9C4E-99F5-7786BF10FC66}" type="parTrans" cxnId="{9E4C9717-1526-8144-9102-B38D68BDBF69}">
+      <dgm:prSet/>
+      <dgm:spPr/>
+      <dgm:t>
+        <a:bodyPr/>
+        <a:lstStyle/>
+        <a:p>
+          <a:endParaRPr lang="en-US"/>
+        </a:p>
+      </dgm:t>
+    </dgm:pt>
+    <dgm:pt modelId="{FAB06CDC-DBE4-2A46-891C-C6C03AD83F1C}" type="sibTrans" cxnId="{9E4C9717-1526-8144-9102-B38D68BDBF69}">
+      <dgm:prSet/>
+      <dgm:spPr/>
+      <dgm:t>
+        <a:bodyPr/>
+        <a:lstStyle/>
+        <a:p>
+          <a:endParaRPr lang="en-US"/>
+        </a:p>
+      </dgm:t>
+    </dgm:pt>
+    <dgm:pt modelId="{E7CC13C1-55B3-2243-8078-6AD725FA82E7}">
+      <dgm:prSet/>
+      <dgm:spPr/>
+      <dgm:t>
+        <a:bodyPr/>
+        <a:lstStyle/>
+        <a:p>
+          <a:r>
+            <a:rPr lang="en-US" dirty="0"/>
+            <a:t>Gradient Boosting</a:t>
+          </a:r>
+        </a:p>
+      </dgm:t>
+    </dgm:pt>
+    <dgm:pt modelId="{C669B2EC-B0C0-FC43-B4D4-018694A40755}" type="parTrans" cxnId="{73C4F625-D062-454B-ABBF-A9A3FD8476F3}">
+      <dgm:prSet/>
+      <dgm:spPr/>
+      <dgm:t>
+        <a:bodyPr/>
+        <a:lstStyle/>
+        <a:p>
+          <a:endParaRPr lang="en-US"/>
+        </a:p>
+      </dgm:t>
+    </dgm:pt>
+    <dgm:pt modelId="{B4B94ED3-3F67-3F48-908D-715EE99051AA}" type="sibTrans" cxnId="{73C4F625-D062-454B-ABBF-A9A3FD8476F3}">
+      <dgm:prSet/>
+      <dgm:spPr/>
+      <dgm:t>
+        <a:bodyPr/>
+        <a:lstStyle/>
+        <a:p>
+          <a:endParaRPr lang="en-US"/>
+        </a:p>
+      </dgm:t>
+    </dgm:pt>
+    <dgm:pt modelId="{89D276E0-300F-6A44-9FF4-D53C756F63CA}">
+      <dgm:prSet/>
+      <dgm:spPr/>
+      <dgm:t>
+        <a:bodyPr/>
+        <a:lstStyle/>
+        <a:p>
+          <a:r>
+            <a:rPr lang="en-US" dirty="0"/>
+            <a:t>XG Boost</a:t>
+          </a:r>
+        </a:p>
+      </dgm:t>
+    </dgm:pt>
+    <dgm:pt modelId="{72E04AC8-0519-B246-9959-E9BA598858B0}" type="parTrans" cxnId="{0EC50B37-93A5-4F44-B414-87B2B1971017}">
+      <dgm:prSet/>
+      <dgm:spPr/>
+      <dgm:t>
+        <a:bodyPr/>
+        <a:lstStyle/>
+        <a:p>
+          <a:endParaRPr lang="en-US"/>
+        </a:p>
+      </dgm:t>
+    </dgm:pt>
+    <dgm:pt modelId="{30194E8E-7AFA-5942-B612-19A882163F65}" type="sibTrans" cxnId="{0EC50B37-93A5-4F44-B414-87B2B1971017}">
+      <dgm:prSet/>
+      <dgm:spPr/>
+      <dgm:t>
+        <a:bodyPr/>
+        <a:lstStyle/>
+        <a:p>
+          <a:endParaRPr lang="en-US"/>
+        </a:p>
+      </dgm:t>
+    </dgm:pt>
+    <dgm:pt modelId="{E4B901F6-3035-AB42-9D09-346234B8A040}">
+      <dgm:prSet/>
+      <dgm:spPr/>
+      <dgm:t>
+        <a:bodyPr/>
+        <a:lstStyle/>
+        <a:p>
+          <a:r>
+            <a:rPr lang="en-US" dirty="0"/>
+            <a:t>Decision Trees</a:t>
+          </a:r>
+        </a:p>
+      </dgm:t>
+    </dgm:pt>
+    <dgm:pt modelId="{19459E5E-9D67-054D-B801-CFB4D6E1491D}" type="parTrans" cxnId="{B63FB892-D890-CE4C-8C19-C3E4E7BF0AD8}">
+      <dgm:prSet/>
+      <dgm:spPr/>
+      <dgm:t>
+        <a:bodyPr/>
+        <a:lstStyle/>
+        <a:p>
+          <a:endParaRPr lang="en-US"/>
+        </a:p>
+      </dgm:t>
+    </dgm:pt>
+    <dgm:pt modelId="{3A906D02-0023-D844-9CC8-51D6F97A563F}" type="sibTrans" cxnId="{B63FB892-D890-CE4C-8C19-C3E4E7BF0AD8}">
+      <dgm:prSet/>
+      <dgm:spPr/>
+      <dgm:t>
+        <a:bodyPr/>
+        <a:lstStyle/>
+        <a:p>
+          <a:endParaRPr lang="en-US"/>
+        </a:p>
+      </dgm:t>
+    </dgm:pt>
+    <dgm:pt modelId="{15E9A8A2-5127-8843-9214-B4F2F38707EC}">
+      <dgm:prSet/>
+      <dgm:spPr/>
+      <dgm:t>
+        <a:bodyPr/>
+        <a:lstStyle/>
+        <a:p>
+          <a:r>
+            <a:rPr lang="en-US" dirty="0"/>
+            <a:t>Random Forest</a:t>
+          </a:r>
+        </a:p>
+      </dgm:t>
+    </dgm:pt>
+    <dgm:pt modelId="{40B78355-C7C1-7F4E-AA6B-9E6BBB6628F2}" type="parTrans" cxnId="{951D6437-7895-9E44-B148-51704E2FA9BF}">
+      <dgm:prSet/>
+      <dgm:spPr/>
+      <dgm:t>
+        <a:bodyPr/>
+        <a:lstStyle/>
+        <a:p>
+          <a:endParaRPr lang="en-US"/>
+        </a:p>
+      </dgm:t>
+    </dgm:pt>
+    <dgm:pt modelId="{17D6EEAE-3733-E24B-9D1E-69330F570AEB}" type="sibTrans" cxnId="{951D6437-7895-9E44-B148-51704E2FA9BF}">
+      <dgm:prSet/>
+      <dgm:spPr/>
+      <dgm:t>
+        <a:bodyPr/>
+        <a:lstStyle/>
+        <a:p>
+          <a:endParaRPr lang="en-US"/>
+        </a:p>
+      </dgm:t>
+    </dgm:pt>
+    <dgm:pt modelId="{787F3AD5-8B12-7145-9DAE-680EE985F5BE}" type="pres">
+      <dgm:prSet presAssocID="{DBD182B4-2D75-7A4F-A2FC-0AECAA3538EE}" presName="Name0" presStyleCnt="0">
+        <dgm:presLayoutVars>
+          <dgm:dir/>
+          <dgm:animLvl val="lvl"/>
+          <dgm:resizeHandles val="exact"/>
+        </dgm:presLayoutVars>
+      </dgm:prSet>
+      <dgm:spPr/>
+    </dgm:pt>
+    <dgm:pt modelId="{47CF1808-84BD-6E45-A9F5-097A1B131186}" type="pres">
+      <dgm:prSet presAssocID="{D2CFBD69-2FB3-6D45-8C1B-BA064B393CC7}" presName="composite" presStyleCnt="0"/>
+      <dgm:spPr/>
+    </dgm:pt>
+    <dgm:pt modelId="{9C9B0ADF-3D17-9040-9297-4A0483709F4A}" type="pres">
+      <dgm:prSet presAssocID="{D2CFBD69-2FB3-6D45-8C1B-BA064B393CC7}" presName="parTx" presStyleLbl="node1" presStyleIdx="0" presStyleCnt="7">
+        <dgm:presLayoutVars>
+          <dgm:chMax val="0"/>
+          <dgm:chPref val="0"/>
+          <dgm:bulletEnabled val="1"/>
+        </dgm:presLayoutVars>
+      </dgm:prSet>
+      <dgm:spPr/>
+    </dgm:pt>
+    <dgm:pt modelId="{34082CA3-3D5A-704E-BB08-2B077C5DF505}" type="pres">
+      <dgm:prSet presAssocID="{D2CFBD69-2FB3-6D45-8C1B-BA064B393CC7}" presName="desTx" presStyleLbl="revTx" presStyleIdx="0" presStyleCnt="1">
+        <dgm:presLayoutVars>
+          <dgm:bulletEnabled val="1"/>
+        </dgm:presLayoutVars>
+      </dgm:prSet>
+      <dgm:spPr/>
+    </dgm:pt>
+    <dgm:pt modelId="{61A9788E-44E4-7E49-82F6-C6E88FC92D67}" type="pres">
+      <dgm:prSet presAssocID="{DE3BAE38-9EF9-F244-8DD8-BD928019CF03}" presName="space" presStyleCnt="0"/>
+      <dgm:spPr/>
+    </dgm:pt>
+    <dgm:pt modelId="{F0C3053A-F442-E946-8D2F-522094CEE763}" type="pres">
+      <dgm:prSet presAssocID="{7B95986C-2E8C-3D4C-805E-971490EAEA86}" presName="composite" presStyleCnt="0"/>
+      <dgm:spPr/>
+    </dgm:pt>
+    <dgm:pt modelId="{8664A529-603C-7A47-AE29-D2B246F60778}" type="pres">
+      <dgm:prSet presAssocID="{7B95986C-2E8C-3D4C-805E-971490EAEA86}" presName="parTx" presStyleLbl="node1" presStyleIdx="1" presStyleCnt="7">
+        <dgm:presLayoutVars>
+          <dgm:chMax val="0"/>
+          <dgm:chPref val="0"/>
+          <dgm:bulletEnabled val="1"/>
+        </dgm:presLayoutVars>
+      </dgm:prSet>
+      <dgm:spPr/>
+    </dgm:pt>
+    <dgm:pt modelId="{DD288B8D-1A79-1C4B-97B2-FFCFD58D56D5}" type="pres">
+      <dgm:prSet presAssocID="{7B95986C-2E8C-3D4C-805E-971490EAEA86}" presName="desTx" presStyleLbl="revTx" presStyleIdx="0" presStyleCnt="1">
+        <dgm:presLayoutVars>
+          <dgm:bulletEnabled val="1"/>
+        </dgm:presLayoutVars>
+      </dgm:prSet>
+      <dgm:spPr/>
+    </dgm:pt>
+    <dgm:pt modelId="{914DB325-9127-5D4D-8F0C-740D44DD330B}" type="pres">
+      <dgm:prSet presAssocID="{A3C8433B-E34E-5341-AE71-EA76BFF62C36}" presName="space" presStyleCnt="0"/>
+      <dgm:spPr/>
+    </dgm:pt>
+    <dgm:pt modelId="{1486C0AD-E855-214E-B9A1-950FAD763A97}" type="pres">
+      <dgm:prSet presAssocID="{8516B546-1B50-4B43-AE02-9D22AD937CC9}" presName="composite" presStyleCnt="0"/>
+      <dgm:spPr/>
+    </dgm:pt>
+    <dgm:pt modelId="{1024924A-DE42-1D4C-AB68-26A384A85F92}" type="pres">
+      <dgm:prSet presAssocID="{8516B546-1B50-4B43-AE02-9D22AD937CC9}" presName="parTx" presStyleLbl="node1" presStyleIdx="2" presStyleCnt="7">
+        <dgm:presLayoutVars>
+          <dgm:chMax val="0"/>
+          <dgm:chPref val="0"/>
+          <dgm:bulletEnabled val="1"/>
+        </dgm:presLayoutVars>
+      </dgm:prSet>
+      <dgm:spPr/>
+    </dgm:pt>
+    <dgm:pt modelId="{F8832075-8FE0-C942-9821-07E67AB49B76}" type="pres">
+      <dgm:prSet presAssocID="{8516B546-1B50-4B43-AE02-9D22AD937CC9}" presName="desTx" presStyleLbl="revTx" presStyleIdx="0" presStyleCnt="1">
+        <dgm:presLayoutVars>
+          <dgm:bulletEnabled val="1"/>
+        </dgm:presLayoutVars>
+      </dgm:prSet>
+      <dgm:spPr/>
+    </dgm:pt>
+    <dgm:pt modelId="{B4F91E86-71E4-214B-ACFF-0D7B71BF18E3}" type="pres">
+      <dgm:prSet presAssocID="{9691A920-B429-0144-A795-08EF36901925}" presName="space" presStyleCnt="0"/>
+      <dgm:spPr/>
+    </dgm:pt>
+    <dgm:pt modelId="{8D760514-0B57-1642-81AE-A552A487D264}" type="pres">
+      <dgm:prSet presAssocID="{5DD2C8AB-388F-A746-A202-3904BF0262F7}" presName="composite" presStyleCnt="0"/>
+      <dgm:spPr/>
+    </dgm:pt>
+    <dgm:pt modelId="{640EC91B-DE7D-1D4A-8FED-89050A22174A}" type="pres">
+      <dgm:prSet presAssocID="{5DD2C8AB-388F-A746-A202-3904BF0262F7}" presName="parTx" presStyleLbl="node1" presStyleIdx="3" presStyleCnt="7">
+        <dgm:presLayoutVars>
+          <dgm:chMax val="0"/>
+          <dgm:chPref val="0"/>
+          <dgm:bulletEnabled val="1"/>
+        </dgm:presLayoutVars>
+      </dgm:prSet>
+      <dgm:spPr/>
+    </dgm:pt>
+    <dgm:pt modelId="{4954F138-1325-F545-9D72-1306764DB1A6}" type="pres">
+      <dgm:prSet presAssocID="{5DD2C8AB-388F-A746-A202-3904BF0262F7}" presName="desTx" presStyleLbl="revTx" presStyleIdx="0" presStyleCnt="1">
+        <dgm:presLayoutVars>
+          <dgm:bulletEnabled val="1"/>
+        </dgm:presLayoutVars>
+      </dgm:prSet>
+      <dgm:spPr/>
+    </dgm:pt>
+    <dgm:pt modelId="{7278841F-297C-3F4F-81ED-ACBF3D72A19A}" type="pres">
+      <dgm:prSet presAssocID="{4D9210A1-8380-3646-AA27-57EE1963E295}" presName="space" presStyleCnt="0"/>
+      <dgm:spPr/>
+    </dgm:pt>
+    <dgm:pt modelId="{9C11C541-3193-E243-A7B4-C9076C1CD023}" type="pres">
+      <dgm:prSet presAssocID="{BEBE266C-FD14-524F-9216-152B26164655}" presName="composite" presStyleCnt="0"/>
+      <dgm:spPr/>
+    </dgm:pt>
+    <dgm:pt modelId="{E8FF6FE2-24A2-494C-8EBD-A9BB15958E50}" type="pres">
+      <dgm:prSet presAssocID="{BEBE266C-FD14-524F-9216-152B26164655}" presName="parTx" presStyleLbl="node1" presStyleIdx="4" presStyleCnt="7">
+        <dgm:presLayoutVars>
+          <dgm:chMax val="0"/>
+          <dgm:chPref val="0"/>
+          <dgm:bulletEnabled val="1"/>
+        </dgm:presLayoutVars>
+      </dgm:prSet>
+      <dgm:spPr/>
+    </dgm:pt>
+    <dgm:pt modelId="{D5E85A2B-EDEE-CD46-ABE7-C37E71131D96}" type="pres">
+      <dgm:prSet presAssocID="{BEBE266C-FD14-524F-9216-152B26164655}" presName="desTx" presStyleLbl="revTx" presStyleIdx="0" presStyleCnt="1">
+        <dgm:presLayoutVars>
+          <dgm:bulletEnabled val="1"/>
+        </dgm:presLayoutVars>
+      </dgm:prSet>
+      <dgm:spPr/>
+    </dgm:pt>
+    <dgm:pt modelId="{25F2B0FE-666E-4744-BE2C-2368009E04A1}" type="pres">
+      <dgm:prSet presAssocID="{C2967FE7-9DCC-3443-A4F0-66AB57365CD9}" presName="space" presStyleCnt="0"/>
+      <dgm:spPr/>
+    </dgm:pt>
+    <dgm:pt modelId="{3DB581AE-5E1B-C340-AC8D-AC64411618CC}" type="pres">
+      <dgm:prSet presAssocID="{7D45AC0C-1549-0445-9EF5-DF07189F47B5}" presName="composite" presStyleCnt="0"/>
+      <dgm:spPr/>
+    </dgm:pt>
+    <dgm:pt modelId="{FF9110FE-86B9-FD4C-A6A0-039FCEFA87F3}" type="pres">
+      <dgm:prSet presAssocID="{7D45AC0C-1549-0445-9EF5-DF07189F47B5}" presName="parTx" presStyleLbl="node1" presStyleIdx="5" presStyleCnt="7">
+        <dgm:presLayoutVars>
+          <dgm:chMax val="0"/>
+          <dgm:chPref val="0"/>
+          <dgm:bulletEnabled val="1"/>
+        </dgm:presLayoutVars>
+      </dgm:prSet>
+      <dgm:spPr/>
+    </dgm:pt>
+    <dgm:pt modelId="{81A2C5D8-2615-8A43-88F0-20F39D80985C}" type="pres">
+      <dgm:prSet presAssocID="{7D45AC0C-1549-0445-9EF5-DF07189F47B5}" presName="desTx" presStyleLbl="revTx" presStyleIdx="0" presStyleCnt="1">
+        <dgm:presLayoutVars>
+          <dgm:bulletEnabled val="1"/>
+        </dgm:presLayoutVars>
+      </dgm:prSet>
+      <dgm:spPr/>
+    </dgm:pt>
+    <dgm:pt modelId="{FF5F13DC-A2BB-9949-AEB8-89D5820F047B}" type="pres">
+      <dgm:prSet presAssocID="{74D6E566-6CF9-364B-BFFF-915D9CE53E41}" presName="space" presStyleCnt="0"/>
+      <dgm:spPr/>
+    </dgm:pt>
+    <dgm:pt modelId="{FAB486D3-04E5-414F-A2CE-88CE527FCDCA}" type="pres">
+      <dgm:prSet presAssocID="{7137169A-9F5C-C14B-BBF6-DBF2565A6EDA}" presName="composite" presStyleCnt="0"/>
+      <dgm:spPr/>
+    </dgm:pt>
+    <dgm:pt modelId="{013E2926-AAAF-B042-A93F-89A052C19028}" type="pres">
+      <dgm:prSet presAssocID="{7137169A-9F5C-C14B-BBF6-DBF2565A6EDA}" presName="parTx" presStyleLbl="node1" presStyleIdx="6" presStyleCnt="7">
+        <dgm:presLayoutVars>
+          <dgm:chMax val="0"/>
+          <dgm:chPref val="0"/>
+          <dgm:bulletEnabled val="1"/>
+        </dgm:presLayoutVars>
+      </dgm:prSet>
+      <dgm:spPr/>
+    </dgm:pt>
+    <dgm:pt modelId="{7E74538F-A901-3D46-BDA5-318E25C392B5}" type="pres">
+      <dgm:prSet presAssocID="{7137169A-9F5C-C14B-BBF6-DBF2565A6EDA}" presName="desTx" presStyleLbl="revTx" presStyleIdx="0" presStyleCnt="1">
+        <dgm:presLayoutVars>
+          <dgm:bulletEnabled val="1"/>
+        </dgm:presLayoutVars>
+      </dgm:prSet>
+      <dgm:spPr/>
+    </dgm:pt>
+  </dgm:ptLst>
+  <dgm:cxnLst>
+    <dgm:cxn modelId="{1E46400B-5CCD-6646-BE8C-8E0547B6F607}" type="presOf" srcId="{D2CFBD69-2FB3-6D45-8C1B-BA064B393CC7}" destId="{9C9B0ADF-3D17-9040-9297-4A0483709F4A}" srcOrd="0" destOrd="0" presId="urn:microsoft.com/office/officeart/2005/8/layout/chevron1"/>
+    <dgm:cxn modelId="{EA5CA114-668E-6744-B4BE-CCBFD2D387F2}" srcId="{BEBE266C-FD14-524F-9216-152B26164655}" destId="{4CA113F6-501B-DE4F-AE2E-DF63F16F3948}" srcOrd="1" destOrd="0" parTransId="{0D9C9905-462F-CB48-B21F-4B416EB80B36}" sibTransId="{292CC1AC-EDD9-5748-B246-F82DB34A2FFD}"/>
+    <dgm:cxn modelId="{9E4C9717-1526-8144-9102-B38D68BDBF69}" srcId="{BEBE266C-FD14-524F-9216-152B26164655}" destId="{075D9454-E699-754A-A46E-AE66DD7BA193}" srcOrd="2" destOrd="0" parTransId="{B03F75A1-412A-9C4E-99F5-7786BF10FC66}" sibTransId="{FAB06CDC-DBE4-2A46-891C-C6C03AD83F1C}"/>
+    <dgm:cxn modelId="{949D171F-B731-0D44-82A6-8F7AF500C911}" type="presOf" srcId="{7B95986C-2E8C-3D4C-805E-971490EAEA86}" destId="{8664A529-603C-7A47-AE29-D2B246F60778}" srcOrd="0" destOrd="0" presId="urn:microsoft.com/office/officeart/2005/8/layout/chevron1"/>
+    <dgm:cxn modelId="{3B734C24-126B-214A-B4C7-07C20C188A00}" type="presOf" srcId="{8516B546-1B50-4B43-AE02-9D22AD937CC9}" destId="{1024924A-DE42-1D4C-AB68-26A384A85F92}" srcOrd="0" destOrd="0" presId="urn:microsoft.com/office/officeart/2005/8/layout/chevron1"/>
+    <dgm:cxn modelId="{73C4F625-D062-454B-ABBF-A9A3FD8476F3}" srcId="{BEBE266C-FD14-524F-9216-152B26164655}" destId="{E7CC13C1-55B3-2243-8078-6AD725FA82E7}" srcOrd="3" destOrd="0" parTransId="{C669B2EC-B0C0-FC43-B4D4-018694A40755}" sibTransId="{B4B94ED3-3F67-3F48-908D-715EE99051AA}"/>
+    <dgm:cxn modelId="{2854EF32-7EDD-4D43-924C-FBE686CEECD5}" type="presOf" srcId="{075D9454-E699-754A-A46E-AE66DD7BA193}" destId="{D5E85A2B-EDEE-CD46-ABE7-C37E71131D96}" srcOrd="0" destOrd="2" presId="urn:microsoft.com/office/officeart/2005/8/layout/chevron1"/>
+    <dgm:cxn modelId="{0EC50B37-93A5-4F44-B414-87B2B1971017}" srcId="{BEBE266C-FD14-524F-9216-152B26164655}" destId="{89D276E0-300F-6A44-9FF4-D53C756F63CA}" srcOrd="4" destOrd="0" parTransId="{72E04AC8-0519-B246-9959-E9BA598858B0}" sibTransId="{30194E8E-7AFA-5942-B612-19A882163F65}"/>
+    <dgm:cxn modelId="{951D6437-7895-9E44-B148-51704E2FA9BF}" srcId="{BEBE266C-FD14-524F-9216-152B26164655}" destId="{15E9A8A2-5127-8843-9214-B4F2F38707EC}" srcOrd="6" destOrd="0" parTransId="{40B78355-C7C1-7F4E-AA6B-9E6BBB6628F2}" sibTransId="{17D6EEAE-3733-E24B-9D1E-69330F570AEB}"/>
+    <dgm:cxn modelId="{393EEC48-E213-344B-A393-F2403F663A12}" type="presOf" srcId="{BEBE266C-FD14-524F-9216-152B26164655}" destId="{E8FF6FE2-24A2-494C-8EBD-A9BB15958E50}" srcOrd="0" destOrd="0" presId="urn:microsoft.com/office/officeart/2005/8/layout/chevron1"/>
+    <dgm:cxn modelId="{965D025E-6FB7-3843-8292-C8A9DD5B292C}" srcId="{DBD182B4-2D75-7A4F-A2FC-0AECAA3538EE}" destId="{D2CFBD69-2FB3-6D45-8C1B-BA064B393CC7}" srcOrd="0" destOrd="0" parTransId="{CB6B4915-E06E-1D47-8D54-3338BDDE1F72}" sibTransId="{DE3BAE38-9EF9-F244-8DD8-BD928019CF03}"/>
+    <dgm:cxn modelId="{FFACE45E-F600-4548-8DE4-33A878484220}" srcId="{DBD182B4-2D75-7A4F-A2FC-0AECAA3538EE}" destId="{8516B546-1B50-4B43-AE02-9D22AD937CC9}" srcOrd="2" destOrd="0" parTransId="{53772A7C-480A-0247-BC7C-94204D912AE6}" sibTransId="{9691A920-B429-0144-A795-08EF36901925}"/>
+    <dgm:cxn modelId="{92456363-62C0-024A-B6BA-6E0DC0C68997}" type="presOf" srcId="{4CA113F6-501B-DE4F-AE2E-DF63F16F3948}" destId="{D5E85A2B-EDEE-CD46-ABE7-C37E71131D96}" srcOrd="0" destOrd="1" presId="urn:microsoft.com/office/officeart/2005/8/layout/chevron1"/>
+    <dgm:cxn modelId="{80460F64-782D-A843-8803-5B2F91CA0769}" type="presOf" srcId="{15E9A8A2-5127-8843-9214-B4F2F38707EC}" destId="{D5E85A2B-EDEE-CD46-ABE7-C37E71131D96}" srcOrd="0" destOrd="6" presId="urn:microsoft.com/office/officeart/2005/8/layout/chevron1"/>
+    <dgm:cxn modelId="{BD55B967-3DB4-7246-9204-9AEFFAC3DB55}" type="presOf" srcId="{5DD2C8AB-388F-A746-A202-3904BF0262F7}" destId="{640EC91B-DE7D-1D4A-8FED-89050A22174A}" srcOrd="0" destOrd="0" presId="urn:microsoft.com/office/officeart/2005/8/layout/chevron1"/>
+    <dgm:cxn modelId="{DA9A7274-9E2D-F741-8D14-20686BF90788}" type="presOf" srcId="{7D45AC0C-1549-0445-9EF5-DF07189F47B5}" destId="{FF9110FE-86B9-FD4C-A6A0-039FCEFA87F3}" srcOrd="0" destOrd="0" presId="urn:microsoft.com/office/officeart/2005/8/layout/chevron1"/>
+    <dgm:cxn modelId="{D431AE79-8596-0F4B-9AB2-338FB8CCEB9A}" srcId="{DBD182B4-2D75-7A4F-A2FC-0AECAA3538EE}" destId="{5DD2C8AB-388F-A746-A202-3904BF0262F7}" srcOrd="3" destOrd="0" parTransId="{174160FA-8093-EC4F-B150-81626241BFB4}" sibTransId="{4D9210A1-8380-3646-AA27-57EE1963E295}"/>
+    <dgm:cxn modelId="{CDAE9D8C-08BE-D449-BBC5-53A6F6BD3E59}" type="presOf" srcId="{7137169A-9F5C-C14B-BBF6-DBF2565A6EDA}" destId="{013E2926-AAAF-B042-A93F-89A052C19028}" srcOrd="0" destOrd="0" presId="urn:microsoft.com/office/officeart/2005/8/layout/chevron1"/>
+    <dgm:cxn modelId="{B63FB892-D890-CE4C-8C19-C3E4E7BF0AD8}" srcId="{BEBE266C-FD14-524F-9216-152B26164655}" destId="{E4B901F6-3035-AB42-9D09-346234B8A040}" srcOrd="5" destOrd="0" parTransId="{19459E5E-9D67-054D-B801-CFB4D6E1491D}" sibTransId="{3A906D02-0023-D844-9CC8-51D6F97A563F}"/>
+    <dgm:cxn modelId="{F6B91493-763C-3546-B577-9C0B6B1AC68E}" type="presOf" srcId="{E7CC13C1-55B3-2243-8078-6AD725FA82E7}" destId="{D5E85A2B-EDEE-CD46-ABE7-C37E71131D96}" srcOrd="0" destOrd="3" presId="urn:microsoft.com/office/officeart/2005/8/layout/chevron1"/>
+    <dgm:cxn modelId="{E626A29B-4A7D-214F-98D4-339183511ECD}" srcId="{DBD182B4-2D75-7A4F-A2FC-0AECAA3538EE}" destId="{7137169A-9F5C-C14B-BBF6-DBF2565A6EDA}" srcOrd="6" destOrd="0" parTransId="{B4E14A10-42C1-154F-9F34-F7AD4A68004D}" sibTransId="{768AD082-9CC0-B64E-BB0D-BDFC361AD6FA}"/>
+    <dgm:cxn modelId="{6C9CF2B5-D47F-7845-9E0B-44F11393529E}" type="presOf" srcId="{DBD182B4-2D75-7A4F-A2FC-0AECAA3538EE}" destId="{787F3AD5-8B12-7145-9DAE-680EE985F5BE}" srcOrd="0" destOrd="0" presId="urn:microsoft.com/office/officeart/2005/8/layout/chevron1"/>
+    <dgm:cxn modelId="{326255C0-78F6-E644-8DFE-60127613BFDF}" srcId="{DBD182B4-2D75-7A4F-A2FC-0AECAA3538EE}" destId="{BEBE266C-FD14-524F-9216-152B26164655}" srcOrd="4" destOrd="0" parTransId="{0E6563E2-25F9-AA47-930F-BED666372518}" sibTransId="{C2967FE7-9DCC-3443-A4F0-66AB57365CD9}"/>
+    <dgm:cxn modelId="{D894BCD2-2FAC-0743-8DDA-1F27BC59B96E}" type="presOf" srcId="{89D276E0-300F-6A44-9FF4-D53C756F63CA}" destId="{D5E85A2B-EDEE-CD46-ABE7-C37E71131D96}" srcOrd="0" destOrd="4" presId="urn:microsoft.com/office/officeart/2005/8/layout/chevron1"/>
+    <dgm:cxn modelId="{EF64DFD6-FEC3-8D49-A1B7-3C2ED5B647F6}" srcId="{DBD182B4-2D75-7A4F-A2FC-0AECAA3538EE}" destId="{7B95986C-2E8C-3D4C-805E-971490EAEA86}" srcOrd="1" destOrd="0" parTransId="{AC2F641D-9D76-C14D-88E1-CFB4C0A10DA6}" sibTransId="{A3C8433B-E34E-5341-AE71-EA76BFF62C36}"/>
+    <dgm:cxn modelId="{436986D8-EF06-CA4E-BA5D-1FB48B95EBB0}" type="presOf" srcId="{BB5D2B04-E8E3-DD4D-839F-05C436E52E03}" destId="{D5E85A2B-EDEE-CD46-ABE7-C37E71131D96}" srcOrd="0" destOrd="0" presId="urn:microsoft.com/office/officeart/2005/8/layout/chevron1"/>
+    <dgm:cxn modelId="{0B8C4DEA-B9FB-D540-B251-BCDB9BF6B25E}" srcId="{DBD182B4-2D75-7A4F-A2FC-0AECAA3538EE}" destId="{7D45AC0C-1549-0445-9EF5-DF07189F47B5}" srcOrd="5" destOrd="0" parTransId="{4C77031D-D952-BC45-97A3-847F2CCFA9EA}" sibTransId="{74D6E566-6CF9-364B-BFFF-915D9CE53E41}"/>
+    <dgm:cxn modelId="{E1480FEE-3A92-D447-844C-99B94CF86CCE}" srcId="{BEBE266C-FD14-524F-9216-152B26164655}" destId="{BB5D2B04-E8E3-DD4D-839F-05C436E52E03}" srcOrd="0" destOrd="0" parTransId="{CE646CB5-B24E-714C-B78E-AB879A56106B}" sibTransId="{D54AF4A8-1328-CC47-B9E6-80DDD5DFB276}"/>
+    <dgm:cxn modelId="{8B3A58F7-58FA-B54A-B2C9-2EA5901A42F0}" type="presOf" srcId="{E4B901F6-3035-AB42-9D09-346234B8A040}" destId="{D5E85A2B-EDEE-CD46-ABE7-C37E71131D96}" srcOrd="0" destOrd="5" presId="urn:microsoft.com/office/officeart/2005/8/layout/chevron1"/>
+    <dgm:cxn modelId="{DE518AF9-37AD-954E-9906-6F6C68C85C0E}" type="presParOf" srcId="{787F3AD5-8B12-7145-9DAE-680EE985F5BE}" destId="{47CF1808-84BD-6E45-A9F5-097A1B131186}" srcOrd="0" destOrd="0" presId="urn:microsoft.com/office/officeart/2005/8/layout/chevron1"/>
+    <dgm:cxn modelId="{D8E3CF90-1407-9344-8B24-D2943E23796A}" type="presParOf" srcId="{47CF1808-84BD-6E45-A9F5-097A1B131186}" destId="{9C9B0ADF-3D17-9040-9297-4A0483709F4A}" srcOrd="0" destOrd="0" presId="urn:microsoft.com/office/officeart/2005/8/layout/chevron1"/>
+    <dgm:cxn modelId="{331FAEB0-9913-3844-A4CB-F047F56EEFD9}" type="presParOf" srcId="{47CF1808-84BD-6E45-A9F5-097A1B131186}" destId="{34082CA3-3D5A-704E-BB08-2B077C5DF505}" srcOrd="1" destOrd="0" presId="urn:microsoft.com/office/officeart/2005/8/layout/chevron1"/>
+    <dgm:cxn modelId="{0400B37F-B09D-AB45-9B21-6A6B01095FC7}" type="presParOf" srcId="{787F3AD5-8B12-7145-9DAE-680EE985F5BE}" destId="{61A9788E-44E4-7E49-82F6-C6E88FC92D67}" srcOrd="1" destOrd="0" presId="urn:microsoft.com/office/officeart/2005/8/layout/chevron1"/>
+    <dgm:cxn modelId="{99ECB0CA-6E99-024C-B251-349C7EEC15D8}" type="presParOf" srcId="{787F3AD5-8B12-7145-9DAE-680EE985F5BE}" destId="{F0C3053A-F442-E946-8D2F-522094CEE763}" srcOrd="2" destOrd="0" presId="urn:microsoft.com/office/officeart/2005/8/layout/chevron1"/>
+    <dgm:cxn modelId="{D7E0EE9E-3E86-E648-821A-BCE52238C653}" type="presParOf" srcId="{F0C3053A-F442-E946-8D2F-522094CEE763}" destId="{8664A529-603C-7A47-AE29-D2B246F60778}" srcOrd="0" destOrd="0" presId="urn:microsoft.com/office/officeart/2005/8/layout/chevron1"/>
+    <dgm:cxn modelId="{AA2CB8EE-3EB4-7A49-B7D4-8B8C5AC4CFFA}" type="presParOf" srcId="{F0C3053A-F442-E946-8D2F-522094CEE763}" destId="{DD288B8D-1A79-1C4B-97B2-FFCFD58D56D5}" srcOrd="1" destOrd="0" presId="urn:microsoft.com/office/officeart/2005/8/layout/chevron1"/>
+    <dgm:cxn modelId="{77889DE6-C50E-CA45-A566-3AB32B31F2D0}" type="presParOf" srcId="{787F3AD5-8B12-7145-9DAE-680EE985F5BE}" destId="{914DB325-9127-5D4D-8F0C-740D44DD330B}" srcOrd="3" destOrd="0" presId="urn:microsoft.com/office/officeart/2005/8/layout/chevron1"/>
+    <dgm:cxn modelId="{CEEE729E-AC6E-EC46-9097-66C8B4A0AA00}" type="presParOf" srcId="{787F3AD5-8B12-7145-9DAE-680EE985F5BE}" destId="{1486C0AD-E855-214E-B9A1-950FAD763A97}" srcOrd="4" destOrd="0" presId="urn:microsoft.com/office/officeart/2005/8/layout/chevron1"/>
+    <dgm:cxn modelId="{A8AEAAE2-5211-774B-B150-67348223DE60}" type="presParOf" srcId="{1486C0AD-E855-214E-B9A1-950FAD763A97}" destId="{1024924A-DE42-1D4C-AB68-26A384A85F92}" srcOrd="0" destOrd="0" presId="urn:microsoft.com/office/officeart/2005/8/layout/chevron1"/>
+    <dgm:cxn modelId="{133C62F1-ECB8-AC42-B929-17A9172DACA8}" type="presParOf" srcId="{1486C0AD-E855-214E-B9A1-950FAD763A97}" destId="{F8832075-8FE0-C942-9821-07E67AB49B76}" srcOrd="1" destOrd="0" presId="urn:microsoft.com/office/officeart/2005/8/layout/chevron1"/>
+    <dgm:cxn modelId="{A443D6A6-8CB1-CB4E-A535-BAB8C9A325F0}" type="presParOf" srcId="{787F3AD5-8B12-7145-9DAE-680EE985F5BE}" destId="{B4F91E86-71E4-214B-ACFF-0D7B71BF18E3}" srcOrd="5" destOrd="0" presId="urn:microsoft.com/office/officeart/2005/8/layout/chevron1"/>
+    <dgm:cxn modelId="{327D99E0-A750-5C4C-B000-690AC83C050F}" type="presParOf" srcId="{787F3AD5-8B12-7145-9DAE-680EE985F5BE}" destId="{8D760514-0B57-1642-81AE-A552A487D264}" srcOrd="6" destOrd="0" presId="urn:microsoft.com/office/officeart/2005/8/layout/chevron1"/>
+    <dgm:cxn modelId="{16F60743-05D2-4046-9185-7C68B71FCB77}" type="presParOf" srcId="{8D760514-0B57-1642-81AE-A552A487D264}" destId="{640EC91B-DE7D-1D4A-8FED-89050A22174A}" srcOrd="0" destOrd="0" presId="urn:microsoft.com/office/officeart/2005/8/layout/chevron1"/>
+    <dgm:cxn modelId="{8834924A-C39C-304F-8972-CAA0A57DBA43}" type="presParOf" srcId="{8D760514-0B57-1642-81AE-A552A487D264}" destId="{4954F138-1325-F545-9D72-1306764DB1A6}" srcOrd="1" destOrd="0" presId="urn:microsoft.com/office/officeart/2005/8/layout/chevron1"/>
+    <dgm:cxn modelId="{86D4ACA4-2CFA-AF44-B91D-C63CB75CA7C2}" type="presParOf" srcId="{787F3AD5-8B12-7145-9DAE-680EE985F5BE}" destId="{7278841F-297C-3F4F-81ED-ACBF3D72A19A}" srcOrd="7" destOrd="0" presId="urn:microsoft.com/office/officeart/2005/8/layout/chevron1"/>
+    <dgm:cxn modelId="{E210D943-AC87-5B4E-9F40-37834E8EC40E}" type="presParOf" srcId="{787F3AD5-8B12-7145-9DAE-680EE985F5BE}" destId="{9C11C541-3193-E243-A7B4-C9076C1CD023}" srcOrd="8" destOrd="0" presId="urn:microsoft.com/office/officeart/2005/8/layout/chevron1"/>
+    <dgm:cxn modelId="{F136CF6B-009D-D74F-987B-A4701E681ABB}" type="presParOf" srcId="{9C11C541-3193-E243-A7B4-C9076C1CD023}" destId="{E8FF6FE2-24A2-494C-8EBD-A9BB15958E50}" srcOrd="0" destOrd="0" presId="urn:microsoft.com/office/officeart/2005/8/layout/chevron1"/>
+    <dgm:cxn modelId="{697DE2ED-9E46-8646-B471-B884D791E492}" type="presParOf" srcId="{9C11C541-3193-E243-A7B4-C9076C1CD023}" destId="{D5E85A2B-EDEE-CD46-ABE7-C37E71131D96}" srcOrd="1" destOrd="0" presId="urn:microsoft.com/office/officeart/2005/8/layout/chevron1"/>
+    <dgm:cxn modelId="{75B5B2CE-1C29-154B-ACDE-52F5D031B2C1}" type="presParOf" srcId="{787F3AD5-8B12-7145-9DAE-680EE985F5BE}" destId="{25F2B0FE-666E-4744-BE2C-2368009E04A1}" srcOrd="9" destOrd="0" presId="urn:microsoft.com/office/officeart/2005/8/layout/chevron1"/>
+    <dgm:cxn modelId="{473DB32D-E1F6-6047-A2D1-3A833425F63F}" type="presParOf" srcId="{787F3AD5-8B12-7145-9DAE-680EE985F5BE}" destId="{3DB581AE-5E1B-C340-AC8D-AC64411618CC}" srcOrd="10" destOrd="0" presId="urn:microsoft.com/office/officeart/2005/8/layout/chevron1"/>
+    <dgm:cxn modelId="{017C8111-421D-794E-AF11-2DF1E13556BE}" type="presParOf" srcId="{3DB581AE-5E1B-C340-AC8D-AC64411618CC}" destId="{FF9110FE-86B9-FD4C-A6A0-039FCEFA87F3}" srcOrd="0" destOrd="0" presId="urn:microsoft.com/office/officeart/2005/8/layout/chevron1"/>
+    <dgm:cxn modelId="{B5AE98F3-02D0-3F43-966E-5B5561B36F5E}" type="presParOf" srcId="{3DB581AE-5E1B-C340-AC8D-AC64411618CC}" destId="{81A2C5D8-2615-8A43-88F0-20F39D80985C}" srcOrd="1" destOrd="0" presId="urn:microsoft.com/office/officeart/2005/8/layout/chevron1"/>
+    <dgm:cxn modelId="{4FFCA647-C27C-7E4F-A243-C0E81652E8BF}" type="presParOf" srcId="{787F3AD5-8B12-7145-9DAE-680EE985F5BE}" destId="{FF5F13DC-A2BB-9949-AEB8-89D5820F047B}" srcOrd="11" destOrd="0" presId="urn:microsoft.com/office/officeart/2005/8/layout/chevron1"/>
+    <dgm:cxn modelId="{9ED96211-8A28-994C-A434-53D6A82E58C2}" type="presParOf" srcId="{787F3AD5-8B12-7145-9DAE-680EE985F5BE}" destId="{FAB486D3-04E5-414F-A2CE-88CE527FCDCA}" srcOrd="12" destOrd="0" presId="urn:microsoft.com/office/officeart/2005/8/layout/chevron1"/>
+    <dgm:cxn modelId="{13726BD1-0C90-9449-A43E-E1D19A6AD148}" type="presParOf" srcId="{FAB486D3-04E5-414F-A2CE-88CE527FCDCA}" destId="{013E2926-AAAF-B042-A93F-89A052C19028}" srcOrd="0" destOrd="0" presId="urn:microsoft.com/office/officeart/2005/8/layout/chevron1"/>
+    <dgm:cxn modelId="{ACEB6D1C-B431-ED4E-8E41-E6E6DB75CF5A}" type="presParOf" srcId="{FAB486D3-04E5-414F-A2CE-88CE527FCDCA}" destId="{7E74538F-A901-3D46-BDA5-318E25C392B5}" srcOrd="1" destOrd="0" presId="urn:microsoft.com/office/officeart/2005/8/layout/chevron1"/>
   </dgm:cxnLst>
   <dgm:bg/>
   <dgm:whole/>
@@ -3719,6 +5273,735 @@
 </dsp:drawing>
 </file>
 
+<file path=ppt/diagrams/drawing3.xml><?xml version="1.0" encoding="utf-8"?>
+<dsp:drawing xmlns:dgm="http://schemas.openxmlformats.org/drawingml/2006/diagram" xmlns:dsp="http://schemas.microsoft.com/office/drawing/2008/diagram" xmlns:a="http://schemas.openxmlformats.org/drawingml/2006/main">
+  <dsp:spTree>
+    <dsp:nvGrpSpPr>
+      <dsp:cNvPr id="0" name=""/>
+      <dsp:cNvGrpSpPr/>
+    </dsp:nvGrpSpPr>
+    <dsp:grpSpPr/>
+    <dsp:sp modelId="{9C9B0ADF-3D17-9040-9297-4A0483709F4A}">
+      <dsp:nvSpPr>
+        <dsp:cNvPr id="0" name=""/>
+        <dsp:cNvSpPr/>
+      </dsp:nvSpPr>
+      <dsp:spPr>
+        <a:xfrm>
+          <a:off x="2689" y="1655935"/>
+          <a:ext cx="1847804" cy="702000"/>
+        </a:xfrm>
+        <a:prstGeom prst="chevron">
+          <a:avLst/>
+        </a:prstGeom>
+        <a:solidFill>
+          <a:schemeClr val="accent5">
+            <a:hueOff val="0"/>
+            <a:satOff val="0"/>
+            <a:lumOff val="0"/>
+            <a:alphaOff val="0"/>
+          </a:schemeClr>
+        </a:solidFill>
+        <a:ln w="12700" cap="flat" cmpd="sng" algn="ctr">
+          <a:solidFill>
+            <a:schemeClr val="lt1">
+              <a:hueOff val="0"/>
+              <a:satOff val="0"/>
+              <a:lumOff val="0"/>
+              <a:alphaOff val="0"/>
+            </a:schemeClr>
+          </a:solidFill>
+          <a:prstDash val="solid"/>
+          <a:miter lim="800000"/>
+        </a:ln>
+        <a:effectLst/>
+      </dsp:spPr>
+      <dsp:style>
+        <a:lnRef idx="2">
+          <a:scrgbClr r="0" g="0" b="0"/>
+        </a:lnRef>
+        <a:fillRef idx="1">
+          <a:scrgbClr r="0" g="0" b="0"/>
+        </a:fillRef>
+        <a:effectRef idx="0">
+          <a:scrgbClr r="0" g="0" b="0"/>
+        </a:effectRef>
+        <a:fontRef idx="minor">
+          <a:schemeClr val="lt1"/>
+        </a:fontRef>
+      </dsp:style>
+      <dsp:txBody>
+        <a:bodyPr spcFirstLastPara="0" vert="horz" wrap="square" lIns="52007" tIns="17336" rIns="17336" bIns="17336" numCol="1" spcCol="1270" anchor="ctr" anchorCtr="0">
+          <a:noAutofit/>
+        </a:bodyPr>
+        <a:lstStyle/>
+        <a:p>
+          <a:pPr marL="0" lvl="0" indent="0" algn="ctr" defTabSz="577850">
+            <a:lnSpc>
+              <a:spcPct val="90000"/>
+            </a:lnSpc>
+            <a:spcBef>
+              <a:spcPct val="0"/>
+            </a:spcBef>
+            <a:spcAft>
+              <a:spcPct val="35000"/>
+            </a:spcAft>
+            <a:buNone/>
+          </a:pPr>
+          <a:r>
+            <a:rPr lang="en-US" sz="1300" b="0" i="0" u="none" kern="1200" dirty="0"/>
+            <a:t>Data Preprocessing &amp; EDA</a:t>
+          </a:r>
+          <a:endParaRPr lang="en-US" sz="1300" kern="1200" dirty="0"/>
+        </a:p>
+      </dsp:txBody>
+      <dsp:txXfrm>
+        <a:off x="353689" y="1655935"/>
+        <a:ext cx="1145804" cy="702000"/>
+      </dsp:txXfrm>
+    </dsp:sp>
+    <dsp:sp modelId="{8664A529-603C-7A47-AE29-D2B246F60778}">
+      <dsp:nvSpPr>
+        <dsp:cNvPr id="0" name=""/>
+        <dsp:cNvSpPr/>
+      </dsp:nvSpPr>
+      <dsp:spPr>
+        <a:xfrm>
+          <a:off x="1634493" y="1655935"/>
+          <a:ext cx="1847804" cy="702000"/>
+        </a:xfrm>
+        <a:prstGeom prst="chevron">
+          <a:avLst/>
+        </a:prstGeom>
+        <a:solidFill>
+          <a:schemeClr val="accent5">
+            <a:hueOff val="-1126424"/>
+            <a:satOff val="-2903"/>
+            <a:lumOff val="-1961"/>
+            <a:alphaOff val="0"/>
+          </a:schemeClr>
+        </a:solidFill>
+        <a:ln w="12700" cap="flat" cmpd="sng" algn="ctr">
+          <a:solidFill>
+            <a:schemeClr val="lt1">
+              <a:hueOff val="0"/>
+              <a:satOff val="0"/>
+              <a:lumOff val="0"/>
+              <a:alphaOff val="0"/>
+            </a:schemeClr>
+          </a:solidFill>
+          <a:prstDash val="solid"/>
+          <a:miter lim="800000"/>
+        </a:ln>
+        <a:effectLst/>
+      </dsp:spPr>
+      <dsp:style>
+        <a:lnRef idx="2">
+          <a:scrgbClr r="0" g="0" b="0"/>
+        </a:lnRef>
+        <a:fillRef idx="1">
+          <a:scrgbClr r="0" g="0" b="0"/>
+        </a:fillRef>
+        <a:effectRef idx="0">
+          <a:scrgbClr r="0" g="0" b="0"/>
+        </a:effectRef>
+        <a:fontRef idx="minor">
+          <a:schemeClr val="lt1"/>
+        </a:fontRef>
+      </dsp:style>
+      <dsp:txBody>
+        <a:bodyPr spcFirstLastPara="0" vert="horz" wrap="square" lIns="52007" tIns="17336" rIns="17336" bIns="17336" numCol="1" spcCol="1270" anchor="ctr" anchorCtr="0">
+          <a:noAutofit/>
+        </a:bodyPr>
+        <a:lstStyle/>
+        <a:p>
+          <a:pPr marL="0" lvl="0" indent="0" algn="ctr" defTabSz="577850">
+            <a:lnSpc>
+              <a:spcPct val="90000"/>
+            </a:lnSpc>
+            <a:spcBef>
+              <a:spcPct val="0"/>
+            </a:spcBef>
+            <a:spcAft>
+              <a:spcPct val="35000"/>
+            </a:spcAft>
+            <a:buNone/>
+          </a:pPr>
+          <a:r>
+            <a:rPr lang="en-US" sz="1300" b="0" i="0" u="none" kern="1200" dirty="0"/>
+            <a:t>Feature Engineering</a:t>
+          </a:r>
+          <a:endParaRPr lang="en-US" sz="1300" kern="1200" dirty="0"/>
+        </a:p>
+      </dsp:txBody>
+      <dsp:txXfrm>
+        <a:off x="1985493" y="1655935"/>
+        <a:ext cx="1145804" cy="702000"/>
+      </dsp:txXfrm>
+    </dsp:sp>
+    <dsp:sp modelId="{1024924A-DE42-1D4C-AB68-26A384A85F92}">
+      <dsp:nvSpPr>
+        <dsp:cNvPr id="0" name=""/>
+        <dsp:cNvSpPr/>
+      </dsp:nvSpPr>
+      <dsp:spPr>
+        <a:xfrm>
+          <a:off x="3266297" y="1655935"/>
+          <a:ext cx="1847804" cy="702000"/>
+        </a:xfrm>
+        <a:prstGeom prst="chevron">
+          <a:avLst/>
+        </a:prstGeom>
+        <a:solidFill>
+          <a:schemeClr val="accent5">
+            <a:hueOff val="-2252848"/>
+            <a:satOff val="-5806"/>
+            <a:lumOff val="-3922"/>
+            <a:alphaOff val="0"/>
+          </a:schemeClr>
+        </a:solidFill>
+        <a:ln w="12700" cap="flat" cmpd="sng" algn="ctr">
+          <a:solidFill>
+            <a:schemeClr val="lt1">
+              <a:hueOff val="0"/>
+              <a:satOff val="0"/>
+              <a:lumOff val="0"/>
+              <a:alphaOff val="0"/>
+            </a:schemeClr>
+          </a:solidFill>
+          <a:prstDash val="solid"/>
+          <a:miter lim="800000"/>
+        </a:ln>
+        <a:effectLst/>
+      </dsp:spPr>
+      <dsp:style>
+        <a:lnRef idx="2">
+          <a:scrgbClr r="0" g="0" b="0"/>
+        </a:lnRef>
+        <a:fillRef idx="1">
+          <a:scrgbClr r="0" g="0" b="0"/>
+        </a:fillRef>
+        <a:effectRef idx="0">
+          <a:scrgbClr r="0" g="0" b="0"/>
+        </a:effectRef>
+        <a:fontRef idx="minor">
+          <a:schemeClr val="lt1"/>
+        </a:fontRef>
+      </dsp:style>
+      <dsp:txBody>
+        <a:bodyPr spcFirstLastPara="0" vert="horz" wrap="square" lIns="52007" tIns="17336" rIns="17336" bIns="17336" numCol="1" spcCol="1270" anchor="ctr" anchorCtr="0">
+          <a:noAutofit/>
+        </a:bodyPr>
+        <a:lstStyle/>
+        <a:p>
+          <a:pPr marL="0" lvl="0" indent="0" algn="ctr" defTabSz="577850">
+            <a:lnSpc>
+              <a:spcPct val="90000"/>
+            </a:lnSpc>
+            <a:spcBef>
+              <a:spcPct val="0"/>
+            </a:spcBef>
+            <a:spcAft>
+              <a:spcPct val="35000"/>
+            </a:spcAft>
+            <a:buNone/>
+          </a:pPr>
+          <a:r>
+            <a:rPr lang="en-US" sz="1300" b="0" i="0" u="none" kern="1200" dirty="0"/>
+            <a:t>Baseline LR Model Training</a:t>
+          </a:r>
+          <a:endParaRPr lang="en-US" sz="1300" kern="1200" dirty="0"/>
+        </a:p>
+      </dsp:txBody>
+      <dsp:txXfrm>
+        <a:off x="3617297" y="1655935"/>
+        <a:ext cx="1145804" cy="702000"/>
+      </dsp:txXfrm>
+    </dsp:sp>
+    <dsp:sp modelId="{640EC91B-DE7D-1D4A-8FED-89050A22174A}">
+      <dsp:nvSpPr>
+        <dsp:cNvPr id="0" name=""/>
+        <dsp:cNvSpPr/>
+      </dsp:nvSpPr>
+      <dsp:spPr>
+        <a:xfrm>
+          <a:off x="4898101" y="1655935"/>
+          <a:ext cx="1847804" cy="702000"/>
+        </a:xfrm>
+        <a:prstGeom prst="chevron">
+          <a:avLst/>
+        </a:prstGeom>
+        <a:solidFill>
+          <a:schemeClr val="accent5">
+            <a:hueOff val="-3379271"/>
+            <a:satOff val="-8710"/>
+            <a:lumOff val="-5883"/>
+            <a:alphaOff val="0"/>
+          </a:schemeClr>
+        </a:solidFill>
+        <a:ln w="12700" cap="flat" cmpd="sng" algn="ctr">
+          <a:solidFill>
+            <a:schemeClr val="lt1">
+              <a:hueOff val="0"/>
+              <a:satOff val="0"/>
+              <a:lumOff val="0"/>
+              <a:alphaOff val="0"/>
+            </a:schemeClr>
+          </a:solidFill>
+          <a:prstDash val="solid"/>
+          <a:miter lim="800000"/>
+        </a:ln>
+        <a:effectLst/>
+      </dsp:spPr>
+      <dsp:style>
+        <a:lnRef idx="2">
+          <a:scrgbClr r="0" g="0" b="0"/>
+        </a:lnRef>
+        <a:fillRef idx="1">
+          <a:scrgbClr r="0" g="0" b="0"/>
+        </a:fillRef>
+        <a:effectRef idx="0">
+          <a:scrgbClr r="0" g="0" b="0"/>
+        </a:effectRef>
+        <a:fontRef idx="minor">
+          <a:schemeClr val="lt1"/>
+        </a:fontRef>
+      </dsp:style>
+      <dsp:txBody>
+        <a:bodyPr spcFirstLastPara="0" vert="horz" wrap="square" lIns="52007" tIns="17336" rIns="17336" bIns="17336" numCol="1" spcCol="1270" anchor="ctr" anchorCtr="0">
+          <a:noAutofit/>
+        </a:bodyPr>
+        <a:lstStyle/>
+        <a:p>
+          <a:pPr marL="0" lvl="0" indent="0" algn="ctr" defTabSz="577850">
+            <a:lnSpc>
+              <a:spcPct val="90000"/>
+            </a:lnSpc>
+            <a:spcBef>
+              <a:spcPct val="0"/>
+            </a:spcBef>
+            <a:spcAft>
+              <a:spcPct val="35000"/>
+            </a:spcAft>
+            <a:buNone/>
+          </a:pPr>
+          <a:r>
+            <a:rPr lang="en-US" sz="1300" kern="1200" dirty="0"/>
+            <a:t>Baseline Model Evaluation</a:t>
+          </a:r>
+        </a:p>
+      </dsp:txBody>
+      <dsp:txXfrm>
+        <a:off x="5249101" y="1655935"/>
+        <a:ext cx="1145804" cy="702000"/>
+      </dsp:txXfrm>
+    </dsp:sp>
+    <dsp:sp modelId="{E8FF6FE2-24A2-494C-8EBD-A9BB15958E50}">
+      <dsp:nvSpPr>
+        <dsp:cNvPr id="0" name=""/>
+        <dsp:cNvSpPr/>
+      </dsp:nvSpPr>
+      <dsp:spPr>
+        <a:xfrm>
+          <a:off x="6529906" y="1655935"/>
+          <a:ext cx="1847804" cy="702000"/>
+        </a:xfrm>
+        <a:prstGeom prst="chevron">
+          <a:avLst/>
+        </a:prstGeom>
+        <a:solidFill>
+          <a:schemeClr val="accent5">
+            <a:hueOff val="-4505695"/>
+            <a:satOff val="-11613"/>
+            <a:lumOff val="-7843"/>
+            <a:alphaOff val="0"/>
+          </a:schemeClr>
+        </a:solidFill>
+        <a:ln w="12700" cap="flat" cmpd="sng" algn="ctr">
+          <a:solidFill>
+            <a:schemeClr val="lt1">
+              <a:hueOff val="0"/>
+              <a:satOff val="0"/>
+              <a:lumOff val="0"/>
+              <a:alphaOff val="0"/>
+            </a:schemeClr>
+          </a:solidFill>
+          <a:prstDash val="solid"/>
+          <a:miter lim="800000"/>
+        </a:ln>
+        <a:effectLst/>
+      </dsp:spPr>
+      <dsp:style>
+        <a:lnRef idx="2">
+          <a:scrgbClr r="0" g="0" b="0"/>
+        </a:lnRef>
+        <a:fillRef idx="1">
+          <a:scrgbClr r="0" g="0" b="0"/>
+        </a:fillRef>
+        <a:effectRef idx="0">
+          <a:scrgbClr r="0" g="0" b="0"/>
+        </a:effectRef>
+        <a:fontRef idx="minor">
+          <a:schemeClr val="lt1"/>
+        </a:fontRef>
+      </dsp:style>
+      <dsp:txBody>
+        <a:bodyPr spcFirstLastPara="0" vert="horz" wrap="square" lIns="52007" tIns="17336" rIns="17336" bIns="17336" numCol="1" spcCol="1270" anchor="ctr" anchorCtr="0">
+          <a:noAutofit/>
+        </a:bodyPr>
+        <a:lstStyle/>
+        <a:p>
+          <a:pPr marL="0" lvl="0" indent="0" algn="ctr" defTabSz="577850">
+            <a:lnSpc>
+              <a:spcPct val="90000"/>
+            </a:lnSpc>
+            <a:spcBef>
+              <a:spcPct val="0"/>
+            </a:spcBef>
+            <a:spcAft>
+              <a:spcPct val="35000"/>
+            </a:spcAft>
+            <a:buNone/>
+          </a:pPr>
+          <a:r>
+            <a:rPr lang="en-US" sz="1300" kern="1200" dirty="0"/>
+            <a:t>Model Training with Parameter Tuning</a:t>
+          </a:r>
+        </a:p>
+      </dsp:txBody>
+      <dsp:txXfrm>
+        <a:off x="6880906" y="1655935"/>
+        <a:ext cx="1145804" cy="702000"/>
+      </dsp:txXfrm>
+    </dsp:sp>
+    <dsp:sp modelId="{D5E85A2B-EDEE-CD46-ABE7-C37E71131D96}">
+      <dsp:nvSpPr>
+        <dsp:cNvPr id="0" name=""/>
+        <dsp:cNvSpPr/>
+      </dsp:nvSpPr>
+      <dsp:spPr>
+        <a:xfrm>
+          <a:off x="6529906" y="2445685"/>
+          <a:ext cx="1478243" cy="1462500"/>
+        </a:xfrm>
+        <a:prstGeom prst="rect">
+          <a:avLst/>
+        </a:prstGeom>
+        <a:noFill/>
+        <a:ln>
+          <a:noFill/>
+        </a:ln>
+        <a:effectLst/>
+      </dsp:spPr>
+      <dsp:style>
+        <a:lnRef idx="0">
+          <a:scrgbClr r="0" g="0" b="0"/>
+        </a:lnRef>
+        <a:fillRef idx="0">
+          <a:scrgbClr r="0" g="0" b="0"/>
+        </a:fillRef>
+        <a:effectRef idx="0">
+          <a:scrgbClr r="0" g="0" b="0"/>
+        </a:effectRef>
+        <a:fontRef idx="minor"/>
+      </dsp:style>
+      <dsp:txBody>
+        <a:bodyPr spcFirstLastPara="0" vert="horz" wrap="square" lIns="0" tIns="0" rIns="0" bIns="0" numCol="1" spcCol="1270" anchor="t" anchorCtr="0">
+          <a:noAutofit/>
+        </a:bodyPr>
+        <a:lstStyle/>
+        <a:p>
+          <a:pPr marL="114300" lvl="1" indent="-114300" algn="l" defTabSz="577850">
+            <a:lnSpc>
+              <a:spcPct val="90000"/>
+            </a:lnSpc>
+            <a:spcBef>
+              <a:spcPct val="0"/>
+            </a:spcBef>
+            <a:spcAft>
+              <a:spcPct val="15000"/>
+            </a:spcAft>
+            <a:buChar char="•"/>
+          </a:pPr>
+          <a:r>
+            <a:rPr lang="en-US" sz="1300" kern="1200" dirty="0"/>
+            <a:t>Logistic Regression</a:t>
+          </a:r>
+        </a:p>
+        <a:p>
+          <a:pPr marL="114300" lvl="1" indent="-114300" algn="l" defTabSz="577850">
+            <a:lnSpc>
+              <a:spcPct val="90000"/>
+            </a:lnSpc>
+            <a:spcBef>
+              <a:spcPct val="0"/>
+            </a:spcBef>
+            <a:spcAft>
+              <a:spcPct val="15000"/>
+            </a:spcAft>
+            <a:buChar char="•"/>
+          </a:pPr>
+          <a:r>
+            <a:rPr lang="en-US" sz="1300" kern="1200" dirty="0"/>
+            <a:t>Naive Bayes</a:t>
+          </a:r>
+        </a:p>
+        <a:p>
+          <a:pPr marL="114300" lvl="1" indent="-114300" algn="l" defTabSz="577850">
+            <a:lnSpc>
+              <a:spcPct val="90000"/>
+            </a:lnSpc>
+            <a:spcBef>
+              <a:spcPct val="0"/>
+            </a:spcBef>
+            <a:spcAft>
+              <a:spcPct val="15000"/>
+            </a:spcAft>
+            <a:buChar char="•"/>
+          </a:pPr>
+          <a:r>
+            <a:rPr lang="en-US" sz="1300" kern="1200" dirty="0"/>
+            <a:t>SVM</a:t>
+          </a:r>
+        </a:p>
+        <a:p>
+          <a:pPr marL="114300" lvl="1" indent="-114300" algn="l" defTabSz="577850">
+            <a:lnSpc>
+              <a:spcPct val="90000"/>
+            </a:lnSpc>
+            <a:spcBef>
+              <a:spcPct val="0"/>
+            </a:spcBef>
+            <a:spcAft>
+              <a:spcPct val="15000"/>
+            </a:spcAft>
+            <a:buChar char="•"/>
+          </a:pPr>
+          <a:r>
+            <a:rPr lang="en-US" sz="1300" kern="1200" dirty="0"/>
+            <a:t>Gradient Boosting</a:t>
+          </a:r>
+        </a:p>
+        <a:p>
+          <a:pPr marL="114300" lvl="1" indent="-114300" algn="l" defTabSz="577850">
+            <a:lnSpc>
+              <a:spcPct val="90000"/>
+            </a:lnSpc>
+            <a:spcBef>
+              <a:spcPct val="0"/>
+            </a:spcBef>
+            <a:spcAft>
+              <a:spcPct val="15000"/>
+            </a:spcAft>
+            <a:buChar char="•"/>
+          </a:pPr>
+          <a:r>
+            <a:rPr lang="en-US" sz="1300" kern="1200" dirty="0"/>
+            <a:t>XG Boost</a:t>
+          </a:r>
+        </a:p>
+        <a:p>
+          <a:pPr marL="114300" lvl="1" indent="-114300" algn="l" defTabSz="577850">
+            <a:lnSpc>
+              <a:spcPct val="90000"/>
+            </a:lnSpc>
+            <a:spcBef>
+              <a:spcPct val="0"/>
+            </a:spcBef>
+            <a:spcAft>
+              <a:spcPct val="15000"/>
+            </a:spcAft>
+            <a:buChar char="•"/>
+          </a:pPr>
+          <a:r>
+            <a:rPr lang="en-US" sz="1300" kern="1200" dirty="0"/>
+            <a:t>Decision Trees</a:t>
+          </a:r>
+        </a:p>
+        <a:p>
+          <a:pPr marL="114300" lvl="1" indent="-114300" algn="l" defTabSz="577850">
+            <a:lnSpc>
+              <a:spcPct val="90000"/>
+            </a:lnSpc>
+            <a:spcBef>
+              <a:spcPct val="0"/>
+            </a:spcBef>
+            <a:spcAft>
+              <a:spcPct val="15000"/>
+            </a:spcAft>
+            <a:buChar char="•"/>
+          </a:pPr>
+          <a:r>
+            <a:rPr lang="en-US" sz="1300" kern="1200" dirty="0"/>
+            <a:t>Random Forest</a:t>
+          </a:r>
+        </a:p>
+      </dsp:txBody>
+      <dsp:txXfrm>
+        <a:off x="6529906" y="2445685"/>
+        <a:ext cx="1478243" cy="1462500"/>
+      </dsp:txXfrm>
+    </dsp:sp>
+    <dsp:sp modelId="{FF9110FE-86B9-FD4C-A6A0-039FCEFA87F3}">
+      <dsp:nvSpPr>
+        <dsp:cNvPr id="0" name=""/>
+        <dsp:cNvSpPr/>
+      </dsp:nvSpPr>
+      <dsp:spPr>
+        <a:xfrm>
+          <a:off x="8161710" y="1655935"/>
+          <a:ext cx="1847804" cy="702000"/>
+        </a:xfrm>
+        <a:prstGeom prst="chevron">
+          <a:avLst/>
+        </a:prstGeom>
+        <a:solidFill>
+          <a:schemeClr val="accent5">
+            <a:hueOff val="-5632119"/>
+            <a:satOff val="-14516"/>
+            <a:lumOff val="-9804"/>
+            <a:alphaOff val="0"/>
+          </a:schemeClr>
+        </a:solidFill>
+        <a:ln w="12700" cap="flat" cmpd="sng" algn="ctr">
+          <a:solidFill>
+            <a:schemeClr val="lt1">
+              <a:hueOff val="0"/>
+              <a:satOff val="0"/>
+              <a:lumOff val="0"/>
+              <a:alphaOff val="0"/>
+            </a:schemeClr>
+          </a:solidFill>
+          <a:prstDash val="solid"/>
+          <a:miter lim="800000"/>
+        </a:ln>
+        <a:effectLst/>
+      </dsp:spPr>
+      <dsp:style>
+        <a:lnRef idx="2">
+          <a:scrgbClr r="0" g="0" b="0"/>
+        </a:lnRef>
+        <a:fillRef idx="1">
+          <a:scrgbClr r="0" g="0" b="0"/>
+        </a:fillRef>
+        <a:effectRef idx="0">
+          <a:scrgbClr r="0" g="0" b="0"/>
+        </a:effectRef>
+        <a:fontRef idx="minor">
+          <a:schemeClr val="lt1"/>
+        </a:fontRef>
+      </dsp:style>
+      <dsp:txBody>
+        <a:bodyPr spcFirstLastPara="0" vert="horz" wrap="square" lIns="52007" tIns="17336" rIns="17336" bIns="17336" numCol="1" spcCol="1270" anchor="ctr" anchorCtr="0">
+          <a:noAutofit/>
+        </a:bodyPr>
+        <a:lstStyle/>
+        <a:p>
+          <a:pPr marL="0" lvl="0" indent="0" algn="ctr" defTabSz="577850">
+            <a:lnSpc>
+              <a:spcPct val="90000"/>
+            </a:lnSpc>
+            <a:spcBef>
+              <a:spcPct val="0"/>
+            </a:spcBef>
+            <a:spcAft>
+              <a:spcPct val="35000"/>
+            </a:spcAft>
+            <a:buNone/>
+          </a:pPr>
+          <a:r>
+            <a:rPr lang="en-US" sz="1300" kern="1200" dirty="0"/>
+            <a:t>Best Model Evaluation</a:t>
+          </a:r>
+        </a:p>
+      </dsp:txBody>
+      <dsp:txXfrm>
+        <a:off x="8512710" y="1655935"/>
+        <a:ext cx="1145804" cy="702000"/>
+      </dsp:txXfrm>
+    </dsp:sp>
+    <dsp:sp modelId="{013E2926-AAAF-B042-A93F-89A052C19028}">
+      <dsp:nvSpPr>
+        <dsp:cNvPr id="0" name=""/>
+        <dsp:cNvSpPr/>
+      </dsp:nvSpPr>
+      <dsp:spPr>
+        <a:xfrm>
+          <a:off x="9793514" y="1655935"/>
+          <a:ext cx="1847804" cy="702000"/>
+        </a:xfrm>
+        <a:prstGeom prst="chevron">
+          <a:avLst/>
+        </a:prstGeom>
+        <a:solidFill>
+          <a:schemeClr val="accent5">
+            <a:hueOff val="-6758543"/>
+            <a:satOff val="-17419"/>
+            <a:lumOff val="-11765"/>
+            <a:alphaOff val="0"/>
+          </a:schemeClr>
+        </a:solidFill>
+        <a:ln w="12700" cap="flat" cmpd="sng" algn="ctr">
+          <a:solidFill>
+            <a:schemeClr val="lt1">
+              <a:hueOff val="0"/>
+              <a:satOff val="0"/>
+              <a:lumOff val="0"/>
+              <a:alphaOff val="0"/>
+            </a:schemeClr>
+          </a:solidFill>
+          <a:prstDash val="solid"/>
+          <a:miter lim="800000"/>
+        </a:ln>
+        <a:effectLst/>
+      </dsp:spPr>
+      <dsp:style>
+        <a:lnRef idx="2">
+          <a:scrgbClr r="0" g="0" b="0"/>
+        </a:lnRef>
+        <a:fillRef idx="1">
+          <a:scrgbClr r="0" g="0" b="0"/>
+        </a:fillRef>
+        <a:effectRef idx="0">
+          <a:scrgbClr r="0" g="0" b="0"/>
+        </a:effectRef>
+        <a:fontRef idx="minor">
+          <a:schemeClr val="lt1"/>
+        </a:fontRef>
+      </dsp:style>
+      <dsp:txBody>
+        <a:bodyPr spcFirstLastPara="0" vert="horz" wrap="square" lIns="52007" tIns="17336" rIns="17336" bIns="17336" numCol="1" spcCol="1270" anchor="ctr" anchorCtr="0">
+          <a:noAutofit/>
+        </a:bodyPr>
+        <a:lstStyle/>
+        <a:p>
+          <a:pPr marL="0" lvl="0" indent="0" algn="ctr" defTabSz="577850">
+            <a:lnSpc>
+              <a:spcPct val="90000"/>
+            </a:lnSpc>
+            <a:spcBef>
+              <a:spcPct val="0"/>
+            </a:spcBef>
+            <a:spcAft>
+              <a:spcPct val="35000"/>
+            </a:spcAft>
+            <a:buNone/>
+          </a:pPr>
+          <a:r>
+            <a:rPr lang="en-US" sz="1300" kern="1200" dirty="0"/>
+            <a:t>Best Model Prediction</a:t>
+          </a:r>
+        </a:p>
+      </dsp:txBody>
+      <dsp:txXfrm>
+        <a:off x="10144514" y="1655935"/>
+        <a:ext cx="1145804" cy="702000"/>
+      </dsp:txXfrm>
+    </dsp:sp>
+  </dsp:spTree>
+</dsp:drawing>
+</file>
+
 <file path=ppt/diagrams/layout1.xml><?xml version="1.0" encoding="utf-8"?>
 <dgm:layoutDef xmlns:dgm="http://schemas.openxmlformats.org/drawingml/2006/diagram" xmlns:a="http://schemas.openxmlformats.org/drawingml/2006/main" uniqueId="urn:microsoft.com/office/officeart/2005/8/layout/chevron1">
   <dgm:title val=""/>
@@ -4285,6 +6568,289 @@
 </dgm:layoutDef>
 </file>
 
+<file path=ppt/diagrams/layout3.xml><?xml version="1.0" encoding="utf-8"?>
+<dgm:layoutDef xmlns:dgm="http://schemas.openxmlformats.org/drawingml/2006/diagram" xmlns:a="http://schemas.openxmlformats.org/drawingml/2006/main" uniqueId="urn:microsoft.com/office/officeart/2005/8/layout/chevron1">
+  <dgm:title val=""/>
+  <dgm:desc val=""/>
+  <dgm:catLst>
+    <dgm:cat type="process" pri="9000"/>
+  </dgm:catLst>
+  <dgm:sampData useDef="1">
+    <dgm:dataModel>
+      <dgm:ptLst/>
+      <dgm:bg/>
+      <dgm:whole/>
+    </dgm:dataModel>
+  </dgm:sampData>
+  <dgm:styleData>
+    <dgm:dataModel>
+      <dgm:ptLst>
+        <dgm:pt modelId="0" type="doc"/>
+        <dgm:pt modelId="1"/>
+        <dgm:pt modelId="2"/>
+      </dgm:ptLst>
+      <dgm:cxnLst>
+        <dgm:cxn modelId="3" srcId="0" destId="1" srcOrd="0" destOrd="0"/>
+        <dgm:cxn modelId="4" srcId="0" destId="2" srcOrd="1" destOrd="0"/>
+      </dgm:cxnLst>
+      <dgm:bg/>
+      <dgm:whole/>
+    </dgm:dataModel>
+  </dgm:styleData>
+  <dgm:clrData>
+    <dgm:dataModel>
+      <dgm:ptLst>
+        <dgm:pt modelId="0" type="doc"/>
+        <dgm:pt modelId="1"/>
+        <dgm:pt modelId="2"/>
+        <dgm:pt modelId="3"/>
+        <dgm:pt modelId="4"/>
+      </dgm:ptLst>
+      <dgm:cxnLst>
+        <dgm:cxn modelId="5" srcId="0" destId="1" srcOrd="0" destOrd="0"/>
+        <dgm:cxn modelId="6" srcId="0" destId="2" srcOrd="1" destOrd="0"/>
+        <dgm:cxn modelId="7" srcId="0" destId="3" srcOrd="2" destOrd="0"/>
+        <dgm:cxn modelId="8" srcId="0" destId="4" srcOrd="3" destOrd="0"/>
+      </dgm:cxnLst>
+      <dgm:bg/>
+      <dgm:whole/>
+    </dgm:dataModel>
+  </dgm:clrData>
+  <dgm:layoutNode name="Name0">
+    <dgm:varLst>
+      <dgm:dir/>
+      <dgm:animLvl val="lvl"/>
+      <dgm:resizeHandles val="exact"/>
+    </dgm:varLst>
+    <dgm:choose name="Name1">
+      <dgm:if name="Name2" func="var" arg="dir" op="equ" val="norm">
+        <dgm:alg type="lin"/>
+      </dgm:if>
+      <dgm:else name="Name3">
+        <dgm:alg type="lin">
+          <dgm:param type="linDir" val="fromR"/>
+        </dgm:alg>
+      </dgm:else>
+    </dgm:choose>
+    <dgm:shape xmlns:r="http://schemas.openxmlformats.org/officeDocument/2006/relationships" r:blip="">
+      <dgm:adjLst/>
+    </dgm:shape>
+    <dgm:presOf/>
+    <dgm:choose name="Name4">
+      <dgm:if name="Name5" axis="des" func="maxDepth" op="gte" val="2">
+        <dgm:constrLst>
+          <dgm:constr type="h" for="ch" forName="composite" refType="h"/>
+          <dgm:constr type="w" for="ch" forName="composite" refType="w"/>
+          <dgm:constr type="w" for="des" forName="parTx"/>
+          <dgm:constr type="h" for="des" forName="parTx" op="equ"/>
+          <dgm:constr type="w" for="des" forName="desTx"/>
+          <dgm:constr type="h" for="des" forName="desTx" op="equ"/>
+          <dgm:constr type="primFontSz" for="des" forName="parTx" val="65"/>
+          <dgm:constr type="secFontSz" for="des" forName="desTx" refType="primFontSz" refFor="des" refForName="parTx" op="equ"/>
+          <dgm:constr type="h" for="des" forName="parTx" refType="primFontSz" refFor="des" refForName="parTx" fact="1.5"/>
+          <dgm:constr type="h" for="des" forName="desTx" refType="primFontSz" refFor="des" refForName="parTx" fact="0.5"/>
+          <dgm:constr type="w" for="ch" forName="space" op="equ" val="-6"/>
+        </dgm:constrLst>
+        <dgm:ruleLst>
+          <dgm:rule type="w" for="ch" forName="composite" val="0" fact="NaN" max="NaN"/>
+          <dgm:rule type="primFontSz" for="des" forName="parTx" val="5" fact="NaN" max="NaN"/>
+        </dgm:ruleLst>
+        <dgm:forEach name="Name6" axis="ch" ptType="node">
+          <dgm:layoutNode name="composite">
+            <dgm:alg type="composite"/>
+            <dgm:shape xmlns:r="http://schemas.openxmlformats.org/officeDocument/2006/relationships" r:blip="">
+              <dgm:adjLst/>
+            </dgm:shape>
+            <dgm:presOf/>
+            <dgm:choose name="Name7">
+              <dgm:if name="Name8" func="var" arg="dir" op="equ" val="norm">
+                <dgm:constrLst>
+                  <dgm:constr type="l" for="ch" forName="parTx"/>
+                  <dgm:constr type="w" for="ch" forName="parTx" refType="w"/>
+                  <dgm:constr type="t" for="ch" forName="parTx"/>
+                  <dgm:constr type="l" for="ch" forName="desTx"/>
+                  <dgm:constr type="w" for="ch" forName="desTx" refType="w" refFor="ch" refForName="parTx" fact="0.8"/>
+                  <dgm:constr type="t" for="ch" forName="desTx" refType="h" refFor="ch" refForName="parTx" fact="1.125"/>
+                </dgm:constrLst>
+              </dgm:if>
+              <dgm:else name="Name9">
+                <dgm:constrLst>
+                  <dgm:constr type="l" for="ch" forName="parTx"/>
+                  <dgm:constr type="w" for="ch" forName="parTx" refType="w"/>
+                  <dgm:constr type="t" for="ch" forName="parTx"/>
+                  <dgm:constr type="l" for="ch" forName="desTx" refType="w" fact="0.2"/>
+                  <dgm:constr type="w" for="ch" forName="desTx" refType="w" refFor="ch" refForName="parTx" fact="0.8"/>
+                  <dgm:constr type="t" for="ch" forName="desTx" refType="h" refFor="ch" refForName="parTx" fact="1.125"/>
+                </dgm:constrLst>
+              </dgm:else>
+            </dgm:choose>
+            <dgm:ruleLst>
+              <dgm:rule type="h" val="INF" fact="NaN" max="NaN"/>
+            </dgm:ruleLst>
+            <dgm:layoutNode name="parTx">
+              <dgm:varLst>
+                <dgm:chMax val="0"/>
+                <dgm:chPref val="0"/>
+                <dgm:bulletEnabled val="1"/>
+              </dgm:varLst>
+              <dgm:alg type="tx"/>
+              <dgm:choose name="Name10">
+                <dgm:if name="Name11" func="var" arg="dir" op="equ" val="norm">
+                  <dgm:shape xmlns:r="http://schemas.openxmlformats.org/officeDocument/2006/relationships" type="chevron" r:blip="">
+                    <dgm:adjLst/>
+                  </dgm:shape>
+                </dgm:if>
+                <dgm:else name="Name12">
+                  <dgm:shape xmlns:r="http://schemas.openxmlformats.org/officeDocument/2006/relationships" rot="180" type="chevron" r:blip="">
+                    <dgm:adjLst/>
+                  </dgm:shape>
+                </dgm:else>
+              </dgm:choose>
+              <dgm:presOf axis="self" ptType="node"/>
+              <dgm:choose name="Name13">
+                <dgm:if name="Name14" func="var" arg="dir" op="equ" val="norm">
+                  <dgm:constrLst>
+                    <dgm:constr type="h" refType="w" op="lte" fact="0.4"/>
+                    <dgm:constr type="h"/>
+                    <dgm:constr type="tMarg" refType="primFontSz" fact="0.105"/>
+                    <dgm:constr type="bMarg" refType="primFontSz" fact="0.105"/>
+                    <dgm:constr type="lMarg" refType="primFontSz" fact="0.315"/>
+                    <dgm:constr type="rMarg" refType="primFontSz" fact="0.105"/>
+                  </dgm:constrLst>
+                </dgm:if>
+                <dgm:else name="Name15">
+                  <dgm:constrLst>
+                    <dgm:constr type="h" refType="w" op="lte" fact="0.4"/>
+                    <dgm:constr type="h"/>
+                    <dgm:constr type="tMarg" refType="primFontSz" fact="0.105"/>
+                    <dgm:constr type="bMarg" refType="primFontSz" fact="0.105"/>
+                    <dgm:constr type="lMarg" refType="primFontSz" fact="0.105"/>
+                    <dgm:constr type="rMarg" refType="primFontSz" fact="0.315"/>
+                  </dgm:constrLst>
+                </dgm:else>
+              </dgm:choose>
+              <dgm:ruleLst>
+                <dgm:rule type="h" val="INF" fact="NaN" max="NaN"/>
+              </dgm:ruleLst>
+            </dgm:layoutNode>
+            <dgm:layoutNode name="desTx" styleLbl="revTx">
+              <dgm:varLst>
+                <dgm:bulletEnabled val="1"/>
+              </dgm:varLst>
+              <dgm:alg type="tx">
+                <dgm:param type="stBulletLvl" val="1"/>
+              </dgm:alg>
+              <dgm:choose name="Name16">
+                <dgm:if name="Name17" axis="ch" ptType="node" func="cnt" op="gte" val="1">
+                  <dgm:shape xmlns:r="http://schemas.openxmlformats.org/officeDocument/2006/relationships" type="rect" r:blip="">
+                    <dgm:adjLst/>
+                  </dgm:shape>
+                </dgm:if>
+                <dgm:else name="Name18">
+                  <dgm:shape xmlns:r="http://schemas.openxmlformats.org/officeDocument/2006/relationships" type="rect" r:blip="" hideGeom="1">
+                    <dgm:adjLst/>
+                  </dgm:shape>
+                </dgm:else>
+              </dgm:choose>
+              <dgm:presOf axis="des" ptType="node"/>
+              <dgm:constrLst>
+                <dgm:constr type="secFontSz" val="65"/>
+                <dgm:constr type="primFontSz" refType="secFontSz"/>
+                <dgm:constr type="h"/>
+                <dgm:constr type="tMarg"/>
+                <dgm:constr type="bMarg"/>
+                <dgm:constr type="rMarg"/>
+                <dgm:constr type="lMarg"/>
+              </dgm:constrLst>
+              <dgm:ruleLst>
+                <dgm:rule type="h" val="INF" fact="NaN" max="NaN"/>
+              </dgm:ruleLst>
+            </dgm:layoutNode>
+          </dgm:layoutNode>
+          <dgm:forEach name="Name19" axis="followSib" ptType="sibTrans" cnt="1">
+            <dgm:layoutNode name="space">
+              <dgm:alg type="sp"/>
+              <dgm:shape xmlns:r="http://schemas.openxmlformats.org/officeDocument/2006/relationships" r:blip="">
+                <dgm:adjLst/>
+              </dgm:shape>
+              <dgm:presOf/>
+              <dgm:constrLst/>
+              <dgm:ruleLst/>
+            </dgm:layoutNode>
+          </dgm:forEach>
+        </dgm:forEach>
+      </dgm:if>
+      <dgm:else name="Name20">
+        <dgm:constrLst>
+          <dgm:constr type="w" for="ch" forName="parTxOnly" refType="w"/>
+          <dgm:constr type="h" for="des" forName="parTxOnly" op="equ"/>
+          <dgm:constr type="primFontSz" for="des" forName="parTxOnly" op="equ" val="65"/>
+          <dgm:constr type="w" for="ch" forName="parTxOnlySpace" refType="w" refFor="ch" refForName="parTxOnly" fact="-0.1"/>
+        </dgm:constrLst>
+        <dgm:ruleLst/>
+        <dgm:forEach name="Name21" axis="ch" ptType="node">
+          <dgm:layoutNode name="parTxOnly">
+            <dgm:varLst>
+              <dgm:chMax val="0"/>
+              <dgm:chPref val="0"/>
+              <dgm:bulletEnabled val="1"/>
+            </dgm:varLst>
+            <dgm:alg type="tx"/>
+            <dgm:choose name="Name22">
+              <dgm:if name="Name23" func="var" arg="dir" op="equ" val="norm">
+                <dgm:shape xmlns:r="http://schemas.openxmlformats.org/officeDocument/2006/relationships" type="chevron" r:blip="">
+                  <dgm:adjLst/>
+                </dgm:shape>
+              </dgm:if>
+              <dgm:else name="Name24">
+                <dgm:shape xmlns:r="http://schemas.openxmlformats.org/officeDocument/2006/relationships" rot="180" type="chevron" r:blip="">
+                  <dgm:adjLst/>
+                </dgm:shape>
+              </dgm:else>
+            </dgm:choose>
+            <dgm:presOf axis="self" ptType="node"/>
+            <dgm:choose name="Name25">
+              <dgm:if name="Name26" func="var" arg="dir" op="equ" val="norm">
+                <dgm:constrLst>
+                  <dgm:constr type="h" refType="w" op="equ" fact="0.4"/>
+                  <dgm:constr type="tMarg" refType="primFontSz" fact="0.105"/>
+                  <dgm:constr type="bMarg" refType="primFontSz" fact="0.105"/>
+                  <dgm:constr type="lMarg" refType="primFontSz" fact="0.315"/>
+                  <dgm:constr type="rMarg" refType="primFontSz" fact="0.105"/>
+                </dgm:constrLst>
+              </dgm:if>
+              <dgm:else name="Name27">
+                <dgm:constrLst>
+                  <dgm:constr type="h" refType="w" op="equ" fact="0.4"/>
+                  <dgm:constr type="tMarg" refType="primFontSz" fact="0.105"/>
+                  <dgm:constr type="bMarg" refType="primFontSz" fact="0.105"/>
+                  <dgm:constr type="lMarg" refType="primFontSz" fact="0.105"/>
+                  <dgm:constr type="rMarg" refType="primFontSz" fact="0.315"/>
+                </dgm:constrLst>
+              </dgm:else>
+            </dgm:choose>
+            <dgm:ruleLst>
+              <dgm:rule type="primFontSz" val="5" fact="NaN" max="NaN"/>
+            </dgm:ruleLst>
+          </dgm:layoutNode>
+          <dgm:forEach name="Name28" axis="followSib" ptType="sibTrans" cnt="1">
+            <dgm:layoutNode name="parTxOnlySpace">
+              <dgm:alg type="sp"/>
+              <dgm:shape xmlns:r="http://schemas.openxmlformats.org/officeDocument/2006/relationships" r:blip="">
+                <dgm:adjLst/>
+              </dgm:shape>
+              <dgm:presOf/>
+              <dgm:constrLst/>
+              <dgm:ruleLst/>
+            </dgm:layoutNode>
+          </dgm:forEach>
+        </dgm:forEach>
+      </dgm:else>
+    </dgm:choose>
+  </dgm:layoutNode>
+</dgm:layoutDef>
+</file>
+
 <file path=ppt/diagrams/quickStyle1.xml><?xml version="1.0" encoding="utf-8"?>
 <dgm:styleDef xmlns:dgm="http://schemas.openxmlformats.org/drawingml/2006/diagram" xmlns:a="http://schemas.openxmlformats.org/drawingml/2006/main" uniqueId="urn:microsoft.com/office/officeart/2005/8/quickstyle/simple1">
   <dgm:title val=""/>
@@ -5320,6 +7886,1040 @@
 </file>
 
 <file path=ppt/diagrams/quickStyle2.xml><?xml version="1.0" encoding="utf-8"?>
+<dgm:styleDef xmlns:dgm="http://schemas.openxmlformats.org/drawingml/2006/diagram" xmlns:a="http://schemas.openxmlformats.org/drawingml/2006/main" uniqueId="urn:microsoft.com/office/officeart/2005/8/quickstyle/simple1">
+  <dgm:title val=""/>
+  <dgm:desc val=""/>
+  <dgm:catLst>
+    <dgm:cat type="simple" pri="10100"/>
+  </dgm:catLst>
+  <dgm:scene3d>
+    <a:camera prst="orthographicFront"/>
+    <a:lightRig rig="threePt" dir="t"/>
+  </dgm:scene3d>
+  <dgm:styleLbl name="node0">
+    <dgm:scene3d>
+      <a:camera prst="orthographicFront"/>
+      <a:lightRig rig="threePt" dir="t"/>
+    </dgm:scene3d>
+    <dgm:sp3d/>
+    <dgm:txPr/>
+    <dgm:style>
+      <a:lnRef idx="2">
+        <a:scrgbClr r="0" g="0" b="0"/>
+      </a:lnRef>
+      <a:fillRef idx="1">
+        <a:scrgbClr r="0" g="0" b="0"/>
+      </a:fillRef>
+      <a:effectRef idx="0">
+        <a:scrgbClr r="0" g="0" b="0"/>
+      </a:effectRef>
+      <a:fontRef idx="minor">
+        <a:schemeClr val="lt1"/>
+      </a:fontRef>
+    </dgm:style>
+  </dgm:styleLbl>
+  <dgm:styleLbl name="lnNode1">
+    <dgm:scene3d>
+      <a:camera prst="orthographicFront"/>
+      <a:lightRig rig="threePt" dir="t"/>
+    </dgm:scene3d>
+    <dgm:sp3d/>
+    <dgm:txPr/>
+    <dgm:style>
+      <a:lnRef idx="2">
+        <a:scrgbClr r="0" g="0" b="0"/>
+      </a:lnRef>
+      <a:fillRef idx="1">
+        <a:scrgbClr r="0" g="0" b="0"/>
+      </a:fillRef>
+      <a:effectRef idx="0">
+        <a:scrgbClr r="0" g="0" b="0"/>
+      </a:effectRef>
+      <a:fontRef idx="minor">
+        <a:schemeClr val="lt1"/>
+      </a:fontRef>
+    </dgm:style>
+  </dgm:styleLbl>
+  <dgm:styleLbl name="vennNode1">
+    <dgm:scene3d>
+      <a:camera prst="orthographicFront"/>
+      <a:lightRig rig="threePt" dir="t"/>
+    </dgm:scene3d>
+    <dgm:sp3d/>
+    <dgm:txPr/>
+    <dgm:style>
+      <a:lnRef idx="2">
+        <a:scrgbClr r="0" g="0" b="0"/>
+      </a:lnRef>
+      <a:fillRef idx="1">
+        <a:scrgbClr r="0" g="0" b="0"/>
+      </a:fillRef>
+      <a:effectRef idx="0">
+        <a:scrgbClr r="0" g="0" b="0"/>
+      </a:effectRef>
+      <a:fontRef idx="minor">
+        <a:schemeClr val="tx1"/>
+      </a:fontRef>
+    </dgm:style>
+  </dgm:styleLbl>
+  <dgm:styleLbl name="alignNode1">
+    <dgm:scene3d>
+      <a:camera prst="orthographicFront"/>
+      <a:lightRig rig="threePt" dir="t"/>
+    </dgm:scene3d>
+    <dgm:sp3d/>
+    <dgm:txPr/>
+    <dgm:style>
+      <a:lnRef idx="2">
+        <a:scrgbClr r="0" g="0" b="0"/>
+      </a:lnRef>
+      <a:fillRef idx="1">
+        <a:scrgbClr r="0" g="0" b="0"/>
+      </a:fillRef>
+      <a:effectRef idx="0">
+        <a:scrgbClr r="0" g="0" b="0"/>
+      </a:effectRef>
+      <a:fontRef idx="minor">
+        <a:schemeClr val="lt1"/>
+      </a:fontRef>
+    </dgm:style>
+  </dgm:styleLbl>
+  <dgm:styleLbl name="node1">
+    <dgm:scene3d>
+      <a:camera prst="orthographicFront"/>
+      <a:lightRig rig="threePt" dir="t"/>
+    </dgm:scene3d>
+    <dgm:sp3d/>
+    <dgm:txPr/>
+    <dgm:style>
+      <a:lnRef idx="2">
+        <a:scrgbClr r="0" g="0" b="0"/>
+      </a:lnRef>
+      <a:fillRef idx="1">
+        <a:scrgbClr r="0" g="0" b="0"/>
+      </a:fillRef>
+      <a:effectRef idx="0">
+        <a:scrgbClr r="0" g="0" b="0"/>
+      </a:effectRef>
+      <a:fontRef idx="minor">
+        <a:schemeClr val="lt1"/>
+      </a:fontRef>
+    </dgm:style>
+  </dgm:styleLbl>
+  <dgm:styleLbl name="node2">
+    <dgm:scene3d>
+      <a:camera prst="orthographicFront"/>
+      <a:lightRig rig="threePt" dir="t"/>
+    </dgm:scene3d>
+    <dgm:sp3d/>
+    <dgm:txPr/>
+    <dgm:style>
+      <a:lnRef idx="2">
+        <a:scrgbClr r="0" g="0" b="0"/>
+      </a:lnRef>
+      <a:fillRef idx="1">
+        <a:scrgbClr r="0" g="0" b="0"/>
+      </a:fillRef>
+      <a:effectRef idx="0">
+        <a:scrgbClr r="0" g="0" b="0"/>
+      </a:effectRef>
+      <a:fontRef idx="minor">
+        <a:schemeClr val="lt1"/>
+      </a:fontRef>
+    </dgm:style>
+  </dgm:styleLbl>
+  <dgm:styleLbl name="node3">
+    <dgm:scene3d>
+      <a:camera prst="orthographicFront"/>
+      <a:lightRig rig="threePt" dir="t"/>
+    </dgm:scene3d>
+    <dgm:sp3d/>
+    <dgm:txPr/>
+    <dgm:style>
+      <a:lnRef idx="2">
+        <a:scrgbClr r="0" g="0" b="0"/>
+      </a:lnRef>
+      <a:fillRef idx="1">
+        <a:scrgbClr r="0" g="0" b="0"/>
+      </a:fillRef>
+      <a:effectRef idx="0">
+        <a:scrgbClr r="0" g="0" b="0"/>
+      </a:effectRef>
+      <a:fontRef idx="minor">
+        <a:schemeClr val="lt1"/>
+      </a:fontRef>
+    </dgm:style>
+  </dgm:styleLbl>
+  <dgm:styleLbl name="node4">
+    <dgm:scene3d>
+      <a:camera prst="orthographicFront"/>
+      <a:lightRig rig="threePt" dir="t"/>
+    </dgm:scene3d>
+    <dgm:sp3d/>
+    <dgm:txPr/>
+    <dgm:style>
+      <a:lnRef idx="2">
+        <a:scrgbClr r="0" g="0" b="0"/>
+      </a:lnRef>
+      <a:fillRef idx="1">
+        <a:scrgbClr r="0" g="0" b="0"/>
+      </a:fillRef>
+      <a:effectRef idx="0">
+        <a:scrgbClr r="0" g="0" b="0"/>
+      </a:effectRef>
+      <a:fontRef idx="minor">
+        <a:schemeClr val="lt1"/>
+      </a:fontRef>
+    </dgm:style>
+  </dgm:styleLbl>
+  <dgm:styleLbl name="fgImgPlace1">
+    <dgm:scene3d>
+      <a:camera prst="orthographicFront"/>
+      <a:lightRig rig="threePt" dir="t"/>
+    </dgm:scene3d>
+    <dgm:sp3d/>
+    <dgm:txPr/>
+    <dgm:style>
+      <a:lnRef idx="2">
+        <a:scrgbClr r="0" g="0" b="0"/>
+      </a:lnRef>
+      <a:fillRef idx="1">
+        <a:scrgbClr r="0" g="0" b="0"/>
+      </a:fillRef>
+      <a:effectRef idx="0">
+        <a:scrgbClr r="0" g="0" b="0"/>
+      </a:effectRef>
+      <a:fontRef idx="minor"/>
+    </dgm:style>
+  </dgm:styleLbl>
+  <dgm:styleLbl name="alignImgPlace1">
+    <dgm:scene3d>
+      <a:camera prst="orthographicFront"/>
+      <a:lightRig rig="threePt" dir="t"/>
+    </dgm:scene3d>
+    <dgm:sp3d/>
+    <dgm:txPr/>
+    <dgm:style>
+      <a:lnRef idx="2">
+        <a:scrgbClr r="0" g="0" b="0"/>
+      </a:lnRef>
+      <a:fillRef idx="1">
+        <a:scrgbClr r="0" g="0" b="0"/>
+      </a:fillRef>
+      <a:effectRef idx="0">
+        <a:scrgbClr r="0" g="0" b="0"/>
+      </a:effectRef>
+      <a:fontRef idx="minor"/>
+    </dgm:style>
+  </dgm:styleLbl>
+  <dgm:styleLbl name="bgImgPlace1">
+    <dgm:scene3d>
+      <a:camera prst="orthographicFront"/>
+      <a:lightRig rig="threePt" dir="t"/>
+    </dgm:scene3d>
+    <dgm:sp3d/>
+    <dgm:txPr/>
+    <dgm:style>
+      <a:lnRef idx="2">
+        <a:scrgbClr r="0" g="0" b="0"/>
+      </a:lnRef>
+      <a:fillRef idx="1">
+        <a:scrgbClr r="0" g="0" b="0"/>
+      </a:fillRef>
+      <a:effectRef idx="0">
+        <a:scrgbClr r="0" g="0" b="0"/>
+      </a:effectRef>
+      <a:fontRef idx="minor"/>
+    </dgm:style>
+  </dgm:styleLbl>
+  <dgm:styleLbl name="sibTrans2D1">
+    <dgm:scene3d>
+      <a:camera prst="orthographicFront"/>
+      <a:lightRig rig="threePt" dir="t"/>
+    </dgm:scene3d>
+    <dgm:sp3d/>
+    <dgm:txPr/>
+    <dgm:style>
+      <a:lnRef idx="0">
+        <a:scrgbClr r="0" g="0" b="0"/>
+      </a:lnRef>
+      <a:fillRef idx="1">
+        <a:scrgbClr r="0" g="0" b="0"/>
+      </a:fillRef>
+      <a:effectRef idx="0">
+        <a:scrgbClr r="0" g="0" b="0"/>
+      </a:effectRef>
+      <a:fontRef idx="minor">
+        <a:schemeClr val="lt1"/>
+      </a:fontRef>
+    </dgm:style>
+  </dgm:styleLbl>
+  <dgm:styleLbl name="fgSibTrans2D1">
+    <dgm:scene3d>
+      <a:camera prst="orthographicFront"/>
+      <a:lightRig rig="threePt" dir="t"/>
+    </dgm:scene3d>
+    <dgm:sp3d/>
+    <dgm:txPr/>
+    <dgm:style>
+      <a:lnRef idx="0">
+        <a:scrgbClr r="0" g="0" b="0"/>
+      </a:lnRef>
+      <a:fillRef idx="1">
+        <a:scrgbClr r="0" g="0" b="0"/>
+      </a:fillRef>
+      <a:effectRef idx="0">
+        <a:scrgbClr r="0" g="0" b="0"/>
+      </a:effectRef>
+      <a:fontRef idx="minor">
+        <a:schemeClr val="lt1"/>
+      </a:fontRef>
+    </dgm:style>
+  </dgm:styleLbl>
+  <dgm:styleLbl name="bgSibTrans2D1">
+    <dgm:scene3d>
+      <a:camera prst="orthographicFront"/>
+      <a:lightRig rig="threePt" dir="t"/>
+    </dgm:scene3d>
+    <dgm:sp3d/>
+    <dgm:txPr/>
+    <dgm:style>
+      <a:lnRef idx="0">
+        <a:scrgbClr r="0" g="0" b="0"/>
+      </a:lnRef>
+      <a:fillRef idx="1">
+        <a:scrgbClr r="0" g="0" b="0"/>
+      </a:fillRef>
+      <a:effectRef idx="0">
+        <a:scrgbClr r="0" g="0" b="0"/>
+      </a:effectRef>
+      <a:fontRef idx="minor">
+        <a:schemeClr val="lt1"/>
+      </a:fontRef>
+    </dgm:style>
+  </dgm:styleLbl>
+  <dgm:styleLbl name="sibTrans1D1">
+    <dgm:scene3d>
+      <a:camera prst="orthographicFront"/>
+      <a:lightRig rig="threePt" dir="t"/>
+    </dgm:scene3d>
+    <dgm:sp3d/>
+    <dgm:txPr/>
+    <dgm:style>
+      <a:lnRef idx="1">
+        <a:scrgbClr r="0" g="0" b="0"/>
+      </a:lnRef>
+      <a:fillRef idx="0">
+        <a:scrgbClr r="0" g="0" b="0"/>
+      </a:fillRef>
+      <a:effectRef idx="0">
+        <a:scrgbClr r="0" g="0" b="0"/>
+      </a:effectRef>
+      <a:fontRef idx="minor"/>
+    </dgm:style>
+  </dgm:styleLbl>
+  <dgm:styleLbl name="callout">
+    <dgm:scene3d>
+      <a:camera prst="orthographicFront"/>
+      <a:lightRig rig="threePt" dir="t"/>
+    </dgm:scene3d>
+    <dgm:sp3d/>
+    <dgm:txPr/>
+    <dgm:style>
+      <a:lnRef idx="2">
+        <a:scrgbClr r="0" g="0" b="0"/>
+      </a:lnRef>
+      <a:fillRef idx="1">
+        <a:scrgbClr r="0" g="0" b="0"/>
+      </a:fillRef>
+      <a:effectRef idx="0">
+        <a:scrgbClr r="0" g="0" b="0"/>
+      </a:effectRef>
+      <a:fontRef idx="minor"/>
+    </dgm:style>
+  </dgm:styleLbl>
+  <dgm:styleLbl name="asst0">
+    <dgm:scene3d>
+      <a:camera prst="orthographicFront"/>
+      <a:lightRig rig="threePt" dir="t"/>
+    </dgm:scene3d>
+    <dgm:sp3d/>
+    <dgm:txPr/>
+    <dgm:style>
+      <a:lnRef idx="2">
+        <a:scrgbClr r="0" g="0" b="0"/>
+      </a:lnRef>
+      <a:fillRef idx="1">
+        <a:scrgbClr r="0" g="0" b="0"/>
+      </a:fillRef>
+      <a:effectRef idx="0">
+        <a:scrgbClr r="0" g="0" b="0"/>
+      </a:effectRef>
+      <a:fontRef idx="minor">
+        <a:schemeClr val="lt1"/>
+      </a:fontRef>
+    </dgm:style>
+  </dgm:styleLbl>
+  <dgm:styleLbl name="asst1">
+    <dgm:scene3d>
+      <a:camera prst="orthographicFront"/>
+      <a:lightRig rig="threePt" dir="t"/>
+    </dgm:scene3d>
+    <dgm:sp3d/>
+    <dgm:txPr/>
+    <dgm:style>
+      <a:lnRef idx="2">
+        <a:scrgbClr r="0" g="0" b="0"/>
+      </a:lnRef>
+      <a:fillRef idx="1">
+        <a:scrgbClr r="0" g="0" b="0"/>
+      </a:fillRef>
+      <a:effectRef idx="0">
+        <a:scrgbClr r="0" g="0" b="0"/>
+      </a:effectRef>
+      <a:fontRef idx="minor">
+        <a:schemeClr val="lt1"/>
+      </a:fontRef>
+    </dgm:style>
+  </dgm:styleLbl>
+  <dgm:styleLbl name="asst2">
+    <dgm:scene3d>
+      <a:camera prst="orthographicFront"/>
+      <a:lightRig rig="threePt" dir="t"/>
+    </dgm:scene3d>
+    <dgm:sp3d/>
+    <dgm:txPr/>
+    <dgm:style>
+      <a:lnRef idx="2">
+        <a:scrgbClr r="0" g="0" b="0"/>
+      </a:lnRef>
+      <a:fillRef idx="1">
+        <a:scrgbClr r="0" g="0" b="0"/>
+      </a:fillRef>
+      <a:effectRef idx="0">
+        <a:scrgbClr r="0" g="0" b="0"/>
+      </a:effectRef>
+      <a:fontRef idx="minor">
+        <a:schemeClr val="lt1"/>
+      </a:fontRef>
+    </dgm:style>
+  </dgm:styleLbl>
+  <dgm:styleLbl name="asst3">
+    <dgm:scene3d>
+      <a:camera prst="orthographicFront"/>
+      <a:lightRig rig="threePt" dir="t"/>
+    </dgm:scene3d>
+    <dgm:sp3d/>
+    <dgm:txPr/>
+    <dgm:style>
+      <a:lnRef idx="2">
+        <a:scrgbClr r="0" g="0" b="0"/>
+      </a:lnRef>
+      <a:fillRef idx="1">
+        <a:scrgbClr r="0" g="0" b="0"/>
+      </a:fillRef>
+      <a:effectRef idx="0">
+        <a:scrgbClr r="0" g="0" b="0"/>
+      </a:effectRef>
+      <a:fontRef idx="minor">
+        <a:schemeClr val="lt1"/>
+      </a:fontRef>
+    </dgm:style>
+  </dgm:styleLbl>
+  <dgm:styleLbl name="asst4">
+    <dgm:scene3d>
+      <a:camera prst="orthographicFront"/>
+      <a:lightRig rig="threePt" dir="t"/>
+    </dgm:scene3d>
+    <dgm:sp3d/>
+    <dgm:txPr/>
+    <dgm:style>
+      <a:lnRef idx="2">
+        <a:scrgbClr r="0" g="0" b="0"/>
+      </a:lnRef>
+      <a:fillRef idx="1">
+        <a:scrgbClr r="0" g="0" b="0"/>
+      </a:fillRef>
+      <a:effectRef idx="0">
+        <a:scrgbClr r="0" g="0" b="0"/>
+      </a:effectRef>
+      <a:fontRef idx="minor">
+        <a:schemeClr val="lt1"/>
+      </a:fontRef>
+    </dgm:style>
+  </dgm:styleLbl>
+  <dgm:styleLbl name="parChTrans2D1">
+    <dgm:scene3d>
+      <a:camera prst="orthographicFront"/>
+      <a:lightRig rig="threePt" dir="t"/>
+    </dgm:scene3d>
+    <dgm:sp3d/>
+    <dgm:txPr/>
+    <dgm:style>
+      <a:lnRef idx="2">
+        <a:scrgbClr r="0" g="0" b="0"/>
+      </a:lnRef>
+      <a:fillRef idx="1">
+        <a:scrgbClr r="0" g="0" b="0"/>
+      </a:fillRef>
+      <a:effectRef idx="0">
+        <a:scrgbClr r="0" g="0" b="0"/>
+      </a:effectRef>
+      <a:fontRef idx="minor">
+        <a:schemeClr val="lt1"/>
+      </a:fontRef>
+    </dgm:style>
+  </dgm:styleLbl>
+  <dgm:styleLbl name="parChTrans2D2">
+    <dgm:scene3d>
+      <a:camera prst="orthographicFront"/>
+      <a:lightRig rig="threePt" dir="t"/>
+    </dgm:scene3d>
+    <dgm:sp3d/>
+    <dgm:txPr/>
+    <dgm:style>
+      <a:lnRef idx="2">
+        <a:scrgbClr r="0" g="0" b="0"/>
+      </a:lnRef>
+      <a:fillRef idx="1">
+        <a:scrgbClr r="0" g="0" b="0"/>
+      </a:fillRef>
+      <a:effectRef idx="0">
+        <a:scrgbClr r="0" g="0" b="0"/>
+      </a:effectRef>
+      <a:fontRef idx="minor">
+        <a:schemeClr val="lt1"/>
+      </a:fontRef>
+    </dgm:style>
+  </dgm:styleLbl>
+  <dgm:styleLbl name="parChTrans2D3">
+    <dgm:scene3d>
+      <a:camera prst="orthographicFront"/>
+      <a:lightRig rig="threePt" dir="t"/>
+    </dgm:scene3d>
+    <dgm:sp3d/>
+    <dgm:txPr/>
+    <dgm:style>
+      <a:lnRef idx="2">
+        <a:scrgbClr r="0" g="0" b="0"/>
+      </a:lnRef>
+      <a:fillRef idx="1">
+        <a:scrgbClr r="0" g="0" b="0"/>
+      </a:fillRef>
+      <a:effectRef idx="0">
+        <a:scrgbClr r="0" g="0" b="0"/>
+      </a:effectRef>
+      <a:fontRef idx="minor">
+        <a:schemeClr val="lt1"/>
+      </a:fontRef>
+    </dgm:style>
+  </dgm:styleLbl>
+  <dgm:styleLbl name="parChTrans2D4">
+    <dgm:scene3d>
+      <a:camera prst="orthographicFront"/>
+      <a:lightRig rig="threePt" dir="t"/>
+    </dgm:scene3d>
+    <dgm:sp3d/>
+    <dgm:txPr/>
+    <dgm:style>
+      <a:lnRef idx="2">
+        <a:scrgbClr r="0" g="0" b="0"/>
+      </a:lnRef>
+      <a:fillRef idx="1">
+        <a:scrgbClr r="0" g="0" b="0"/>
+      </a:fillRef>
+      <a:effectRef idx="0">
+        <a:scrgbClr r="0" g="0" b="0"/>
+      </a:effectRef>
+      <a:fontRef idx="minor">
+        <a:schemeClr val="lt1"/>
+      </a:fontRef>
+    </dgm:style>
+  </dgm:styleLbl>
+  <dgm:styleLbl name="parChTrans1D1">
+    <dgm:scene3d>
+      <a:camera prst="orthographicFront"/>
+      <a:lightRig rig="threePt" dir="t"/>
+    </dgm:scene3d>
+    <dgm:sp3d/>
+    <dgm:txPr/>
+    <dgm:style>
+      <a:lnRef idx="2">
+        <a:scrgbClr r="0" g="0" b="0"/>
+      </a:lnRef>
+      <a:fillRef idx="0">
+        <a:scrgbClr r="0" g="0" b="0"/>
+      </a:fillRef>
+      <a:effectRef idx="0">
+        <a:scrgbClr r="0" g="0" b="0"/>
+      </a:effectRef>
+      <a:fontRef idx="minor"/>
+    </dgm:style>
+  </dgm:styleLbl>
+  <dgm:styleLbl name="parChTrans1D2">
+    <dgm:scene3d>
+      <a:camera prst="orthographicFront"/>
+      <a:lightRig rig="threePt" dir="t"/>
+    </dgm:scene3d>
+    <dgm:sp3d/>
+    <dgm:txPr/>
+    <dgm:style>
+      <a:lnRef idx="2">
+        <a:scrgbClr r="0" g="0" b="0"/>
+      </a:lnRef>
+      <a:fillRef idx="0">
+        <a:scrgbClr r="0" g="0" b="0"/>
+      </a:fillRef>
+      <a:effectRef idx="0">
+        <a:scrgbClr r="0" g="0" b="0"/>
+      </a:effectRef>
+      <a:fontRef idx="minor"/>
+    </dgm:style>
+  </dgm:styleLbl>
+  <dgm:styleLbl name="parChTrans1D3">
+    <dgm:scene3d>
+      <a:camera prst="orthographicFront"/>
+      <a:lightRig rig="threePt" dir="t"/>
+    </dgm:scene3d>
+    <dgm:sp3d/>
+    <dgm:txPr/>
+    <dgm:style>
+      <a:lnRef idx="2">
+        <a:scrgbClr r="0" g="0" b="0"/>
+      </a:lnRef>
+      <a:fillRef idx="0">
+        <a:scrgbClr r="0" g="0" b="0"/>
+      </a:fillRef>
+      <a:effectRef idx="0">
+        <a:scrgbClr r="0" g="0" b="0"/>
+      </a:effectRef>
+      <a:fontRef idx="minor"/>
+    </dgm:style>
+  </dgm:styleLbl>
+  <dgm:styleLbl name="parChTrans1D4">
+    <dgm:scene3d>
+      <a:camera prst="orthographicFront"/>
+      <a:lightRig rig="threePt" dir="t"/>
+    </dgm:scene3d>
+    <dgm:sp3d/>
+    <dgm:txPr/>
+    <dgm:style>
+      <a:lnRef idx="2">
+        <a:scrgbClr r="0" g="0" b="0"/>
+      </a:lnRef>
+      <a:fillRef idx="0">
+        <a:scrgbClr r="0" g="0" b="0"/>
+      </a:fillRef>
+      <a:effectRef idx="0">
+        <a:scrgbClr r="0" g="0" b="0"/>
+      </a:effectRef>
+      <a:fontRef idx="minor"/>
+    </dgm:style>
+  </dgm:styleLbl>
+  <dgm:styleLbl name="fgAcc1">
+    <dgm:scene3d>
+      <a:camera prst="orthographicFront"/>
+      <a:lightRig rig="threePt" dir="t"/>
+    </dgm:scene3d>
+    <dgm:sp3d/>
+    <dgm:txPr/>
+    <dgm:style>
+      <a:lnRef idx="2">
+        <a:scrgbClr r="0" g="0" b="0"/>
+      </a:lnRef>
+      <a:fillRef idx="1">
+        <a:scrgbClr r="0" g="0" b="0"/>
+      </a:fillRef>
+      <a:effectRef idx="0">
+        <a:scrgbClr r="0" g="0" b="0"/>
+      </a:effectRef>
+      <a:fontRef idx="minor"/>
+    </dgm:style>
+  </dgm:styleLbl>
+  <dgm:styleLbl name="conFgAcc1">
+    <dgm:scene3d>
+      <a:camera prst="orthographicFront"/>
+      <a:lightRig rig="threePt" dir="t"/>
+    </dgm:scene3d>
+    <dgm:sp3d/>
+    <dgm:txPr/>
+    <dgm:style>
+      <a:lnRef idx="2">
+        <a:scrgbClr r="0" g="0" b="0"/>
+      </a:lnRef>
+      <a:fillRef idx="1">
+        <a:scrgbClr r="0" g="0" b="0"/>
+      </a:fillRef>
+      <a:effectRef idx="0">
+        <a:scrgbClr r="0" g="0" b="0"/>
+      </a:effectRef>
+      <a:fontRef idx="minor"/>
+    </dgm:style>
+  </dgm:styleLbl>
+  <dgm:styleLbl name="alignAcc1">
+    <dgm:scene3d>
+      <a:camera prst="orthographicFront"/>
+      <a:lightRig rig="threePt" dir="t"/>
+    </dgm:scene3d>
+    <dgm:sp3d/>
+    <dgm:txPr/>
+    <dgm:style>
+      <a:lnRef idx="2">
+        <a:scrgbClr r="0" g="0" b="0"/>
+      </a:lnRef>
+      <a:fillRef idx="1">
+        <a:scrgbClr r="0" g="0" b="0"/>
+      </a:fillRef>
+      <a:effectRef idx="0">
+        <a:scrgbClr r="0" g="0" b="0"/>
+      </a:effectRef>
+      <a:fontRef idx="minor"/>
+    </dgm:style>
+  </dgm:styleLbl>
+  <dgm:styleLbl name="trAlignAcc1">
+    <dgm:scene3d>
+      <a:camera prst="orthographicFront"/>
+      <a:lightRig rig="threePt" dir="t"/>
+    </dgm:scene3d>
+    <dgm:sp3d/>
+    <dgm:txPr/>
+    <dgm:style>
+      <a:lnRef idx="1">
+        <a:scrgbClr r="0" g="0" b="0"/>
+      </a:lnRef>
+      <a:fillRef idx="1">
+        <a:scrgbClr r="0" g="0" b="0"/>
+      </a:fillRef>
+      <a:effectRef idx="0">
+        <a:scrgbClr r="0" g="0" b="0"/>
+      </a:effectRef>
+      <a:fontRef idx="minor"/>
+    </dgm:style>
+  </dgm:styleLbl>
+  <dgm:styleLbl name="bgAcc1">
+    <dgm:scene3d>
+      <a:camera prst="orthographicFront"/>
+      <a:lightRig rig="threePt" dir="t"/>
+    </dgm:scene3d>
+    <dgm:sp3d/>
+    <dgm:txPr/>
+    <dgm:style>
+      <a:lnRef idx="2">
+        <a:scrgbClr r="0" g="0" b="0"/>
+      </a:lnRef>
+      <a:fillRef idx="1">
+        <a:scrgbClr r="0" g="0" b="0"/>
+      </a:fillRef>
+      <a:effectRef idx="0">
+        <a:scrgbClr r="0" g="0" b="0"/>
+      </a:effectRef>
+      <a:fontRef idx="minor"/>
+    </dgm:style>
+  </dgm:styleLbl>
+  <dgm:styleLbl name="solidFgAcc1">
+    <dgm:scene3d>
+      <a:camera prst="orthographicFront"/>
+      <a:lightRig rig="threePt" dir="t"/>
+    </dgm:scene3d>
+    <dgm:sp3d/>
+    <dgm:txPr/>
+    <dgm:style>
+      <a:lnRef idx="2">
+        <a:scrgbClr r="0" g="0" b="0"/>
+      </a:lnRef>
+      <a:fillRef idx="1">
+        <a:scrgbClr r="0" g="0" b="0"/>
+      </a:fillRef>
+      <a:effectRef idx="0">
+        <a:scrgbClr r="0" g="0" b="0"/>
+      </a:effectRef>
+      <a:fontRef idx="minor"/>
+    </dgm:style>
+  </dgm:styleLbl>
+  <dgm:styleLbl name="solidAlignAcc1">
+    <dgm:scene3d>
+      <a:camera prst="orthographicFront"/>
+      <a:lightRig rig="threePt" dir="t"/>
+    </dgm:scene3d>
+    <dgm:sp3d/>
+    <dgm:txPr/>
+    <dgm:style>
+      <a:lnRef idx="2">
+        <a:scrgbClr r="0" g="0" b="0"/>
+      </a:lnRef>
+      <a:fillRef idx="1">
+        <a:scrgbClr r="0" g="0" b="0"/>
+      </a:fillRef>
+      <a:effectRef idx="0">
+        <a:scrgbClr r="0" g="0" b="0"/>
+      </a:effectRef>
+      <a:fontRef idx="minor"/>
+    </dgm:style>
+  </dgm:styleLbl>
+  <dgm:styleLbl name="solidBgAcc1">
+    <dgm:scene3d>
+      <a:camera prst="orthographicFront"/>
+      <a:lightRig rig="threePt" dir="t"/>
+    </dgm:scene3d>
+    <dgm:sp3d/>
+    <dgm:txPr/>
+    <dgm:style>
+      <a:lnRef idx="2">
+        <a:scrgbClr r="0" g="0" b="0"/>
+      </a:lnRef>
+      <a:fillRef idx="1">
+        <a:scrgbClr r="0" g="0" b="0"/>
+      </a:fillRef>
+      <a:effectRef idx="0">
+        <a:scrgbClr r="0" g="0" b="0"/>
+      </a:effectRef>
+      <a:fontRef idx="minor"/>
+    </dgm:style>
+  </dgm:styleLbl>
+  <dgm:styleLbl name="fgAccFollowNode1">
+    <dgm:scene3d>
+      <a:camera prst="orthographicFront"/>
+      <a:lightRig rig="threePt" dir="t"/>
+    </dgm:scene3d>
+    <dgm:sp3d/>
+    <dgm:txPr/>
+    <dgm:style>
+      <a:lnRef idx="2">
+        <a:scrgbClr r="0" g="0" b="0"/>
+      </a:lnRef>
+      <a:fillRef idx="1">
+        <a:scrgbClr r="0" g="0" b="0"/>
+      </a:fillRef>
+      <a:effectRef idx="0">
+        <a:scrgbClr r="0" g="0" b="0"/>
+      </a:effectRef>
+      <a:fontRef idx="minor"/>
+    </dgm:style>
+  </dgm:styleLbl>
+  <dgm:styleLbl name="alignAccFollowNode1">
+    <dgm:scene3d>
+      <a:camera prst="orthographicFront"/>
+      <a:lightRig rig="threePt" dir="t"/>
+    </dgm:scene3d>
+    <dgm:sp3d/>
+    <dgm:txPr/>
+    <dgm:style>
+      <a:lnRef idx="2">
+        <a:scrgbClr r="0" g="0" b="0"/>
+      </a:lnRef>
+      <a:fillRef idx="1">
+        <a:scrgbClr r="0" g="0" b="0"/>
+      </a:fillRef>
+      <a:effectRef idx="0">
+        <a:scrgbClr r="0" g="0" b="0"/>
+      </a:effectRef>
+      <a:fontRef idx="minor"/>
+    </dgm:style>
+  </dgm:styleLbl>
+  <dgm:styleLbl name="bgAccFollowNode1">
+    <dgm:scene3d>
+      <a:camera prst="orthographicFront"/>
+      <a:lightRig rig="threePt" dir="t"/>
+    </dgm:scene3d>
+    <dgm:sp3d/>
+    <dgm:txPr/>
+    <dgm:style>
+      <a:lnRef idx="2">
+        <a:scrgbClr r="0" g="0" b="0"/>
+      </a:lnRef>
+      <a:fillRef idx="1">
+        <a:scrgbClr r="0" g="0" b="0"/>
+      </a:fillRef>
+      <a:effectRef idx="0">
+        <a:scrgbClr r="0" g="0" b="0"/>
+      </a:effectRef>
+      <a:fontRef idx="minor"/>
+    </dgm:style>
+  </dgm:styleLbl>
+  <dgm:styleLbl name="fgAcc0">
+    <dgm:scene3d>
+      <a:camera prst="orthographicFront"/>
+      <a:lightRig rig="threePt" dir="t"/>
+    </dgm:scene3d>
+    <dgm:sp3d/>
+    <dgm:txPr/>
+    <dgm:style>
+      <a:lnRef idx="2">
+        <a:scrgbClr r="0" g="0" b="0"/>
+      </a:lnRef>
+      <a:fillRef idx="1">
+        <a:scrgbClr r="0" g="0" b="0"/>
+      </a:fillRef>
+      <a:effectRef idx="0">
+        <a:scrgbClr r="0" g="0" b="0"/>
+      </a:effectRef>
+      <a:fontRef idx="minor"/>
+    </dgm:style>
+  </dgm:styleLbl>
+  <dgm:styleLbl name="fgAcc2">
+    <dgm:scene3d>
+      <a:camera prst="orthographicFront"/>
+      <a:lightRig rig="threePt" dir="t"/>
+    </dgm:scene3d>
+    <dgm:sp3d/>
+    <dgm:txPr/>
+    <dgm:style>
+      <a:lnRef idx="2">
+        <a:scrgbClr r="0" g="0" b="0"/>
+      </a:lnRef>
+      <a:fillRef idx="1">
+        <a:scrgbClr r="0" g="0" b="0"/>
+      </a:fillRef>
+      <a:effectRef idx="0">
+        <a:scrgbClr r="0" g="0" b="0"/>
+      </a:effectRef>
+      <a:fontRef idx="minor"/>
+    </dgm:style>
+  </dgm:styleLbl>
+  <dgm:styleLbl name="fgAcc3">
+    <dgm:scene3d>
+      <a:camera prst="orthographicFront"/>
+      <a:lightRig rig="threePt" dir="t"/>
+    </dgm:scene3d>
+    <dgm:sp3d/>
+    <dgm:txPr/>
+    <dgm:style>
+      <a:lnRef idx="2">
+        <a:scrgbClr r="0" g="0" b="0"/>
+      </a:lnRef>
+      <a:fillRef idx="1">
+        <a:scrgbClr r="0" g="0" b="0"/>
+      </a:fillRef>
+      <a:effectRef idx="0">
+        <a:scrgbClr r="0" g="0" b="0"/>
+      </a:effectRef>
+      <a:fontRef idx="minor"/>
+    </dgm:style>
+  </dgm:styleLbl>
+  <dgm:styleLbl name="fgAcc4">
+    <dgm:scene3d>
+      <a:camera prst="orthographicFront"/>
+      <a:lightRig rig="threePt" dir="t"/>
+    </dgm:scene3d>
+    <dgm:sp3d/>
+    <dgm:txPr/>
+    <dgm:style>
+      <a:lnRef idx="2">
+        <a:scrgbClr r="0" g="0" b="0"/>
+      </a:lnRef>
+      <a:fillRef idx="1">
+        <a:scrgbClr r="0" g="0" b="0"/>
+      </a:fillRef>
+      <a:effectRef idx="0">
+        <a:scrgbClr r="0" g="0" b="0"/>
+      </a:effectRef>
+      <a:fontRef idx="minor"/>
+    </dgm:style>
+  </dgm:styleLbl>
+  <dgm:styleLbl name="bgShp">
+    <dgm:scene3d>
+      <a:camera prst="orthographicFront"/>
+      <a:lightRig rig="threePt" dir="t"/>
+    </dgm:scene3d>
+    <dgm:sp3d/>
+    <dgm:txPr/>
+    <dgm:style>
+      <a:lnRef idx="0">
+        <a:scrgbClr r="0" g="0" b="0"/>
+      </a:lnRef>
+      <a:fillRef idx="1">
+        <a:scrgbClr r="0" g="0" b="0"/>
+      </a:fillRef>
+      <a:effectRef idx="0">
+        <a:scrgbClr r="0" g="0" b="0"/>
+      </a:effectRef>
+      <a:fontRef idx="minor"/>
+    </dgm:style>
+  </dgm:styleLbl>
+  <dgm:styleLbl name="dkBgShp">
+    <dgm:scene3d>
+      <a:camera prst="orthographicFront"/>
+      <a:lightRig rig="threePt" dir="t"/>
+    </dgm:scene3d>
+    <dgm:sp3d/>
+    <dgm:txPr/>
+    <dgm:style>
+      <a:lnRef idx="0">
+        <a:scrgbClr r="0" g="0" b="0"/>
+      </a:lnRef>
+      <a:fillRef idx="1">
+        <a:scrgbClr r="0" g="0" b="0"/>
+      </a:fillRef>
+      <a:effectRef idx="0">
+        <a:scrgbClr r="0" g="0" b="0"/>
+      </a:effectRef>
+      <a:fontRef idx="minor"/>
+    </dgm:style>
+  </dgm:styleLbl>
+  <dgm:styleLbl name="trBgShp">
+    <dgm:scene3d>
+      <a:camera prst="orthographicFront"/>
+      <a:lightRig rig="threePt" dir="t"/>
+    </dgm:scene3d>
+    <dgm:sp3d/>
+    <dgm:txPr/>
+    <dgm:style>
+      <a:lnRef idx="0">
+        <a:scrgbClr r="0" g="0" b="0"/>
+      </a:lnRef>
+      <a:fillRef idx="1">
+        <a:scrgbClr r="0" g="0" b="0"/>
+      </a:fillRef>
+      <a:effectRef idx="0">
+        <a:scrgbClr r="0" g="0" b="0"/>
+      </a:effectRef>
+      <a:fontRef idx="minor"/>
+    </dgm:style>
+  </dgm:styleLbl>
+  <dgm:styleLbl name="fgShp">
+    <dgm:scene3d>
+      <a:camera prst="orthographicFront"/>
+      <a:lightRig rig="threePt" dir="t"/>
+    </dgm:scene3d>
+    <dgm:sp3d/>
+    <dgm:txPr/>
+    <dgm:style>
+      <a:lnRef idx="2">
+        <a:scrgbClr r="0" g="0" b="0"/>
+      </a:lnRef>
+      <a:fillRef idx="1">
+        <a:scrgbClr r="0" g="0" b="0"/>
+      </a:fillRef>
+      <a:effectRef idx="0">
+        <a:scrgbClr r="0" g="0" b="0"/>
+      </a:effectRef>
+      <a:fontRef idx="minor"/>
+    </dgm:style>
+  </dgm:styleLbl>
+  <dgm:styleLbl name="revTx">
+    <dgm:scene3d>
+      <a:camera prst="orthographicFront"/>
+      <a:lightRig rig="threePt" dir="t"/>
+    </dgm:scene3d>
+    <dgm:sp3d/>
+    <dgm:txPr/>
+    <dgm:style>
+      <a:lnRef idx="0">
+        <a:scrgbClr r="0" g="0" b="0"/>
+      </a:lnRef>
+      <a:fillRef idx="0">
+        <a:scrgbClr r="0" g="0" b="0"/>
+      </a:fillRef>
+      <a:effectRef idx="0">
+        <a:scrgbClr r="0" g="0" b="0"/>
+      </a:effectRef>
+      <a:fontRef idx="minor"/>
+    </dgm:style>
+  </dgm:styleLbl>
+</dgm:styleDef>
+</file>
+
+<file path=ppt/diagrams/quickStyle3.xml><?xml version="1.0" encoding="utf-8"?>
 <dgm:styleDef xmlns:dgm="http://schemas.openxmlformats.org/drawingml/2006/diagram" xmlns:a="http://schemas.openxmlformats.org/drawingml/2006/main" uniqueId="urn:microsoft.com/office/officeart/2005/8/quickstyle/simple1">
   <dgm:title val=""/>
   <dgm:desc val=""/>
@@ -6500,7 +10100,7 @@
           <a:p>
             <a:fld id="{CEAC6BC8-6317-F340-B385-7FD07D74E7D9}" type="datetimeFigureOut">
               <a:rPr lang="en-US" smtClean="0"/>
-              <a:t>11/15/21</a:t>
+              <a:t>11/26/21</a:t>
             </a:fld>
             <a:endParaRPr lang="en-US"/>
           </a:p>
@@ -6698,7 +10298,7 @@
           <a:p>
             <a:fld id="{CEAC6BC8-6317-F340-B385-7FD07D74E7D9}" type="datetimeFigureOut">
               <a:rPr lang="en-US" smtClean="0"/>
-              <a:t>11/15/21</a:t>
+              <a:t>11/26/21</a:t>
             </a:fld>
             <a:endParaRPr lang="en-US"/>
           </a:p>
@@ -6906,7 +10506,7 @@
           <a:p>
             <a:fld id="{CEAC6BC8-6317-F340-B385-7FD07D74E7D9}" type="datetimeFigureOut">
               <a:rPr lang="en-US" smtClean="0"/>
-              <a:t>11/15/21</a:t>
+              <a:t>11/26/21</a:t>
             </a:fld>
             <a:endParaRPr lang="en-US"/>
           </a:p>
@@ -7104,7 +10704,7 @@
           <a:p>
             <a:fld id="{CEAC6BC8-6317-F340-B385-7FD07D74E7D9}" type="datetimeFigureOut">
               <a:rPr lang="en-US" smtClean="0"/>
-              <a:t>11/15/21</a:t>
+              <a:t>11/26/21</a:t>
             </a:fld>
             <a:endParaRPr lang="en-US"/>
           </a:p>
@@ -7379,7 +10979,7 @@
           <a:p>
             <a:fld id="{CEAC6BC8-6317-F340-B385-7FD07D74E7D9}" type="datetimeFigureOut">
               <a:rPr lang="en-US" smtClean="0"/>
-              <a:t>11/15/21</a:t>
+              <a:t>11/26/21</a:t>
             </a:fld>
             <a:endParaRPr lang="en-US"/>
           </a:p>
@@ -7644,7 +11244,7 @@
           <a:p>
             <a:fld id="{CEAC6BC8-6317-F340-B385-7FD07D74E7D9}" type="datetimeFigureOut">
               <a:rPr lang="en-US" smtClean="0"/>
-              <a:t>11/15/21</a:t>
+              <a:t>11/26/21</a:t>
             </a:fld>
             <a:endParaRPr lang="en-US"/>
           </a:p>
@@ -8056,7 +11656,7 @@
           <a:p>
             <a:fld id="{CEAC6BC8-6317-F340-B385-7FD07D74E7D9}" type="datetimeFigureOut">
               <a:rPr lang="en-US" smtClean="0"/>
-              <a:t>11/15/21</a:t>
+              <a:t>11/26/21</a:t>
             </a:fld>
             <a:endParaRPr lang="en-US"/>
           </a:p>
@@ -8197,7 +11797,7 @@
           <a:p>
             <a:fld id="{CEAC6BC8-6317-F340-B385-7FD07D74E7D9}" type="datetimeFigureOut">
               <a:rPr lang="en-US" smtClean="0"/>
-              <a:t>11/15/21</a:t>
+              <a:t>11/26/21</a:t>
             </a:fld>
             <a:endParaRPr lang="en-US"/>
           </a:p>
@@ -8310,7 +11910,7 @@
           <a:p>
             <a:fld id="{CEAC6BC8-6317-F340-B385-7FD07D74E7D9}" type="datetimeFigureOut">
               <a:rPr lang="en-US" smtClean="0"/>
-              <a:t>11/15/21</a:t>
+              <a:t>11/26/21</a:t>
             </a:fld>
             <a:endParaRPr lang="en-US"/>
           </a:p>
@@ -8621,7 +12221,7 @@
           <a:p>
             <a:fld id="{CEAC6BC8-6317-F340-B385-7FD07D74E7D9}" type="datetimeFigureOut">
               <a:rPr lang="en-US" smtClean="0"/>
-              <a:t>11/15/21</a:t>
+              <a:t>11/26/21</a:t>
             </a:fld>
             <a:endParaRPr lang="en-US"/>
           </a:p>
@@ -8909,7 +12509,7 @@
           <a:p>
             <a:fld id="{CEAC6BC8-6317-F340-B385-7FD07D74E7D9}" type="datetimeFigureOut">
               <a:rPr lang="en-US" smtClean="0"/>
-              <a:t>11/15/21</a:t>
+              <a:t>11/26/21</a:t>
             </a:fld>
             <a:endParaRPr lang="en-US"/>
           </a:p>
@@ -9150,7 +12750,7 @@
           <a:p>
             <a:fld id="{CEAC6BC8-6317-F340-B385-7FD07D74E7D9}" type="datetimeFigureOut">
               <a:rPr lang="en-US" smtClean="0"/>
-              <a:t>11/15/21</a:t>
+              <a:t>11/26/21</a:t>
             </a:fld>
             <a:endParaRPr lang="en-US"/>
           </a:p>
@@ -9747,6 +13347,67 @@
 </p:sld>
 </file>
 
+<file path=ppt/slides/slide4.xml><?xml version="1.0" encoding="utf-8"?>
+<p:sld xmlns:a="http://schemas.openxmlformats.org/drawingml/2006/main" xmlns:r="http://schemas.openxmlformats.org/officeDocument/2006/relationships" xmlns:p="http://schemas.openxmlformats.org/presentationml/2006/main">
+  <p:cSld>
+    <p:spTree>
+      <p:nvGrpSpPr>
+        <p:cNvPr id="1" name=""/>
+        <p:cNvGrpSpPr/>
+        <p:nvPr/>
+      </p:nvGrpSpPr>
+      <p:grpSpPr>
+        <a:xfrm>
+          <a:off x="0" y="0"/>
+          <a:ext cx="0" cy="0"/>
+          <a:chOff x="0" y="0"/>
+          <a:chExt cx="0" cy="0"/>
+        </a:xfrm>
+      </p:grpSpPr>
+      <p:graphicFrame>
+        <p:nvGraphicFramePr>
+          <p:cNvPr id="4" name="Content Placeholder 3">
+            <a:extLst>
+              <a:ext uri="{FF2B5EF4-FFF2-40B4-BE49-F238E27FC236}">
+                <a16:creationId xmlns:a16="http://schemas.microsoft.com/office/drawing/2014/main" id="{5D557A8A-B704-7C4F-90DF-45C0024B2B6E}"/>
+              </a:ext>
+            </a:extLst>
+          </p:cNvPr>
+          <p:cNvGraphicFramePr>
+            <a:graphicFrameLocks noGrp="1"/>
+          </p:cNvGraphicFramePr>
+          <p:nvPr>
+            <p:ph idx="1"/>
+            <p:extLst>
+              <p:ext uri="{D42A27DB-BD31-4B8C-83A1-F6EECF244321}">
+                <p14:modId xmlns:p14="http://schemas.microsoft.com/office/powerpoint/2010/main" val="198455855"/>
+              </p:ext>
+            </p:extLst>
+          </p:nvPr>
+        </p:nvGraphicFramePr>
+        <p:xfrm>
+          <a:off x="175098" y="612844"/>
+          <a:ext cx="11644008" cy="5564120"/>
+        </p:xfrm>
+        <a:graphic>
+          <a:graphicData uri="http://schemas.openxmlformats.org/drawingml/2006/diagram">
+            <dgm:relIds xmlns:dgm="http://schemas.openxmlformats.org/drawingml/2006/diagram" xmlns:r="http://schemas.openxmlformats.org/officeDocument/2006/relationships" r:dm="rId2" r:lo="rId3" r:qs="rId4" r:cs="rId5"/>
+          </a:graphicData>
+        </a:graphic>
+      </p:graphicFrame>
+    </p:spTree>
+    <p:extLst>
+      <p:ext uri="{BB962C8B-B14F-4D97-AF65-F5344CB8AC3E}">
+        <p14:creationId xmlns:p14="http://schemas.microsoft.com/office/powerpoint/2010/main" val="4249620063"/>
+      </p:ext>
+    </p:extLst>
+  </p:cSld>
+  <p:clrMapOvr>
+    <a:masterClrMapping/>
+  </p:clrMapOvr>
+</p:sld>
+</file>
+
 <file path=ppt/theme/theme1.xml><?xml version="1.0" encoding="utf-8"?>
 <a:theme xmlns:a="http://schemas.openxmlformats.org/drawingml/2006/main" name="Office Theme">
   <a:themeElements>

</xml_diff>